<commit_message>
adding notes for lecture file week 4
</commit_message>
<xml_diff>
--- a/lecture/4-Neural_Networks-710.pptx
+++ b/lecture/4-Neural_Networks-710.pptx
@@ -190,7 +190,7 @@
 
 <file path=ppt/commentAuthors.xml><?xml version="1.0" encoding="utf-8"?>
 <p:cmAuthorLst xmlns:a="http://schemas.openxmlformats.org/drawingml/2006/main" xmlns:r="http://schemas.openxmlformats.org/officeDocument/2006/relationships" xmlns:p="http://schemas.openxmlformats.org/presentationml/2006/main">
-  <p:cmAuthor id="1" name="user" initials="u" lastIdx="1" clrIdx="0">
+  <p:cmAuthor id="1" name="user" initials="u" lastIdx="5" clrIdx="0">
     <p:extLst>
       <p:ext uri="{19B8F6BF-5375-455C-9EA6-DF929625EA0E}">
         <p15:presenceInfo xmlns:p15="http://schemas.microsoft.com/office/powerpoint/2012/main" userId="user" providerId="None"/>
@@ -205,6 +205,48 @@
   <p:cm authorId="1" dt="2016-11-14T08:55:36.324" idx="1">
     <p:pos x="1787" y="511"/>
     <p:text>特别注意，不要拉了X0，W0，否则平面只能经过原点，可能导致不收敛</p:text>
+    <p:extLst>
+      <p:ext uri="{C676402C-5697-4E1C-873F-D02D1690AC5C}">
+        <p15:threadingInfo xmlns:p15="http://schemas.microsoft.com/office/powerpoint/2012/main" timeZoneBias="-480"/>
+      </p:ext>
+    </p:extLst>
+  </p:cm>
+</p:cmLst>
+</file>
+
+<file path=ppt/comments/comment2.xml><?xml version="1.0" encoding="utf-8"?>
+<p:cmLst xmlns:a="http://schemas.openxmlformats.org/drawingml/2006/main" xmlns:r="http://schemas.openxmlformats.org/officeDocument/2006/relationships" xmlns:p="http://schemas.openxmlformats.org/presentationml/2006/main">
+  <p:cm authorId="1" dt="2016-11-15T11:28:43.537" idx="2">
+    <p:pos x="3465" y="708"/>
+    <p:text>应用threshold=0.5</p:text>
+    <p:extLst>
+      <p:ext uri="{C676402C-5697-4E1C-873F-D02D1690AC5C}">
+        <p15:threadingInfo xmlns:p15="http://schemas.microsoft.com/office/powerpoint/2012/main" timeZoneBias="-480"/>
+      </p:ext>
+    </p:extLst>
+  </p:cm>
+</p:cmLst>
+</file>
+
+<file path=ppt/comments/comment3.xml><?xml version="1.0" encoding="utf-8"?>
+<p:cmLst xmlns:a="http://schemas.openxmlformats.org/drawingml/2006/main" xmlns:r="http://schemas.openxmlformats.org/officeDocument/2006/relationships" xmlns:p="http://schemas.openxmlformats.org/presentationml/2006/main">
+  <p:cm authorId="1" dt="2016-11-15T14:44:29.598" idx="4">
+    <p:pos x="4146" y="1596"/>
+    <p:text>因为用的是sigmod函数</p:text>
+    <p:extLst>
+      <p:ext uri="{C676402C-5697-4E1C-873F-D02D1690AC5C}">
+        <p15:threadingInfo xmlns:p15="http://schemas.microsoft.com/office/powerpoint/2012/main" timeZoneBias="-480"/>
+      </p:ext>
+    </p:extLst>
+  </p:cm>
+</p:cmLst>
+</file>
+
+<file path=ppt/comments/comment4.xml><?xml version="1.0" encoding="utf-8"?>
+<p:cmLst xmlns:a="http://schemas.openxmlformats.org/drawingml/2006/main" xmlns:r="http://schemas.openxmlformats.org/officeDocument/2006/relationships" xmlns:p="http://schemas.openxmlformats.org/presentationml/2006/main">
+  <p:cm authorId="1" dt="2016-11-15T15:10:55.586" idx="5">
+    <p:pos x="4996" y="1474"/>
+    <p:text>克服局部最优解的冲量</p:text>
     <p:extLst>
       <p:ext uri="{C676402C-5697-4E1C-873F-D02D1690AC5C}">
         <p15:threadingInfo xmlns:p15="http://schemas.microsoft.com/office/powerpoint/2012/main" timeZoneBias="-480"/>
@@ -305,7 +347,7 @@
               <a:pPr>
                 <a:defRPr/>
               </a:pPr>
-              <a:t>2016/11/14</a:t>
+              <a:t>2016/11/15</a:t>
             </a:fld>
             <a:endParaRPr lang="zh-CN" altLang="en-US"/>
           </a:p>
@@ -612,6 +654,786 @@
     </a:lvl9pPr>
   </p:notesStyle>
 </p:notesMaster>
+</file>
+
+<file path=ppt/notesSlides/notesSlide1.xml><?xml version="1.0" encoding="utf-8"?>
+<p:notes xmlns:a="http://schemas.openxmlformats.org/drawingml/2006/main" xmlns:r="http://schemas.openxmlformats.org/officeDocument/2006/relationships" xmlns:p="http://schemas.openxmlformats.org/presentationml/2006/main">
+  <p:cSld>
+    <p:spTree>
+      <p:nvGrpSpPr>
+        <p:cNvPr id="1" name=""/>
+        <p:cNvGrpSpPr/>
+        <p:nvPr/>
+      </p:nvGrpSpPr>
+      <p:grpSpPr>
+        <a:xfrm>
+          <a:off x="0" y="0"/>
+          <a:ext cx="0" cy="0"/>
+          <a:chOff x="0" y="0"/>
+          <a:chExt cx="0" cy="0"/>
+        </a:xfrm>
+      </p:grpSpPr>
+      <p:sp>
+        <p:nvSpPr>
+          <p:cNvPr id="2" name="幻灯片图像占位符 1"/>
+          <p:cNvSpPr>
+            <a:spLocks noGrp="1" noRot="1" noChangeAspect="1"/>
+          </p:cNvSpPr>
+          <p:nvPr>
+            <p:ph type="sldImg"/>
+          </p:nvPr>
+        </p:nvSpPr>
+        <p:spPr/>
+      </p:sp>
+      <p:sp>
+        <p:nvSpPr>
+          <p:cNvPr id="3" name="备注占位符 2"/>
+          <p:cNvSpPr>
+            <a:spLocks noGrp="1"/>
+          </p:cNvSpPr>
+          <p:nvPr>
+            <p:ph type="body" idx="1"/>
+          </p:nvPr>
+        </p:nvSpPr>
+        <p:spPr/>
+        <p:txBody>
+          <a:bodyPr/>
+          <a:lstStyle/>
+          <a:p>
+            <a:r>
+              <a:rPr lang="zh-CN" altLang="en-US" dirty="0" smtClean="0"/>
+              <a:t>与计算机相比，单个神经元的速度很慢，但是神经整体的识别速度很快，关键在于并行。</a:t>
+            </a:r>
+            <a:endParaRPr lang="zh-CN" altLang="en-US" dirty="0"/>
+          </a:p>
+        </p:txBody>
+      </p:sp>
+      <p:sp>
+        <p:nvSpPr>
+          <p:cNvPr id="4" name="灯片编号占位符 3"/>
+          <p:cNvSpPr>
+            <a:spLocks noGrp="1"/>
+          </p:cNvSpPr>
+          <p:nvPr>
+            <p:ph type="sldNum" sz="quarter" idx="10"/>
+          </p:nvPr>
+        </p:nvSpPr>
+        <p:spPr/>
+        <p:txBody>
+          <a:bodyPr/>
+          <a:lstStyle/>
+          <a:p>
+            <a:pPr>
+              <a:defRPr/>
+            </a:pPr>
+            <a:fld id="{0486AD57-67ED-4140-9F70-67C055736CF8}" type="slidenum">
+              <a:rPr lang="zh-CN" altLang="en-US" smtClean="0"/>
+              <a:pPr>
+                <a:defRPr/>
+              </a:pPr>
+              <a:t>3</a:t>
+            </a:fld>
+            <a:endParaRPr lang="zh-CN" altLang="en-US"/>
+          </a:p>
+        </p:txBody>
+      </p:sp>
+    </p:spTree>
+    <p:extLst>
+      <p:ext uri="{BB962C8B-B14F-4D97-AF65-F5344CB8AC3E}">
+        <p14:creationId xmlns:p14="http://schemas.microsoft.com/office/powerpoint/2010/main" val="3971165304"/>
+      </p:ext>
+    </p:extLst>
+  </p:cSld>
+  <p:clrMapOvr>
+    <a:masterClrMapping/>
+  </p:clrMapOvr>
+</p:notes>
+</file>
+
+<file path=ppt/notesSlides/notesSlide2.xml><?xml version="1.0" encoding="utf-8"?>
+<p:notes xmlns:a="http://schemas.openxmlformats.org/drawingml/2006/main" xmlns:r="http://schemas.openxmlformats.org/officeDocument/2006/relationships" xmlns:p="http://schemas.openxmlformats.org/presentationml/2006/main">
+  <p:cSld>
+    <p:spTree>
+      <p:nvGrpSpPr>
+        <p:cNvPr id="1" name=""/>
+        <p:cNvGrpSpPr/>
+        <p:nvPr/>
+      </p:nvGrpSpPr>
+      <p:grpSpPr>
+        <a:xfrm>
+          <a:off x="0" y="0"/>
+          <a:ext cx="0" cy="0"/>
+          <a:chOff x="0" y="0"/>
+          <a:chExt cx="0" cy="0"/>
+        </a:xfrm>
+      </p:grpSpPr>
+      <p:sp>
+        <p:nvSpPr>
+          <p:cNvPr id="2" name="幻灯片图像占位符 1"/>
+          <p:cNvSpPr>
+            <a:spLocks noGrp="1" noRot="1" noChangeAspect="1"/>
+          </p:cNvSpPr>
+          <p:nvPr>
+            <p:ph type="sldImg"/>
+          </p:nvPr>
+        </p:nvSpPr>
+        <p:spPr/>
+      </p:sp>
+      <p:sp>
+        <p:nvSpPr>
+          <p:cNvPr id="3" name="备注占位符 2"/>
+          <p:cNvSpPr>
+            <a:spLocks noGrp="1"/>
+          </p:cNvSpPr>
+          <p:nvPr>
+            <p:ph type="body" idx="1"/>
+          </p:nvPr>
+        </p:nvSpPr>
+        <p:spPr/>
+        <p:txBody>
+          <a:bodyPr/>
+          <a:lstStyle/>
+          <a:p>
+            <a:r>
+              <a:rPr lang="zh-CN" altLang="en-US" dirty="0" smtClean="0"/>
+              <a:t>特别注意，不要漏了</a:t>
+            </a:r>
+            <a:r>
+              <a:rPr lang="en-US" altLang="zh-CN" dirty="0" smtClean="0"/>
+              <a:t>X</a:t>
+            </a:r>
+            <a:r>
+              <a:rPr lang="en-US" altLang="zh-CN" baseline="-25000" dirty="0" smtClean="0"/>
+              <a:t>0</a:t>
+            </a:r>
+            <a:r>
+              <a:rPr lang="zh-CN" altLang="en-US" dirty="0" smtClean="0"/>
+              <a:t>，</a:t>
+            </a:r>
+            <a:r>
+              <a:rPr lang="en-US" altLang="zh-CN" dirty="0" smtClean="0"/>
+              <a:t>W</a:t>
+            </a:r>
+            <a:r>
+              <a:rPr lang="en-US" altLang="zh-CN" baseline="-25000" dirty="0" smtClean="0"/>
+              <a:t>0</a:t>
+            </a:r>
+            <a:r>
+              <a:rPr lang="zh-CN" altLang="en-US" dirty="0" smtClean="0"/>
+              <a:t>，否则平面只能经过原点，可能导致不收敛</a:t>
+            </a:r>
+            <a:endParaRPr lang="zh-CN" altLang="en-US" dirty="0"/>
+          </a:p>
+        </p:txBody>
+      </p:sp>
+      <p:sp>
+        <p:nvSpPr>
+          <p:cNvPr id="4" name="灯片编号占位符 3"/>
+          <p:cNvSpPr>
+            <a:spLocks noGrp="1"/>
+          </p:cNvSpPr>
+          <p:nvPr>
+            <p:ph type="sldNum" sz="quarter" idx="10"/>
+          </p:nvPr>
+        </p:nvSpPr>
+        <p:spPr/>
+        <p:txBody>
+          <a:bodyPr/>
+          <a:lstStyle/>
+          <a:p>
+            <a:pPr>
+              <a:defRPr/>
+            </a:pPr>
+            <a:fld id="{0486AD57-67ED-4140-9F70-67C055736CF8}" type="slidenum">
+              <a:rPr lang="zh-CN" altLang="en-US" smtClean="0"/>
+              <a:pPr>
+                <a:defRPr/>
+              </a:pPr>
+              <a:t>6</a:t>
+            </a:fld>
+            <a:endParaRPr lang="zh-CN" altLang="en-US"/>
+          </a:p>
+        </p:txBody>
+      </p:sp>
+    </p:spTree>
+    <p:extLst>
+      <p:ext uri="{BB962C8B-B14F-4D97-AF65-F5344CB8AC3E}">
+        <p14:creationId xmlns:p14="http://schemas.microsoft.com/office/powerpoint/2010/main" val="3364827199"/>
+      </p:ext>
+    </p:extLst>
+  </p:cSld>
+  <p:clrMapOvr>
+    <a:masterClrMapping/>
+  </p:clrMapOvr>
+</p:notes>
+</file>
+
+<file path=ppt/notesSlides/notesSlide3.xml><?xml version="1.0" encoding="utf-8"?>
+<p:notes xmlns:a="http://schemas.openxmlformats.org/drawingml/2006/main" xmlns:r="http://schemas.openxmlformats.org/officeDocument/2006/relationships" xmlns:p="http://schemas.openxmlformats.org/presentationml/2006/main">
+  <p:cSld>
+    <p:spTree>
+      <p:nvGrpSpPr>
+        <p:cNvPr id="1" name=""/>
+        <p:cNvGrpSpPr/>
+        <p:nvPr/>
+      </p:nvGrpSpPr>
+      <p:grpSpPr>
+        <a:xfrm>
+          <a:off x="0" y="0"/>
+          <a:ext cx="0" cy="0"/>
+          <a:chOff x="0" y="0"/>
+          <a:chExt cx="0" cy="0"/>
+        </a:xfrm>
+      </p:grpSpPr>
+      <p:sp>
+        <p:nvSpPr>
+          <p:cNvPr id="2" name="幻灯片图像占位符 1"/>
+          <p:cNvSpPr>
+            <a:spLocks noGrp="1" noRot="1" noChangeAspect="1"/>
+          </p:cNvSpPr>
+          <p:nvPr>
+            <p:ph type="sldImg"/>
+          </p:nvPr>
+        </p:nvSpPr>
+        <p:spPr/>
+      </p:sp>
+      <p:sp>
+        <p:nvSpPr>
+          <p:cNvPr id="3" name="备注占位符 2"/>
+          <p:cNvSpPr>
+            <a:spLocks noGrp="1"/>
+          </p:cNvSpPr>
+          <p:nvPr>
+            <p:ph type="body" idx="1"/>
+          </p:nvPr>
+        </p:nvSpPr>
+        <p:spPr/>
+        <p:txBody>
+          <a:bodyPr/>
+          <a:lstStyle/>
+          <a:p>
+            <a:r>
+              <a:rPr lang="en-US" altLang="zh-CN" dirty="0" smtClean="0"/>
+              <a:t>t:</a:t>
+            </a:r>
+            <a:r>
+              <a:rPr lang="en-US" altLang="zh-CN" baseline="0" dirty="0" smtClean="0"/>
+              <a:t> </a:t>
+            </a:r>
+            <a:r>
+              <a:rPr lang="zh-CN" altLang="en-US" baseline="0" dirty="0" smtClean="0"/>
+              <a:t>目标</a:t>
+            </a:r>
+            <a:endParaRPr lang="en-US" altLang="zh-CN" baseline="0" dirty="0" smtClean="0"/>
+          </a:p>
+          <a:p>
+            <a:r>
+              <a:rPr lang="en-US" altLang="zh-CN" baseline="0" dirty="0" smtClean="0"/>
+              <a:t>o: </a:t>
+            </a:r>
+            <a:r>
+              <a:rPr lang="zh-CN" altLang="en-US" baseline="0" dirty="0" smtClean="0"/>
+              <a:t>实际</a:t>
+            </a:r>
+            <a:endParaRPr lang="en-US" altLang="zh-CN" baseline="0" dirty="0" smtClean="0"/>
+          </a:p>
+          <a:p>
+            <a:r>
+              <a:rPr lang="en-US" altLang="zh-CN" dirty="0" smtClean="0"/>
+              <a:t>D</a:t>
+            </a:r>
+            <a:r>
+              <a:rPr lang="zh-CN" altLang="en-US" dirty="0" smtClean="0"/>
+              <a:t>：训练集</a:t>
+            </a:r>
+            <a:endParaRPr lang="en-US" altLang="zh-CN" dirty="0" smtClean="0"/>
+          </a:p>
+          <a:p>
+            <a:endParaRPr lang="en-US" altLang="zh-CN" dirty="0" smtClean="0"/>
+          </a:p>
+          <a:p>
+            <a:r>
+              <a:rPr lang="zh-CN" altLang="en-US" dirty="0" smtClean="0"/>
+              <a:t>如果偏导是整数，则说明随着</a:t>
+            </a:r>
+            <a:r>
+              <a:rPr lang="en-US" altLang="zh-CN" dirty="0" smtClean="0"/>
+              <a:t>w</a:t>
+            </a:r>
+            <a:r>
+              <a:rPr lang="zh-CN" altLang="en-US" dirty="0" smtClean="0"/>
+              <a:t>的增加，误差增加，而现在是要减少误差，所以取负数</a:t>
+            </a:r>
+            <a:endParaRPr lang="zh-CN" altLang="en-US" dirty="0"/>
+          </a:p>
+        </p:txBody>
+      </p:sp>
+      <p:sp>
+        <p:nvSpPr>
+          <p:cNvPr id="4" name="灯片编号占位符 3"/>
+          <p:cNvSpPr>
+            <a:spLocks noGrp="1"/>
+          </p:cNvSpPr>
+          <p:nvPr>
+            <p:ph type="sldNum" sz="quarter" idx="10"/>
+          </p:nvPr>
+        </p:nvSpPr>
+        <p:spPr/>
+        <p:txBody>
+          <a:bodyPr/>
+          <a:lstStyle/>
+          <a:p>
+            <a:pPr>
+              <a:defRPr/>
+            </a:pPr>
+            <a:fld id="{0486AD57-67ED-4140-9F70-67C055736CF8}" type="slidenum">
+              <a:rPr lang="zh-CN" altLang="en-US" smtClean="0"/>
+              <a:pPr>
+                <a:defRPr/>
+              </a:pPr>
+              <a:t>10</a:t>
+            </a:fld>
+            <a:endParaRPr lang="zh-CN" altLang="en-US"/>
+          </a:p>
+        </p:txBody>
+      </p:sp>
+    </p:spTree>
+    <p:extLst>
+      <p:ext uri="{BB962C8B-B14F-4D97-AF65-F5344CB8AC3E}">
+        <p14:creationId xmlns:p14="http://schemas.microsoft.com/office/powerpoint/2010/main" val="2336256114"/>
+      </p:ext>
+    </p:extLst>
+  </p:cSld>
+  <p:clrMapOvr>
+    <a:masterClrMapping/>
+  </p:clrMapOvr>
+</p:notes>
+</file>
+
+<file path=ppt/notesSlides/notesSlide4.xml><?xml version="1.0" encoding="utf-8"?>
+<p:notes xmlns:a="http://schemas.openxmlformats.org/drawingml/2006/main" xmlns:r="http://schemas.openxmlformats.org/officeDocument/2006/relationships" xmlns:p="http://schemas.openxmlformats.org/presentationml/2006/main">
+  <p:cSld>
+    <p:spTree>
+      <p:nvGrpSpPr>
+        <p:cNvPr id="1" name=""/>
+        <p:cNvGrpSpPr/>
+        <p:nvPr/>
+      </p:nvGrpSpPr>
+      <p:grpSpPr>
+        <a:xfrm>
+          <a:off x="0" y="0"/>
+          <a:ext cx="0" cy="0"/>
+          <a:chOff x="0" y="0"/>
+          <a:chExt cx="0" cy="0"/>
+        </a:xfrm>
+      </p:grpSpPr>
+      <p:sp>
+        <p:nvSpPr>
+          <p:cNvPr id="2" name="幻灯片图像占位符 1"/>
+          <p:cNvSpPr>
+            <a:spLocks noGrp="1" noRot="1" noChangeAspect="1"/>
+          </p:cNvSpPr>
+          <p:nvPr>
+            <p:ph type="sldImg"/>
+          </p:nvPr>
+        </p:nvSpPr>
+        <p:spPr/>
+      </p:sp>
+      <p:sp>
+        <p:nvSpPr>
+          <p:cNvPr id="3" name="备注占位符 2"/>
+          <p:cNvSpPr>
+            <a:spLocks noGrp="1"/>
+          </p:cNvSpPr>
+          <p:nvPr>
+            <p:ph type="body" idx="1"/>
+          </p:nvPr>
+        </p:nvSpPr>
+        <p:spPr/>
+        <p:txBody>
+          <a:bodyPr/>
+          <a:lstStyle/>
+          <a:p>
+            <a:r>
+              <a:rPr lang="zh-CN" altLang="en-US" dirty="0" smtClean="0"/>
+              <a:t>假设：节点是线性的</a:t>
+            </a:r>
+            <a:endParaRPr lang="zh-CN" altLang="en-US" dirty="0"/>
+          </a:p>
+        </p:txBody>
+      </p:sp>
+      <p:sp>
+        <p:nvSpPr>
+          <p:cNvPr id="4" name="灯片编号占位符 3"/>
+          <p:cNvSpPr>
+            <a:spLocks noGrp="1"/>
+          </p:cNvSpPr>
+          <p:nvPr>
+            <p:ph type="sldNum" sz="quarter" idx="10"/>
+          </p:nvPr>
+        </p:nvSpPr>
+        <p:spPr/>
+        <p:txBody>
+          <a:bodyPr/>
+          <a:lstStyle/>
+          <a:p>
+            <a:pPr>
+              <a:defRPr/>
+            </a:pPr>
+            <a:fld id="{0486AD57-67ED-4140-9F70-67C055736CF8}" type="slidenum">
+              <a:rPr lang="zh-CN" altLang="en-US" smtClean="0"/>
+              <a:pPr>
+                <a:defRPr/>
+              </a:pPr>
+              <a:t>11</a:t>
+            </a:fld>
+            <a:endParaRPr lang="zh-CN" altLang="en-US"/>
+          </a:p>
+        </p:txBody>
+      </p:sp>
+    </p:spTree>
+    <p:extLst>
+      <p:ext uri="{BB962C8B-B14F-4D97-AF65-F5344CB8AC3E}">
+        <p14:creationId xmlns:p14="http://schemas.microsoft.com/office/powerpoint/2010/main" val="1786404227"/>
+      </p:ext>
+    </p:extLst>
+  </p:cSld>
+  <p:clrMapOvr>
+    <a:masterClrMapping/>
+  </p:clrMapOvr>
+</p:notes>
+</file>
+
+<file path=ppt/notesSlides/notesSlide5.xml><?xml version="1.0" encoding="utf-8"?>
+<p:notes xmlns:a="http://schemas.openxmlformats.org/drawingml/2006/main" xmlns:r="http://schemas.openxmlformats.org/officeDocument/2006/relationships" xmlns:p="http://schemas.openxmlformats.org/presentationml/2006/main">
+  <p:cSld>
+    <p:spTree>
+      <p:nvGrpSpPr>
+        <p:cNvPr id="1" name=""/>
+        <p:cNvGrpSpPr/>
+        <p:nvPr/>
+      </p:nvGrpSpPr>
+      <p:grpSpPr>
+        <a:xfrm>
+          <a:off x="0" y="0"/>
+          <a:ext cx="0" cy="0"/>
+          <a:chOff x="0" y="0"/>
+          <a:chExt cx="0" cy="0"/>
+        </a:xfrm>
+      </p:grpSpPr>
+      <p:sp>
+        <p:nvSpPr>
+          <p:cNvPr id="2" name="幻灯片图像占位符 1"/>
+          <p:cNvSpPr>
+            <a:spLocks noGrp="1" noRot="1" noChangeAspect="1"/>
+          </p:cNvSpPr>
+          <p:nvPr>
+            <p:ph type="sldImg"/>
+          </p:nvPr>
+        </p:nvSpPr>
+        <p:spPr/>
+      </p:sp>
+      <p:sp>
+        <p:nvSpPr>
+          <p:cNvPr id="3" name="备注占位符 2"/>
+          <p:cNvSpPr>
+            <a:spLocks noGrp="1"/>
+          </p:cNvSpPr>
+          <p:nvPr>
+            <p:ph type="body" idx="1"/>
+          </p:nvPr>
+        </p:nvSpPr>
+        <p:spPr/>
+        <p:txBody>
+          <a:bodyPr/>
+          <a:lstStyle/>
+          <a:p>
+            <a:r>
+              <a:rPr lang="zh-CN" altLang="en-US" dirty="0" smtClean="0"/>
+              <a:t>注意，这里是</a:t>
+            </a:r>
+            <a:r>
+              <a:rPr lang="en-US" altLang="zh-CN" dirty="0" smtClean="0"/>
+              <a:t>Stochastic Learning</a:t>
+            </a:r>
+            <a:r>
+              <a:rPr lang="zh-CN" altLang="en-US" dirty="0" smtClean="0"/>
+              <a:t>，不是批量的，所以计算过程是一行一行的迭代。</a:t>
+            </a:r>
+            <a:endParaRPr lang="zh-CN" altLang="en-US" dirty="0"/>
+          </a:p>
+        </p:txBody>
+      </p:sp>
+      <p:sp>
+        <p:nvSpPr>
+          <p:cNvPr id="4" name="灯片编号占位符 3"/>
+          <p:cNvSpPr>
+            <a:spLocks noGrp="1"/>
+          </p:cNvSpPr>
+          <p:nvPr>
+            <p:ph type="sldNum" sz="quarter" idx="10"/>
+          </p:nvPr>
+        </p:nvSpPr>
+        <p:spPr/>
+        <p:txBody>
+          <a:bodyPr/>
+          <a:lstStyle/>
+          <a:p>
+            <a:pPr>
+              <a:defRPr/>
+            </a:pPr>
+            <a:fld id="{0486AD57-67ED-4140-9F70-67C055736CF8}" type="slidenum">
+              <a:rPr lang="zh-CN" altLang="en-US" smtClean="0"/>
+              <a:pPr>
+                <a:defRPr/>
+              </a:pPr>
+              <a:t>14</a:t>
+            </a:fld>
+            <a:endParaRPr lang="zh-CN" altLang="en-US"/>
+          </a:p>
+        </p:txBody>
+      </p:sp>
+    </p:spTree>
+    <p:extLst>
+      <p:ext uri="{BB962C8B-B14F-4D97-AF65-F5344CB8AC3E}">
+        <p14:creationId xmlns:p14="http://schemas.microsoft.com/office/powerpoint/2010/main" val="1524792556"/>
+      </p:ext>
+    </p:extLst>
+  </p:cSld>
+  <p:clrMapOvr>
+    <a:masterClrMapping/>
+  </p:clrMapOvr>
+</p:notes>
+</file>
+
+<file path=ppt/notesSlides/notesSlide6.xml><?xml version="1.0" encoding="utf-8"?>
+<p:notes xmlns:a="http://schemas.openxmlformats.org/drawingml/2006/main" xmlns:r="http://schemas.openxmlformats.org/officeDocument/2006/relationships" xmlns:p="http://schemas.openxmlformats.org/presentationml/2006/main">
+  <p:cSld>
+    <p:spTree>
+      <p:nvGrpSpPr>
+        <p:cNvPr id="1" name=""/>
+        <p:cNvGrpSpPr/>
+        <p:nvPr/>
+      </p:nvGrpSpPr>
+      <p:grpSpPr>
+        <a:xfrm>
+          <a:off x="0" y="0"/>
+          <a:ext cx="0" cy="0"/>
+          <a:chOff x="0" y="0"/>
+          <a:chExt cx="0" cy="0"/>
+        </a:xfrm>
+      </p:grpSpPr>
+      <p:sp>
+        <p:nvSpPr>
+          <p:cNvPr id="2" name="幻灯片图像占位符 1"/>
+          <p:cNvSpPr>
+            <a:spLocks noGrp="1" noRot="1" noChangeAspect="1"/>
+          </p:cNvSpPr>
+          <p:nvPr>
+            <p:ph type="sldImg"/>
+          </p:nvPr>
+        </p:nvSpPr>
+        <p:spPr/>
+      </p:sp>
+      <p:sp>
+        <p:nvSpPr>
+          <p:cNvPr id="3" name="备注占位符 2"/>
+          <p:cNvSpPr>
+            <a:spLocks noGrp="1"/>
+          </p:cNvSpPr>
+          <p:nvPr>
+            <p:ph type="body" idx="1"/>
+          </p:nvPr>
+        </p:nvSpPr>
+        <p:spPr/>
+        <p:txBody>
+          <a:bodyPr/>
+          <a:lstStyle/>
+          <a:p>
+            <a:r>
+              <a:rPr lang="zh-CN" altLang="en-US" dirty="0" smtClean="0"/>
+              <a:t>这种算法如果遇上局部最优解，就可能导致整体的性能无法继续下降，这时可以试着取另外一组随机初始值，重新开始计算。</a:t>
+            </a:r>
+            <a:endParaRPr lang="en-US" altLang="zh-CN" dirty="0" smtClean="0"/>
+          </a:p>
+          <a:p>
+            <a:endParaRPr lang="en-US" altLang="zh-CN" dirty="0" smtClean="0"/>
+          </a:p>
+          <a:p>
+            <a:r>
+              <a:rPr lang="zh-CN" altLang="en-US" dirty="0" smtClean="0"/>
+              <a:t>一般</a:t>
+            </a:r>
+            <a:r>
+              <a:rPr lang="en-US" altLang="zh-CN" dirty="0" smtClean="0"/>
+              <a:t>BP</a:t>
+            </a:r>
+            <a:r>
+              <a:rPr lang="zh-CN" altLang="en-US" dirty="0" smtClean="0"/>
+              <a:t>算法都要试很多次</a:t>
+            </a:r>
+            <a:endParaRPr lang="en-US" altLang="zh-CN" dirty="0" smtClean="0"/>
+          </a:p>
+          <a:p>
+            <a:endParaRPr lang="zh-CN" altLang="en-US" dirty="0"/>
+          </a:p>
+        </p:txBody>
+      </p:sp>
+      <p:sp>
+        <p:nvSpPr>
+          <p:cNvPr id="4" name="灯片编号占位符 3"/>
+          <p:cNvSpPr>
+            <a:spLocks noGrp="1"/>
+          </p:cNvSpPr>
+          <p:nvPr>
+            <p:ph type="sldNum" sz="quarter" idx="10"/>
+          </p:nvPr>
+        </p:nvSpPr>
+        <p:spPr/>
+        <p:txBody>
+          <a:bodyPr/>
+          <a:lstStyle/>
+          <a:p>
+            <a:pPr>
+              <a:defRPr/>
+            </a:pPr>
+            <a:fld id="{0486AD57-67ED-4140-9F70-67C055736CF8}" type="slidenum">
+              <a:rPr lang="zh-CN" altLang="en-US" smtClean="0"/>
+              <a:pPr>
+                <a:defRPr/>
+              </a:pPr>
+              <a:t>26</a:t>
+            </a:fld>
+            <a:endParaRPr lang="zh-CN" altLang="en-US"/>
+          </a:p>
+        </p:txBody>
+      </p:sp>
+    </p:spTree>
+    <p:extLst>
+      <p:ext uri="{BB962C8B-B14F-4D97-AF65-F5344CB8AC3E}">
+        <p14:creationId xmlns:p14="http://schemas.microsoft.com/office/powerpoint/2010/main" val="2029436730"/>
+      </p:ext>
+    </p:extLst>
+  </p:cSld>
+  <p:clrMapOvr>
+    <a:masterClrMapping/>
+  </p:clrMapOvr>
+</p:notes>
+</file>
+
+<file path=ppt/notesSlides/notesSlide7.xml><?xml version="1.0" encoding="utf-8"?>
+<p:notes xmlns:a="http://schemas.openxmlformats.org/drawingml/2006/main" xmlns:r="http://schemas.openxmlformats.org/officeDocument/2006/relationships" xmlns:p="http://schemas.openxmlformats.org/presentationml/2006/main">
+  <p:cSld>
+    <p:spTree>
+      <p:nvGrpSpPr>
+        <p:cNvPr id="1" name=""/>
+        <p:cNvGrpSpPr/>
+        <p:nvPr/>
+      </p:nvGrpSpPr>
+      <p:grpSpPr>
+        <a:xfrm>
+          <a:off x="0" y="0"/>
+          <a:ext cx="0" cy="0"/>
+          <a:chOff x="0" y="0"/>
+          <a:chExt cx="0" cy="0"/>
+        </a:xfrm>
+      </p:grpSpPr>
+      <p:sp>
+        <p:nvSpPr>
+          <p:cNvPr id="2" name="幻灯片图像占位符 1"/>
+          <p:cNvSpPr>
+            <a:spLocks noGrp="1" noRot="1" noChangeAspect="1"/>
+          </p:cNvSpPr>
+          <p:nvPr>
+            <p:ph type="sldImg"/>
+          </p:nvPr>
+        </p:nvSpPr>
+        <p:spPr/>
+      </p:sp>
+      <p:sp>
+        <p:nvSpPr>
+          <p:cNvPr id="3" name="备注占位符 2"/>
+          <p:cNvSpPr>
+            <a:spLocks noGrp="1"/>
+          </p:cNvSpPr>
+          <p:nvPr>
+            <p:ph type="body" idx="1"/>
+          </p:nvPr>
+        </p:nvSpPr>
+        <p:spPr/>
+        <p:txBody>
+          <a:bodyPr/>
+          <a:lstStyle/>
+          <a:p>
+            <a:r>
+              <a:rPr lang="zh-CN" altLang="en-US" dirty="0" smtClean="0"/>
+              <a:t>为了克服局部最优解，增加一个冲量，用于越过局部最优解</a:t>
+            </a:r>
+            <a:endParaRPr lang="en-US" altLang="zh-CN" dirty="0" smtClean="0"/>
+          </a:p>
+          <a:p>
+            <a:endParaRPr lang="en-US" altLang="zh-CN" dirty="0" smtClean="0"/>
+          </a:p>
+          <a:p>
+            <a:r>
+              <a:rPr lang="zh-CN" altLang="en-US" dirty="0" smtClean="0"/>
+              <a:t>学习率一般开始时不能太大也不能太小，一般</a:t>
+            </a:r>
+            <a:r>
+              <a:rPr lang="en-US" altLang="zh-CN" dirty="0" smtClean="0"/>
+              <a:t>0.05</a:t>
+            </a:r>
+            <a:r>
+              <a:rPr lang="zh-CN" altLang="en-US" dirty="0" smtClean="0"/>
+              <a:t>左右，随着过程动态调整。</a:t>
+            </a:r>
+            <a:endParaRPr lang="en-US" altLang="zh-CN" smtClean="0"/>
+          </a:p>
+          <a:p>
+            <a:endParaRPr lang="zh-CN" altLang="en-US" dirty="0"/>
+          </a:p>
+        </p:txBody>
+      </p:sp>
+      <p:sp>
+        <p:nvSpPr>
+          <p:cNvPr id="4" name="灯片编号占位符 3"/>
+          <p:cNvSpPr>
+            <a:spLocks noGrp="1"/>
+          </p:cNvSpPr>
+          <p:nvPr>
+            <p:ph type="sldNum" sz="quarter" idx="10"/>
+          </p:nvPr>
+        </p:nvSpPr>
+        <p:spPr/>
+        <p:txBody>
+          <a:bodyPr/>
+          <a:lstStyle/>
+          <a:p>
+            <a:pPr>
+              <a:defRPr/>
+            </a:pPr>
+            <a:fld id="{0486AD57-67ED-4140-9F70-67C055736CF8}" type="slidenum">
+              <a:rPr lang="zh-CN" altLang="en-US" smtClean="0"/>
+              <a:pPr>
+                <a:defRPr/>
+              </a:pPr>
+              <a:t>27</a:t>
+            </a:fld>
+            <a:endParaRPr lang="zh-CN" altLang="en-US"/>
+          </a:p>
+        </p:txBody>
+      </p:sp>
+    </p:spTree>
+    <p:extLst>
+      <p:ext uri="{BB962C8B-B14F-4D97-AF65-F5344CB8AC3E}">
+        <p14:creationId xmlns:p14="http://schemas.microsoft.com/office/powerpoint/2010/main" val="1784216180"/>
+      </p:ext>
+    </p:extLst>
+  </p:cSld>
+  <p:clrMapOvr>
+    <a:masterClrMapping/>
+  </p:clrMapOvr>
+</p:notes>
 </file>
 
 <file path=ppt/slideLayouts/slideLayout1.xml><?xml version="1.0" encoding="utf-8"?>
@@ -9214,12 +10036,12 @@
           <a:graphicData uri="http://schemas.openxmlformats.org/presentationml/2006/ole">
             <mc:AlternateContent xmlns:mc="http://schemas.openxmlformats.org/markup-compatibility/2006">
               <mc:Choice xmlns:v="urn:schemas-microsoft-com:vml" Requires="v">
-                <p:oleObj spid="_x0000_s123537" name="Equation" r:id="rId3" imgW="1384300" imgH="419100" progId="Equation.3">
+                <p:oleObj spid="_x0000_s123609" name="Equation" r:id="rId4" imgW="1384300" imgH="419100" progId="Equation.3">
                   <p:embed/>
                 </p:oleObj>
               </mc:Choice>
               <mc:Fallback>
-                <p:oleObj name="Equation" r:id="rId3" imgW="1384300" imgH="419100" progId="Equation.3">
+                <p:oleObj name="Equation" r:id="rId4" imgW="1384300" imgH="419100" progId="Equation.3">
                   <p:embed/>
                   <p:pic>
                     <p:nvPicPr>
@@ -9230,7 +10052,7 @@
                       <p:nvPr/>
                     </p:nvPicPr>
                     <p:blipFill>
-                      <a:blip r:embed="rId4">
+                      <a:blip r:embed="rId5">
                         <a:extLst>
                           <a:ext uri="{28A0092B-C50C-407E-A947-70E740481C1C}">
                             <a14:useLocalDpi xmlns:a14="http://schemas.microsoft.com/office/drawing/2010/main" val="0"/>
@@ -9284,12 +10106,12 @@
           <a:graphicData uri="http://schemas.openxmlformats.org/presentationml/2006/ole">
             <mc:AlternateContent xmlns:mc="http://schemas.openxmlformats.org/markup-compatibility/2006">
               <mc:Choice xmlns:v="urn:schemas-microsoft-com:vml" Requires="v">
-                <p:oleObj spid="_x0000_s123538" name="Equation" r:id="rId5" imgW="1790700" imgH="482600" progId="Equation.3">
+                <p:oleObj spid="_x0000_s123610" name="Equation" r:id="rId6" imgW="1790700" imgH="482600" progId="Equation.3">
                   <p:embed/>
                 </p:oleObj>
               </mc:Choice>
               <mc:Fallback>
-                <p:oleObj name="Equation" r:id="rId5" imgW="1790700" imgH="482600" progId="Equation.3">
+                <p:oleObj name="Equation" r:id="rId6" imgW="1790700" imgH="482600" progId="Equation.3">
                   <p:embed/>
                   <p:pic>
                     <p:nvPicPr>
@@ -9300,7 +10122,7 @@
                       <p:nvPr/>
                     </p:nvPicPr>
                     <p:blipFill>
-                      <a:blip r:embed="rId6">
+                      <a:blip r:embed="rId7">
                         <a:extLst>
                           <a:ext uri="{28A0092B-C50C-407E-A947-70E740481C1C}">
                             <a14:useLocalDpi xmlns:a14="http://schemas.microsoft.com/office/drawing/2010/main" val="0"/>
@@ -9354,12 +10176,12 @@
           <a:graphicData uri="http://schemas.openxmlformats.org/presentationml/2006/ole">
             <mc:AlternateContent xmlns:mc="http://schemas.openxmlformats.org/markup-compatibility/2006">
               <mc:Choice xmlns:v="urn:schemas-microsoft-com:vml" Requires="v">
-                <p:oleObj spid="_x0000_s123539" name="Equation" r:id="rId7" imgW="2387600" imgH="431800" progId="Equation.3">
+                <p:oleObj spid="_x0000_s123611" name="Equation" r:id="rId8" imgW="2387600" imgH="431800" progId="Equation.3">
                   <p:embed/>
                 </p:oleObj>
               </mc:Choice>
               <mc:Fallback>
-                <p:oleObj name="Equation" r:id="rId7" imgW="2387600" imgH="431800" progId="Equation.3">
+                <p:oleObj name="Equation" r:id="rId8" imgW="2387600" imgH="431800" progId="Equation.3">
                   <p:embed/>
                   <p:pic>
                     <p:nvPicPr>
@@ -9370,7 +10192,7 @@
                       <p:nvPr/>
                     </p:nvPicPr>
                     <p:blipFill>
-                      <a:blip r:embed="rId8">
+                      <a:blip r:embed="rId9">
                         <a:extLst>
                           <a:ext uri="{28A0092B-C50C-407E-A947-70E740481C1C}">
                             <a14:useLocalDpi xmlns:a14="http://schemas.microsoft.com/office/drawing/2010/main" val="0"/>
@@ -9590,7 +10412,7 @@
           <p:nvPr/>
         </p:nvPicPr>
         <p:blipFill>
-          <a:blip r:embed="rId9" cstate="print"/>
+          <a:blip r:embed="rId10" cstate="print"/>
           <a:srcRect l="23529" r="20000"/>
           <a:stretch>
             <a:fillRect/>
@@ -9948,12 +10770,12 @@
           <a:graphicData uri="http://schemas.openxmlformats.org/presentationml/2006/ole">
             <mc:AlternateContent xmlns:mc="http://schemas.openxmlformats.org/markup-compatibility/2006">
               <mc:Choice xmlns:v="urn:schemas-microsoft-com:vml" Requires="v">
-                <p:oleObj spid="_x0000_s124560" name="Equation" r:id="rId3" imgW="2095500" imgH="2133600" progId="Equation.3">
+                <p:oleObj spid="_x0000_s124632" name="Equation" r:id="rId4" imgW="2095500" imgH="2133600" progId="Equation.3">
                   <p:embed/>
                 </p:oleObj>
               </mc:Choice>
               <mc:Fallback>
-                <p:oleObj name="Equation" r:id="rId3" imgW="2095500" imgH="2133600" progId="Equation.3">
+                <p:oleObj name="Equation" r:id="rId4" imgW="2095500" imgH="2133600" progId="Equation.3">
                   <p:embed/>
                   <p:pic>
                     <p:nvPicPr>
@@ -9964,7 +10786,7 @@
                       <p:nvPr/>
                     </p:nvPicPr>
                     <p:blipFill>
-                      <a:blip r:embed="rId4">
+                      <a:blip r:embed="rId5">
                         <a:extLst>
                           <a:ext uri="{28A0092B-C50C-407E-A947-70E740481C1C}">
                             <a14:useLocalDpi xmlns:a14="http://schemas.microsoft.com/office/drawing/2010/main" val="0"/>
@@ -10018,12 +10840,12 @@
           <a:graphicData uri="http://schemas.openxmlformats.org/presentationml/2006/ole">
             <mc:AlternateContent xmlns:mc="http://schemas.openxmlformats.org/markup-compatibility/2006">
               <mc:Choice xmlns:v="urn:schemas-microsoft-com:vml" Requires="v">
-                <p:oleObj spid="_x0000_s124561" name="Equation" r:id="rId5" imgW="1371600" imgH="342900" progId="Equation.3">
+                <p:oleObj spid="_x0000_s124633" name="Equation" r:id="rId6" imgW="1371600" imgH="342900" progId="Equation.3">
                   <p:embed/>
                 </p:oleObj>
               </mc:Choice>
               <mc:Fallback>
-                <p:oleObj name="Equation" r:id="rId5" imgW="1371600" imgH="342900" progId="Equation.3">
+                <p:oleObj name="Equation" r:id="rId6" imgW="1371600" imgH="342900" progId="Equation.3">
                   <p:embed/>
                   <p:pic>
                     <p:nvPicPr>
@@ -10034,7 +10856,7 @@
                       <p:nvPr/>
                     </p:nvPicPr>
                     <p:blipFill>
-                      <a:blip r:embed="rId6">
+                      <a:blip r:embed="rId7">
                         <a:extLst>
                           <a:ext uri="{28A0092B-C50C-407E-A947-70E740481C1C}">
                             <a14:useLocalDpi xmlns:a14="http://schemas.microsoft.com/office/drawing/2010/main" val="0"/>
@@ -10096,12 +10918,12 @@
           <a:graphicData uri="http://schemas.openxmlformats.org/presentationml/2006/ole">
             <mc:AlternateContent xmlns:mc="http://schemas.openxmlformats.org/markup-compatibility/2006">
               <mc:Choice xmlns:v="urn:schemas-microsoft-com:vml" Requires="v">
-                <p:oleObj spid="_x0000_s124562" name="Equation" r:id="rId7" imgW="710891" imgH="203112" progId="Equation.3">
+                <p:oleObj spid="_x0000_s124634" name="Equation" r:id="rId8" imgW="710891" imgH="203112" progId="Equation.3">
                   <p:embed/>
                 </p:oleObj>
               </mc:Choice>
               <mc:Fallback>
-                <p:oleObj name="Equation" r:id="rId7" imgW="710891" imgH="203112" progId="Equation.3">
+                <p:oleObj name="Equation" r:id="rId8" imgW="710891" imgH="203112" progId="Equation.3">
                   <p:embed/>
                   <p:pic>
                     <p:nvPicPr>
@@ -10112,7 +10934,7 @@
                       <p:nvPr/>
                     </p:nvPicPr>
                     <p:blipFill>
-                      <a:blip r:embed="rId8">
+                      <a:blip r:embed="rId9">
                         <a:extLst>
                           <a:ext uri="{28A0092B-C50C-407E-A947-70E740481C1C}">
                             <a14:useLocalDpi xmlns:a14="http://schemas.microsoft.com/office/drawing/2010/main" val="0"/>
@@ -10167,7 +10989,7 @@
           <p:nvPr/>
         </p:nvPicPr>
         <p:blipFill>
-          <a:blip r:embed="rId9" cstate="print"/>
+          <a:blip r:embed="rId10" cstate="print"/>
           <a:srcRect/>
           <a:stretch>
             <a:fillRect/>
@@ -10987,7 +11809,7 @@
           <a:graphicData uri="http://schemas.openxmlformats.org/presentationml/2006/ole">
             <mc:AlternateContent xmlns:mc="http://schemas.openxmlformats.org/markup-compatibility/2006">
               <mc:Choice xmlns:v="urn:schemas-microsoft-com:vml" Requires="v">
-                <p:oleObj spid="_x0000_s116956" name="Equation" r:id="rId3" imgW="2667000" imgH="228600" progId="Equation.3">
+                <p:oleObj spid="_x0000_s116980" name="Equation" r:id="rId3" imgW="2667000" imgH="228600" progId="Equation.3">
                   <p:embed/>
                 </p:oleObj>
               </mc:Choice>
@@ -12247,7 +13069,7 @@
           <p:nvPr>
             <p:extLst>
               <p:ext uri="{D42A27DB-BD31-4B8C-83A1-F6EECF244321}">
-                <p14:modId xmlns:p14="http://schemas.microsoft.com/office/powerpoint/2010/main" val="1506354036"/>
+                <p14:modId xmlns:p14="http://schemas.microsoft.com/office/powerpoint/2010/main" val="390549813"/>
               </p:ext>
             </p:extLst>
           </p:nvPr>
@@ -13542,7 +14364,7 @@
                     <a:p>
                       <a:pPr algn="ctr"/>
                       <a:r>
-                        <a:rPr lang="en-US" sz="1400"/>
+                        <a:rPr lang="en-US" sz="1400" dirty="0"/>
                         <a:t>0</a:t>
                       </a:r>
                     </a:p>
@@ -13556,7 +14378,7 @@
                     <a:p>
                       <a:pPr algn="ctr"/>
                       <a:r>
-                        <a:rPr lang="en-US" sz="1400"/>
+                        <a:rPr lang="en-US" sz="1400" dirty="0"/>
                         <a:t>0</a:t>
                       </a:r>
                     </a:p>
@@ -13631,7 +14453,9 @@
                       </a:r>
                     </a:p>
                   </a:txBody>
-                  <a:tcPr marL="23628" marR="23628" marT="11814" marB="11814" anchor="b"/>
+                  <a:tcPr marL="23628" marR="23628" marT="11814" marB="11814" anchor="b">
+                    <a:noFill/>
+                  </a:tcPr>
                 </a:tc>
                 <a:tc>
                   <a:txBody>
@@ -13668,7 +14492,7 @@
                     <a:p>
                       <a:pPr algn="ctr"/>
                       <a:r>
-                        <a:rPr lang="en-US" sz="1400"/>
+                        <a:rPr lang="en-US" sz="1400" dirty="0"/>
                         <a:t>0.1</a:t>
                       </a:r>
                     </a:p>
@@ -13883,12 +14707,14 @@
                     <a:p>
                       <a:pPr algn="ctr"/>
                       <a:r>
-                        <a:rPr lang="en-US" sz="1400"/>
+                        <a:rPr lang="en-US" sz="1400" dirty="0"/>
                         <a:t>0</a:t>
                       </a:r>
                     </a:p>
                   </a:txBody>
-                  <a:tcPr marL="23628" marR="23628" marT="11814" marB="11814" anchor="b"/>
+                  <a:tcPr marL="23628" marR="23628" marT="11814" marB="11814" anchor="b">
+                    <a:noFill/>
+                  </a:tcPr>
                 </a:tc>
                 <a:tc>
                   <a:txBody>
@@ -14140,12 +14966,14 @@
                     <a:p>
                       <a:pPr algn="ctr"/>
                       <a:r>
-                        <a:rPr lang="en-US" sz="1400"/>
+                        <a:rPr lang="en-US" sz="1400" dirty="0"/>
                         <a:t>0</a:t>
                       </a:r>
                     </a:p>
                   </a:txBody>
-                  <a:tcPr marL="23628" marR="23628" marT="11814" marB="11814" anchor="b"/>
+                  <a:tcPr marL="23628" marR="23628" marT="11814" marB="11814" anchor="b">
+                    <a:noFill/>
+                  </a:tcPr>
                 </a:tc>
                 <a:tc>
                   <a:txBody>
@@ -14182,7 +15010,7 @@
                     <a:p>
                       <a:pPr algn="ctr"/>
                       <a:r>
-                        <a:rPr lang="en-US" sz="1400"/>
+                        <a:rPr lang="en-US" sz="1400" dirty="0"/>
                         <a:t>0.3</a:t>
                       </a:r>
                     </a:p>
@@ -14196,7 +15024,7 @@
                     <a:p>
                       <a:pPr algn="ctr"/>
                       <a:r>
-                        <a:rPr lang="en-US" sz="1400"/>
+                        <a:rPr lang="en-US" sz="1400" dirty="0"/>
                         <a:t>0.1</a:t>
                       </a:r>
                     </a:p>
@@ -14402,7 +15230,9 @@
                       </a:r>
                     </a:p>
                   </a:txBody>
-                  <a:tcPr marL="23628" marR="23628" marT="11814" marB="11814" anchor="b"/>
+                  <a:tcPr marL="23628" marR="23628" marT="11814" marB="11814" anchor="b">
+                    <a:noFill/>
+                  </a:tcPr>
                 </a:tc>
                 <a:tc>
                   <a:txBody>
@@ -14453,7 +15283,7 @@
                     <a:p>
                       <a:pPr algn="ctr"/>
                       <a:r>
-                        <a:rPr lang="en-US" sz="1400"/>
+                        <a:rPr lang="en-US" sz="1400" dirty="0"/>
                         <a:t>0.1</a:t>
                       </a:r>
                     </a:p>
@@ -14467,7 +15297,7 @@
                     <a:p>
                       <a:pPr algn="ctr"/>
                       <a:r>
-                        <a:rPr lang="en-US" sz="1400"/>
+                        <a:rPr lang="en-US" sz="1400" dirty="0"/>
                         <a:t>0.1</a:t>
                       </a:r>
                     </a:p>
@@ -14493,7 +15323,9 @@
                       </a:r>
                     </a:p>
                   </a:txBody>
-                  <a:tcPr marL="23628" marR="23628" marT="11814" marB="11814" anchor="b"/>
+                  <a:tcPr marL="23628" marR="23628" marT="11814" marB="11814" anchor="b">
+                    <a:noFill/>
+                  </a:tcPr>
                 </a:tc>
                 <a:tc>
                   <a:txBody>
@@ -14507,7 +15339,105 @@
                       </a:r>
                     </a:p>
                   </a:txBody>
-                  <a:tcPr marL="23628" marR="23628" marT="11814" marB="11814" anchor="b"/>
+                  <a:tcPr marL="23628" marR="23628" marT="11814" marB="11814" anchor="b">
+                    <a:noFill/>
+                  </a:tcPr>
+                </a:tc>
+                <a:tc>
+                  <a:txBody>
+                    <a:bodyPr/>
+                    <a:lstStyle/>
+                    <a:p>
+                      <a:pPr algn="ctr"/>
+                      <a:r>
+                        <a:rPr lang="en-US" sz="1400" dirty="0"/>
+                        <a:t>0</a:t>
+                      </a:r>
+                    </a:p>
+                  </a:txBody>
+                  <a:tcPr marL="23628" marR="23628" marT="11814" marB="11814" anchor="b">
+                    <a:noFill/>
+                  </a:tcPr>
+                </a:tc>
+                <a:tc>
+                  <a:txBody>
+                    <a:bodyPr/>
+                    <a:lstStyle/>
+                    <a:p>
+                      <a:pPr algn="ctr"/>
+                      <a:r>
+                        <a:rPr lang="en-US" sz="1400" dirty="0"/>
+                        <a:t>1</a:t>
+                      </a:r>
+                    </a:p>
+                  </a:txBody>
+                  <a:tcPr marL="23628" marR="23628" marT="11814" marB="11814" anchor="b">
+                    <a:noFill/>
+                  </a:tcPr>
+                </a:tc>
+                <a:tc>
+                  <a:txBody>
+                    <a:bodyPr/>
+                    <a:lstStyle/>
+                    <a:p>
+                      <a:pPr algn="ctr"/>
+                      <a:r>
+                        <a:rPr lang="en-US" sz="1400"/>
+                        <a:t>0.3</a:t>
+                      </a:r>
+                    </a:p>
+                  </a:txBody>
+                  <a:tcPr marL="23628" marR="23628" marT="11814" marB="11814" anchor="b">
+                    <a:noFill/>
+                  </a:tcPr>
+                </a:tc>
+                <a:tc>
+                  <a:txBody>
+                    <a:bodyPr/>
+                    <a:lstStyle/>
+                    <a:p>
+                      <a:pPr algn="ctr"/>
+                      <a:r>
+                        <a:rPr lang="en-US" sz="1400"/>
+                        <a:t>0.1</a:t>
+                      </a:r>
+                    </a:p>
+                  </a:txBody>
+                  <a:tcPr marL="23628" marR="23628" marT="11814" marB="11814" anchor="b">
+                    <a:noFill/>
+                  </a:tcPr>
+                </a:tc>
+                <a:tc>
+                  <a:txBody>
+                    <a:bodyPr/>
+                    <a:lstStyle/>
+                    <a:p>
+                      <a:pPr algn="ctr"/>
+                      <a:r>
+                        <a:rPr lang="en-US" sz="1400"/>
+                        <a:t>0.1</a:t>
+                      </a:r>
+                    </a:p>
+                  </a:txBody>
+                  <a:tcPr marL="23628" marR="23628" marT="11814" marB="11814" anchor="b">
+                    <a:noFill/>
+                  </a:tcPr>
+                </a:tc>
+                <a:tc>
+                  <a:txBody>
+                    <a:bodyPr/>
+                    <a:lstStyle/>
+                    <a:p>
+                      <a:pPr algn="ctr"/>
+                      <a:r>
+                        <a:rPr lang="en-US" sz="1400"/>
+                        <a:t>0.3</a:t>
+                      </a:r>
+                    </a:p>
+                  </a:txBody>
+                  <a:tcPr marL="23628" marR="23628" marT="11814" marB="11814" anchor="b">
+                    <a:noFill/>
+                  </a:tcPr>
                 </a:tc>
                 <a:tc>
                   <a:txBody>
@@ -14521,7 +15451,9 @@
                       </a:r>
                     </a:p>
                   </a:txBody>
-                  <a:tcPr marL="23628" marR="23628" marT="11814" marB="11814" anchor="b"/>
+                  <a:tcPr marL="23628" marR="23628" marT="11814" marB="11814" anchor="b">
+                    <a:noFill/>
+                  </a:tcPr>
                 </a:tc>
                 <a:tc>
                   <a:txBody>
@@ -14530,12 +15462,14 @@
                     <a:p>
                       <a:pPr algn="ctr"/>
                       <a:r>
-                        <a:rPr lang="en-US" sz="1400" dirty="0"/>
-                        <a:t>1</a:t>
+                        <a:rPr lang="en-US" sz="1400"/>
+                        <a:t>0</a:t>
                       </a:r>
                     </a:p>
                   </a:txBody>
-                  <a:tcPr marL="23628" marR="23628" marT="11814" marB="11814" anchor="b"/>
+                  <a:tcPr marL="23628" marR="23628" marT="11814" marB="11814" anchor="b">
+                    <a:noFill/>
+                  </a:tcPr>
                 </a:tc>
                 <a:tc>
                   <a:txBody>
@@ -14549,7 +15483,73 @@
                       </a:r>
                     </a:p>
                   </a:txBody>
-                  <a:tcPr marL="23628" marR="23628" marT="11814" marB="11814" anchor="b"/>
+                  <a:tcPr marL="23628" marR="23628" marT="11814" marB="11814" anchor="b">
+                    <a:noFill/>
+                  </a:tcPr>
+                </a:tc>
+                <a:tc>
+                  <a:txBody>
+                    <a:bodyPr/>
+                    <a:lstStyle/>
+                    <a:p>
+                      <a:pPr algn="ctr"/>
+                      <a:r>
+                        <a:rPr lang="en-US" sz="1400" dirty="0"/>
+                        <a:t>0</a:t>
+                      </a:r>
+                    </a:p>
+                  </a:txBody>
+                  <a:tcPr marL="23628" marR="23628" marT="11814" marB="11814" anchor="b">
+                    <a:noFill/>
+                  </a:tcPr>
+                </a:tc>
+                <a:tc>
+                  <a:txBody>
+                    <a:bodyPr/>
+                    <a:lstStyle/>
+                    <a:p>
+                      <a:pPr algn="ctr"/>
+                      <a:r>
+                        <a:rPr lang="en-US" sz="1400"/>
+                        <a:t>1</a:t>
+                      </a:r>
+                    </a:p>
+                  </a:txBody>
+                  <a:tcPr marL="23628" marR="23628" marT="11814" marB="11814" anchor="b">
+                    <a:noFill/>
+                  </a:tcPr>
+                </a:tc>
+                <a:tc>
+                  <a:txBody>
+                    <a:bodyPr/>
+                    <a:lstStyle/>
+                    <a:p>
+                      <a:pPr algn="ctr"/>
+                      <a:r>
+                        <a:rPr lang="en-US" sz="1400"/>
+                        <a:t>+0.1</a:t>
+                      </a:r>
+                    </a:p>
+                  </a:txBody>
+                  <a:tcPr marL="23628" marR="23628" marT="11814" marB="11814" anchor="b">
+                    <a:noFill/>
+                  </a:tcPr>
+                </a:tc>
+                <a:tc>
+                  <a:txBody>
+                    <a:bodyPr/>
+                    <a:lstStyle/>
+                    <a:p>
+                      <a:pPr algn="ctr"/>
+                      <a:r>
+                        <a:rPr lang="en-US" sz="1400" dirty="0"/>
+                        <a:t>0.4</a:t>
+                      </a:r>
+                    </a:p>
+                  </a:txBody>
+                  <a:tcPr marL="23628" marR="23628" marT="11814" marB="11814" anchor="b">
+                    <a:noFill/>
+                  </a:tcPr>
                 </a:tc>
                 <a:tc>
                   <a:txBody>
@@ -14563,147 +15563,9 @@
                       </a:r>
                     </a:p>
                   </a:txBody>
-                  <a:tcPr marL="23628" marR="23628" marT="11814" marB="11814" anchor="b"/>
-                </a:tc>
-                <a:tc>
-                  <a:txBody>
-                    <a:bodyPr/>
-                    <a:lstStyle/>
-                    <a:p>
-                      <a:pPr algn="ctr"/>
-                      <a:r>
-                        <a:rPr lang="en-US" sz="1400"/>
-                        <a:t>0.1</a:t>
-                      </a:r>
-                    </a:p>
-                  </a:txBody>
-                  <a:tcPr marL="23628" marR="23628" marT="11814" marB="11814" anchor="b"/>
-                </a:tc>
-                <a:tc>
-                  <a:txBody>
-                    <a:bodyPr/>
-                    <a:lstStyle/>
-                    <a:p>
-                      <a:pPr algn="ctr"/>
-                      <a:r>
-                        <a:rPr lang="en-US" sz="1400"/>
-                        <a:t>0.3</a:t>
-                      </a:r>
-                    </a:p>
-                  </a:txBody>
-                  <a:tcPr marL="23628" marR="23628" marT="11814" marB="11814" anchor="b"/>
-                </a:tc>
-                <a:tc>
-                  <a:txBody>
-                    <a:bodyPr/>
-                    <a:lstStyle/>
-                    <a:p>
-                      <a:pPr algn="ctr"/>
-                      <a:r>
-                        <a:rPr lang="en-US" sz="1400"/>
-                        <a:t>0</a:t>
-                      </a:r>
-                    </a:p>
-                  </a:txBody>
-                  <a:tcPr marL="23628" marR="23628" marT="11814" marB="11814" anchor="b"/>
-                </a:tc>
-                <a:tc>
-                  <a:txBody>
-                    <a:bodyPr/>
-                    <a:lstStyle/>
-                    <a:p>
-                      <a:pPr algn="ctr"/>
-                      <a:r>
-                        <a:rPr lang="en-US" sz="1400"/>
-                        <a:t>0</a:t>
-                      </a:r>
-                    </a:p>
-                  </a:txBody>
-                  <a:tcPr marL="23628" marR="23628" marT="11814" marB="11814" anchor="b"/>
-                </a:tc>
-                <a:tc>
-                  <a:txBody>
-                    <a:bodyPr/>
-                    <a:lstStyle/>
-                    <a:p>
-                      <a:pPr algn="ctr"/>
-                      <a:r>
-                        <a:rPr lang="en-US" sz="1400"/>
-                        <a:t>0.3</a:t>
-                      </a:r>
-                    </a:p>
-                  </a:txBody>
-                  <a:tcPr marL="23628" marR="23628" marT="11814" marB="11814" anchor="b"/>
-                </a:tc>
-                <a:tc>
-                  <a:txBody>
-                    <a:bodyPr/>
-                    <a:lstStyle/>
-                    <a:p>
-                      <a:pPr algn="ctr"/>
-                      <a:r>
-                        <a:rPr lang="en-US" sz="1400" dirty="0"/>
-                        <a:t>0</a:t>
-                      </a:r>
-                    </a:p>
-                  </a:txBody>
-                  <a:tcPr marL="23628" marR="23628" marT="11814" marB="11814" anchor="b"/>
-                </a:tc>
-                <a:tc>
-                  <a:txBody>
-                    <a:bodyPr/>
-                    <a:lstStyle/>
-                    <a:p>
-                      <a:pPr algn="ctr"/>
-                      <a:r>
-                        <a:rPr lang="en-US" sz="1400"/>
-                        <a:t>1</a:t>
-                      </a:r>
-                    </a:p>
-                  </a:txBody>
-                  <a:tcPr marL="23628" marR="23628" marT="11814" marB="11814" anchor="b"/>
-                </a:tc>
-                <a:tc>
-                  <a:txBody>
-                    <a:bodyPr/>
-                    <a:lstStyle/>
-                    <a:p>
-                      <a:pPr algn="ctr"/>
-                      <a:r>
-                        <a:rPr lang="en-US" sz="1400"/>
-                        <a:t>+0.1</a:t>
-                      </a:r>
-                    </a:p>
-                  </a:txBody>
-                  <a:tcPr marL="23628" marR="23628" marT="11814" marB="11814" anchor="b"/>
-                </a:tc>
-                <a:tc>
-                  <a:txBody>
-                    <a:bodyPr/>
-                    <a:lstStyle/>
-                    <a:p>
-                      <a:pPr algn="ctr"/>
-                      <a:r>
-                        <a:rPr lang="en-US" sz="1400" dirty="0"/>
-                        <a:t>0.4</a:t>
-                      </a:r>
-                    </a:p>
-                  </a:txBody>
-                  <a:tcPr marL="23628" marR="23628" marT="11814" marB="11814" anchor="b"/>
-                </a:tc>
-                <a:tc>
-                  <a:txBody>
-                    <a:bodyPr/>
-                    <a:lstStyle/>
-                    <a:p>
-                      <a:pPr algn="ctr"/>
-                      <a:r>
-                        <a:rPr lang="en-US" sz="1400"/>
-                        <a:t>0.1</a:t>
-                      </a:r>
-                    </a:p>
-                  </a:txBody>
-                  <a:tcPr marL="23628" marR="23628" marT="11814" marB="11814" anchor="b"/>
+                  <a:tcPr marL="23628" marR="23628" marT="11814" marB="11814" anchor="b">
+                    <a:noFill/>
+                  </a:tcPr>
                 </a:tc>
                 <a:tc>
                   <a:txBody>
@@ -14717,7 +15579,9 @@
                       </a:r>
                     </a:p>
                   </a:txBody>
-                  <a:tcPr marL="23628" marR="23628" marT="11814" marB="11814" anchor="b"/>
+                  <a:tcPr marL="23628" marR="23628" marT="11814" marB="11814" anchor="b">
+                    <a:noFill/>
+                  </a:tcPr>
                 </a:tc>
                 <a:extLst>
                   <a:ext uri="{0D108BD9-81ED-4DB2-BD59-A6C34878D82A}">
@@ -14738,7 +15602,121 @@
                       </a:r>
                     </a:p>
                   </a:txBody>
-                  <a:tcPr marL="23628" marR="23628" marT="11814" marB="11814" anchor="b"/>
+                  <a:tcPr marL="23628" marR="23628" marT="11814" marB="11814" anchor="b">
+                    <a:noFill/>
+                  </a:tcPr>
+                </a:tc>
+                <a:tc>
+                  <a:txBody>
+                    <a:bodyPr/>
+                    <a:lstStyle/>
+                    <a:p>
+                      <a:pPr algn="ctr"/>
+                      <a:r>
+                        <a:rPr lang="en-US" sz="1400" dirty="0"/>
+                        <a:t>0</a:t>
+                      </a:r>
+                    </a:p>
+                  </a:txBody>
+                  <a:tcPr marL="23628" marR="23628" marT="11814" marB="11814" anchor="b">
+                    <a:noFill/>
+                  </a:tcPr>
+                </a:tc>
+                <a:tc>
+                  <a:txBody>
+                    <a:bodyPr/>
+                    <a:lstStyle/>
+                    <a:p>
+                      <a:pPr algn="ctr"/>
+                      <a:r>
+                        <a:rPr lang="en-US" sz="1400" dirty="0"/>
+                        <a:t>1</a:t>
+                      </a:r>
+                    </a:p>
+                  </a:txBody>
+                  <a:tcPr marL="23628" marR="23628" marT="11814" marB="11814" anchor="b">
+                    <a:noFill/>
+                  </a:tcPr>
+                </a:tc>
+                <a:tc>
+                  <a:txBody>
+                    <a:bodyPr/>
+                    <a:lstStyle/>
+                    <a:p>
+                      <a:pPr algn="ctr"/>
+                      <a:r>
+                        <a:rPr lang="en-US" sz="1400" dirty="0"/>
+                        <a:t>1</a:t>
+                      </a:r>
+                    </a:p>
+                  </a:txBody>
+                  <a:tcPr marL="23628" marR="23628" marT="11814" marB="11814" anchor="b">
+                    <a:noFill/>
+                  </a:tcPr>
+                </a:tc>
+                <a:tc>
+                  <a:txBody>
+                    <a:bodyPr/>
+                    <a:lstStyle/>
+                    <a:p>
+                      <a:pPr algn="ctr"/>
+                      <a:r>
+                        <a:rPr lang="en-US" sz="1400" dirty="0"/>
+                        <a:t>0.4</a:t>
+                      </a:r>
+                    </a:p>
+                  </a:txBody>
+                  <a:tcPr marL="23628" marR="23628" marT="11814" marB="11814" anchor="b">
+                    <a:noFill/>
+                  </a:tcPr>
+                </a:tc>
+                <a:tc>
+                  <a:txBody>
+                    <a:bodyPr/>
+                    <a:lstStyle/>
+                    <a:p>
+                      <a:pPr algn="ctr"/>
+                      <a:r>
+                        <a:rPr lang="en-US" sz="1400"/>
+                        <a:t>0.1</a:t>
+                      </a:r>
+                    </a:p>
+                  </a:txBody>
+                  <a:tcPr marL="23628" marR="23628" marT="11814" marB="11814" anchor="b">
+                    <a:noFill/>
+                  </a:tcPr>
+                </a:tc>
+                <a:tc>
+                  <a:txBody>
+                    <a:bodyPr/>
+                    <a:lstStyle/>
+                    <a:p>
+                      <a:pPr algn="ctr"/>
+                      <a:r>
+                        <a:rPr lang="en-US" sz="1400"/>
+                        <a:t>0.1</a:t>
+                      </a:r>
+                    </a:p>
+                  </a:txBody>
+                  <a:tcPr marL="23628" marR="23628" marT="11814" marB="11814" anchor="b">
+                    <a:noFill/>
+                  </a:tcPr>
+                </a:tc>
+                <a:tc>
+                  <a:txBody>
+                    <a:bodyPr/>
+                    <a:lstStyle/>
+                    <a:p>
+                      <a:pPr algn="ctr"/>
+                      <a:r>
+                        <a:rPr lang="en-US" sz="1400" dirty="0"/>
+                        <a:t>0.4</a:t>
+                      </a:r>
+                    </a:p>
+                  </a:txBody>
+                  <a:tcPr marL="23628" marR="23628" marT="11814" marB="11814" anchor="b">
+                    <a:noFill/>
+                  </a:tcPr>
                 </a:tc>
                 <a:tc>
                   <a:txBody>
@@ -14752,7 +15730,57 @@
                       </a:r>
                     </a:p>
                   </a:txBody>
-                  <a:tcPr marL="23628" marR="23628" marT="11814" marB="11814" anchor="b"/>
+                  <a:tcPr marL="23628" marR="23628" marT="11814" marB="11814" anchor="b">
+                    <a:noFill/>
+                  </a:tcPr>
+                </a:tc>
+                <a:tc>
+                  <a:txBody>
+                    <a:bodyPr/>
+                    <a:lstStyle/>
+                    <a:p>
+                      <a:pPr algn="ctr"/>
+                      <a:r>
+                        <a:rPr lang="en-US" sz="1400"/>
+                        <a:t>0.1</a:t>
+                      </a:r>
+                    </a:p>
+                  </a:txBody>
+                  <a:tcPr marL="23628" marR="23628" marT="11814" marB="11814" anchor="b">
+                    <a:noFill/>
+                  </a:tcPr>
+                </a:tc>
+                <a:tc>
+                  <a:txBody>
+                    <a:bodyPr/>
+                    <a:lstStyle/>
+                    <a:p>
+                      <a:pPr algn="ctr"/>
+                      <a:r>
+                        <a:rPr lang="en-US" sz="1400"/>
+                        <a:t>0.5</a:t>
+                      </a:r>
+                    </a:p>
+                  </a:txBody>
+                  <a:tcPr marL="23628" marR="23628" marT="11814" marB="11814" anchor="b">
+                    <a:noFill/>
+                  </a:tcPr>
+                </a:tc>
+                <a:tc>
+                  <a:txBody>
+                    <a:bodyPr/>
+                    <a:lstStyle/>
+                    <a:p>
+                      <a:pPr algn="ctr"/>
+                      <a:r>
+                        <a:rPr lang="en-US" sz="1400"/>
+                        <a:t>0</a:t>
+                      </a:r>
+                    </a:p>
+                  </a:txBody>
+                  <a:tcPr marL="23628" marR="23628" marT="11814" marB="11814" anchor="b">
+                    <a:noFill/>
+                  </a:tcPr>
                 </a:tc>
                 <a:tc>
                   <a:txBody>
@@ -14766,7 +15794,25 @@
                       </a:r>
                     </a:p>
                   </a:txBody>
-                  <a:tcPr marL="23628" marR="23628" marT="11814" marB="11814" anchor="b"/>
+                  <a:tcPr marL="23628" marR="23628" marT="11814" marB="11814" anchor="b">
+                    <a:noFill/>
+                  </a:tcPr>
+                </a:tc>
+                <a:tc>
+                  <a:txBody>
+                    <a:bodyPr/>
+                    <a:lstStyle/>
+                    <a:p>
+                      <a:pPr algn="ctr"/>
+                      <a:r>
+                        <a:rPr lang="en-US" sz="1400"/>
+                        <a:t>+0.1</a:t>
+                      </a:r>
+                    </a:p>
+                  </a:txBody>
+                  <a:tcPr marL="23628" marR="23628" marT="11814" marB="11814" anchor="b">
+                    <a:noFill/>
+                  </a:tcPr>
                 </a:tc>
                 <a:tc>
                   <a:txBody>
@@ -14776,25 +15822,13 @@
                       <a:pPr algn="ctr"/>
                       <a:r>
                         <a:rPr lang="en-US" sz="1400" dirty="0"/>
-                        <a:t>1</a:t>
+                        <a:t>0.5</a:t>
                       </a:r>
                     </a:p>
                   </a:txBody>
-                  <a:tcPr marL="23628" marR="23628" marT="11814" marB="11814" anchor="b"/>
-                </a:tc>
-                <a:tc>
-                  <a:txBody>
-                    <a:bodyPr/>
-                    <a:lstStyle/>
-                    <a:p>
-                      <a:pPr algn="ctr"/>
-                      <a:r>
-                        <a:rPr lang="en-US" sz="1400"/>
-                        <a:t>0.4</a:t>
-                      </a:r>
-                    </a:p>
-                  </a:txBody>
-                  <a:tcPr marL="23628" marR="23628" marT="11814" marB="11814" anchor="b"/>
+                  <a:tcPr marL="23628" marR="23628" marT="11814" marB="11814" anchor="b">
+                    <a:noFill/>
+                  </a:tcPr>
                 </a:tc>
                 <a:tc>
                   <a:txBody>
@@ -14808,147 +15842,9 @@
                       </a:r>
                     </a:p>
                   </a:txBody>
-                  <a:tcPr marL="23628" marR="23628" marT="11814" marB="11814" anchor="b"/>
-                </a:tc>
-                <a:tc>
-                  <a:txBody>
-                    <a:bodyPr/>
-                    <a:lstStyle/>
-                    <a:p>
-                      <a:pPr algn="ctr"/>
-                      <a:r>
-                        <a:rPr lang="en-US" sz="1400"/>
-                        <a:t>0.1</a:t>
-                      </a:r>
-                    </a:p>
-                  </a:txBody>
-                  <a:tcPr marL="23628" marR="23628" marT="11814" marB="11814" anchor="b"/>
-                </a:tc>
-                <a:tc>
-                  <a:txBody>
-                    <a:bodyPr/>
-                    <a:lstStyle/>
-                    <a:p>
-                      <a:pPr algn="ctr"/>
-                      <a:r>
-                        <a:rPr lang="en-US" sz="1400"/>
-                        <a:t>0.4</a:t>
-                      </a:r>
-                    </a:p>
-                  </a:txBody>
-                  <a:tcPr marL="23628" marR="23628" marT="11814" marB="11814" anchor="b"/>
-                </a:tc>
-                <a:tc>
-                  <a:txBody>
-                    <a:bodyPr/>
-                    <a:lstStyle/>
-                    <a:p>
-                      <a:pPr algn="ctr"/>
-                      <a:r>
-                        <a:rPr lang="en-US" sz="1400"/>
-                        <a:t>0</a:t>
-                      </a:r>
-                    </a:p>
-                  </a:txBody>
-                  <a:tcPr marL="23628" marR="23628" marT="11814" marB="11814" anchor="b"/>
-                </a:tc>
-                <a:tc>
-                  <a:txBody>
-                    <a:bodyPr/>
-                    <a:lstStyle/>
-                    <a:p>
-                      <a:pPr algn="ctr"/>
-                      <a:r>
-                        <a:rPr lang="en-US" sz="1400"/>
-                        <a:t>0.1</a:t>
-                      </a:r>
-                    </a:p>
-                  </a:txBody>
-                  <a:tcPr marL="23628" marR="23628" marT="11814" marB="11814" anchor="b"/>
-                </a:tc>
-                <a:tc>
-                  <a:txBody>
-                    <a:bodyPr/>
-                    <a:lstStyle/>
-                    <a:p>
-                      <a:pPr algn="ctr"/>
-                      <a:r>
-                        <a:rPr lang="en-US" sz="1400"/>
-                        <a:t>0.5</a:t>
-                      </a:r>
-                    </a:p>
-                  </a:txBody>
-                  <a:tcPr marL="23628" marR="23628" marT="11814" marB="11814" anchor="b"/>
-                </a:tc>
-                <a:tc>
-                  <a:txBody>
-                    <a:bodyPr/>
-                    <a:lstStyle/>
-                    <a:p>
-                      <a:pPr algn="ctr"/>
-                      <a:r>
-                        <a:rPr lang="en-US" sz="1400"/>
-                        <a:t>0</a:t>
-                      </a:r>
-                    </a:p>
-                  </a:txBody>
-                  <a:tcPr marL="23628" marR="23628" marT="11814" marB="11814" anchor="b"/>
-                </a:tc>
-                <a:tc>
-                  <a:txBody>
-                    <a:bodyPr/>
-                    <a:lstStyle/>
-                    <a:p>
-                      <a:pPr algn="ctr"/>
-                      <a:r>
-                        <a:rPr lang="en-US" sz="1400"/>
-                        <a:t>1</a:t>
-                      </a:r>
-                    </a:p>
-                  </a:txBody>
-                  <a:tcPr marL="23628" marR="23628" marT="11814" marB="11814" anchor="b"/>
-                </a:tc>
-                <a:tc>
-                  <a:txBody>
-                    <a:bodyPr/>
-                    <a:lstStyle/>
-                    <a:p>
-                      <a:pPr algn="ctr"/>
-                      <a:r>
-                        <a:rPr lang="en-US" sz="1400"/>
-                        <a:t>+0.1</a:t>
-                      </a:r>
-                    </a:p>
-                  </a:txBody>
-                  <a:tcPr marL="23628" marR="23628" marT="11814" marB="11814" anchor="b"/>
-                </a:tc>
-                <a:tc>
-                  <a:txBody>
-                    <a:bodyPr/>
-                    <a:lstStyle/>
-                    <a:p>
-                      <a:pPr algn="ctr"/>
-                      <a:r>
-                        <a:rPr lang="en-US" sz="1400" dirty="0"/>
-                        <a:t>0.5</a:t>
-                      </a:r>
-                    </a:p>
-                  </a:txBody>
-                  <a:tcPr marL="23628" marR="23628" marT="11814" marB="11814" anchor="b"/>
-                </a:tc>
-                <a:tc>
-                  <a:txBody>
-                    <a:bodyPr/>
-                    <a:lstStyle/>
-                    <a:p>
-                      <a:pPr algn="ctr"/>
-                      <a:r>
-                        <a:rPr lang="en-US" sz="1400"/>
-                        <a:t>0.1</a:t>
-                      </a:r>
-                    </a:p>
-                  </a:txBody>
-                  <a:tcPr marL="23628" marR="23628" marT="11814" marB="11814" anchor="b"/>
+                  <a:tcPr marL="23628" marR="23628" marT="11814" marB="11814" anchor="b">
+                    <a:noFill/>
+                  </a:tcPr>
                 </a:tc>
                 <a:tc>
                   <a:txBody>
@@ -14962,7 +15858,9 @@
                       </a:r>
                     </a:p>
                   </a:txBody>
-                  <a:tcPr marL="23628" marR="23628" marT="11814" marB="11814" anchor="b"/>
+                  <a:tcPr marL="23628" marR="23628" marT="11814" marB="11814" anchor="b">
+                    <a:noFill/>
+                  </a:tcPr>
                 </a:tc>
                 <a:extLst>
                   <a:ext uri="{0D108BD9-81ED-4DB2-BD59-A6C34878D82A}">
@@ -14983,7 +15881,9 @@
                       </a:r>
                     </a:p>
                   </a:txBody>
-                  <a:tcPr marL="23628" marR="23628" marT="11814" marB="11814" anchor="b"/>
+                  <a:tcPr marL="23628" marR="23628" marT="11814" marB="11814" anchor="b">
+                    <a:noFill/>
+                  </a:tcPr>
                 </a:tc>
                 <a:tc>
                   <a:txBody>
@@ -14997,7 +15897,9 @@
                       </a:r>
                     </a:p>
                   </a:txBody>
-                  <a:tcPr marL="23628" marR="23628" marT="11814" marB="11814" anchor="b"/>
+                  <a:tcPr marL="23628" marR="23628" marT="11814" marB="11814" anchor="b">
+                    <a:noFill/>
+                  </a:tcPr>
                 </a:tc>
                 <a:tc>
                   <a:txBody>
@@ -15011,7 +15913,9 @@
                       </a:r>
                     </a:p>
                   </a:txBody>
-                  <a:tcPr marL="23628" marR="23628" marT="11814" marB="11814" anchor="b"/>
+                  <a:tcPr marL="23628" marR="23628" marT="11814" marB="11814" anchor="b">
+                    <a:noFill/>
+                  </a:tcPr>
                 </a:tc>
                 <a:tc>
                   <a:txBody>
@@ -15020,12 +15924,14 @@
                     <a:p>
                       <a:pPr algn="ctr"/>
                       <a:r>
-                        <a:rPr lang="en-US" sz="1400"/>
+                        <a:rPr lang="en-US" sz="1400" dirty="0"/>
                         <a:t>1</a:t>
                       </a:r>
                     </a:p>
                   </a:txBody>
-                  <a:tcPr marL="23628" marR="23628" marT="11814" marB="11814" anchor="b"/>
+                  <a:tcPr marL="23628" marR="23628" marT="11814" marB="11814" anchor="b">
+                    <a:noFill/>
+                  </a:tcPr>
                 </a:tc>
                 <a:tc>
                   <a:txBody>
@@ -15039,7 +15945,9 @@
                       </a:r>
                     </a:p>
                   </a:txBody>
-                  <a:tcPr marL="23628" marR="23628" marT="11814" marB="11814" anchor="b"/>
+                  <a:tcPr marL="23628" marR="23628" marT="11814" marB="11814" anchor="b">
+                    <a:noFill/>
+                  </a:tcPr>
                 </a:tc>
                 <a:tc>
                   <a:txBody>
@@ -15053,7 +15961,9 @@
                       </a:r>
                     </a:p>
                   </a:txBody>
-                  <a:tcPr marL="23628" marR="23628" marT="11814" marB="11814" anchor="b"/>
+                  <a:tcPr marL="23628" marR="23628" marT="11814" marB="11814" anchor="b">
+                    <a:noFill/>
+                  </a:tcPr>
                 </a:tc>
                 <a:tc>
                   <a:txBody>
@@ -15067,7 +15977,9 @@
                       </a:r>
                     </a:p>
                   </a:txBody>
-                  <a:tcPr marL="23628" marR="23628" marT="11814" marB="11814" anchor="b"/>
+                  <a:tcPr marL="23628" marR="23628" marT="11814" marB="11814" anchor="b">
+                    <a:noFill/>
+                  </a:tcPr>
                 </a:tc>
                 <a:tc>
                   <a:txBody>
@@ -15081,7 +15993,9 @@
                       </a:r>
                     </a:p>
                   </a:txBody>
-                  <a:tcPr marL="23628" marR="23628" marT="11814" marB="11814" anchor="b"/>
+                  <a:tcPr marL="23628" marR="23628" marT="11814" marB="11814" anchor="b">
+                    <a:noFill/>
+                  </a:tcPr>
                 </a:tc>
                 <a:tc>
                   <a:txBody>
@@ -15095,7 +16009,9 @@
                       </a:r>
                     </a:p>
                   </a:txBody>
-                  <a:tcPr marL="23628" marR="23628" marT="11814" marB="11814" anchor="b"/>
+                  <a:tcPr marL="23628" marR="23628" marT="11814" marB="11814" anchor="b">
+                    <a:noFill/>
+                  </a:tcPr>
                 </a:tc>
                 <a:tc>
                   <a:txBody>
@@ -15109,7 +16025,9 @@
                       </a:r>
                     </a:p>
                   </a:txBody>
-                  <a:tcPr marL="23628" marR="23628" marT="11814" marB="11814" anchor="b"/>
+                  <a:tcPr marL="23628" marR="23628" marT="11814" marB="11814" anchor="b">
+                    <a:noFill/>
+                  </a:tcPr>
                 </a:tc>
                 <a:tc>
                   <a:txBody>
@@ -15118,12 +16036,14 @@
                     <a:p>
                       <a:pPr algn="ctr"/>
                       <a:r>
-                        <a:rPr lang="en-US" sz="1400"/>
+                        <a:rPr lang="en-US" sz="1400" dirty="0"/>
                         <a:t>0.6</a:t>
                       </a:r>
                     </a:p>
                   </a:txBody>
-                  <a:tcPr marL="23628" marR="23628" marT="11814" marB="11814" anchor="b"/>
+                  <a:tcPr marL="23628" marR="23628" marT="11814" marB="11814" anchor="b">
+                    <a:noFill/>
+                  </a:tcPr>
                 </a:tc>
                 <a:tc>
                   <a:txBody>
@@ -15132,12 +16052,14 @@
                     <a:p>
                       <a:pPr algn="ctr"/>
                       <a:r>
-                        <a:rPr lang="en-US" sz="1400"/>
+                        <a:rPr lang="en-US" sz="1400" dirty="0"/>
                         <a:t>1</a:t>
                       </a:r>
                     </a:p>
                   </a:txBody>
-                  <a:tcPr marL="23628" marR="23628" marT="11814" marB="11814" anchor="b"/>
+                  <a:tcPr marL="23628" marR="23628" marT="11814" marB="11814" anchor="b">
+                    <a:noFill/>
+                  </a:tcPr>
                 </a:tc>
                 <a:tc>
                   <a:txBody>
@@ -15146,12 +16068,14 @@
                     <a:p>
                       <a:pPr algn="ctr"/>
                       <a:r>
-                        <a:rPr lang="en-US" sz="1400"/>
+                        <a:rPr lang="en-US" sz="1400" dirty="0"/>
                         <a:t>0</a:t>
                       </a:r>
                     </a:p>
                   </a:txBody>
-                  <a:tcPr marL="23628" marR="23628" marT="11814" marB="11814" anchor="b"/>
+                  <a:tcPr marL="23628" marR="23628" marT="11814" marB="11814" anchor="b">
+                    <a:noFill/>
+                  </a:tcPr>
                 </a:tc>
                 <a:tc>
                   <a:txBody>
@@ -15160,12 +16084,14 @@
                     <a:p>
                       <a:pPr algn="ctr"/>
                       <a:r>
-                        <a:rPr lang="en-US" sz="1400"/>
+                        <a:rPr lang="en-US" sz="1400" dirty="0"/>
                         <a:t>0</a:t>
                       </a:r>
                     </a:p>
                   </a:txBody>
-                  <a:tcPr marL="23628" marR="23628" marT="11814" marB="11814" anchor="b"/>
+                  <a:tcPr marL="23628" marR="23628" marT="11814" marB="11814" anchor="b">
+                    <a:noFill/>
+                  </a:tcPr>
                 </a:tc>
                 <a:tc>
                   <a:txBody>
@@ -15179,7 +16105,9 @@
                       </a:r>
                     </a:p>
                   </a:txBody>
-                  <a:tcPr marL="23628" marR="23628" marT="11814" marB="11814" anchor="b"/>
+                  <a:tcPr marL="23628" marR="23628" marT="11814" marB="11814" anchor="b">
+                    <a:noFill/>
+                  </a:tcPr>
                 </a:tc>
                 <a:tc>
                   <a:txBody>
@@ -15194,7 +16122,9 @@
                       <a:endParaRPr lang="en-US" sz="1400" dirty="0"/>
                     </a:p>
                   </a:txBody>
-                  <a:tcPr marL="23628" marR="23628" marT="11814" marB="11814" anchor="b"/>
+                  <a:tcPr marL="23628" marR="23628" marT="11814" marB="11814" anchor="b">
+                    <a:noFill/>
+                  </a:tcPr>
                 </a:tc>
                 <a:tc>
                   <a:txBody>
@@ -15208,7 +16138,9 @@
                       </a:r>
                     </a:p>
                   </a:txBody>
-                  <a:tcPr marL="23628" marR="23628" marT="11814" marB="11814" anchor="b"/>
+                  <a:tcPr marL="23628" marR="23628" marT="11814" marB="11814" anchor="b">
+                    <a:noFill/>
+                  </a:tcPr>
                 </a:tc>
                 <a:extLst>
                   <a:ext uri="{0D108BD9-81ED-4DB2-BD59-A6C34878D82A}">
@@ -15229,7 +16161,9 @@
                       </a:r>
                     </a:p>
                   </a:txBody>
-                  <a:tcPr marL="23628" marR="23628" marT="11814" marB="11814" anchor="b"/>
+                  <a:tcPr marL="23628" marR="23628" marT="11814" marB="11814" anchor="b">
+                    <a:noFill/>
+                  </a:tcPr>
                 </a:tc>
                 <a:tc>
                   <a:txBody>
@@ -15243,7 +16177,9 @@
                       </a:r>
                     </a:p>
                   </a:txBody>
-                  <a:tcPr marL="23628" marR="23628" marT="11814" marB="11814" anchor="b"/>
+                  <a:tcPr marL="23628" marR="23628" marT="11814" marB="11814" anchor="b">
+                    <a:noFill/>
+                  </a:tcPr>
                 </a:tc>
                 <a:tc>
                   <a:txBody>
@@ -15257,7 +16193,9 @@
                       </a:r>
                     </a:p>
                   </a:txBody>
-                  <a:tcPr marL="23628" marR="23628" marT="11814" marB="11814" anchor="b"/>
+                  <a:tcPr marL="23628" marR="23628" marT="11814" marB="11814" anchor="b">
+                    <a:noFill/>
+                  </a:tcPr>
                 </a:tc>
                 <a:tc>
                   <a:txBody>
@@ -15266,12 +16204,14 @@
                     <a:p>
                       <a:pPr algn="ctr"/>
                       <a:r>
-                        <a:rPr lang="en-US" sz="1400"/>
+                        <a:rPr lang="en-US" sz="1400" dirty="0"/>
                         <a:t>0</a:t>
                       </a:r>
                     </a:p>
                   </a:txBody>
-                  <a:tcPr marL="23628" marR="23628" marT="11814" marB="11814" anchor="b"/>
+                  <a:tcPr marL="23628" marR="23628" marT="11814" marB="11814" anchor="b">
+                    <a:noFill/>
+                  </a:tcPr>
                 </a:tc>
                 <a:tc>
                   <a:txBody>
@@ -15280,12 +16220,14 @@
                     <a:p>
                       <a:pPr algn="ctr"/>
                       <a:r>
-                        <a:rPr lang="en-US" sz="1400"/>
+                        <a:rPr lang="en-US" sz="1400" dirty="0"/>
                         <a:t>0.5</a:t>
                       </a:r>
                     </a:p>
                   </a:txBody>
-                  <a:tcPr marL="23628" marR="23628" marT="11814" marB="11814" anchor="b"/>
+                  <a:tcPr marL="23628" marR="23628" marT="11814" marB="11814" anchor="b">
+                    <a:noFill/>
+                  </a:tcPr>
                 </a:tc>
                 <a:tc>
                   <a:txBody>
@@ -15294,54 +16236,14 @@
                     <a:p>
                       <a:pPr algn="ctr"/>
                       <a:r>
-                        <a:rPr lang="en-US" sz="1400"/>
+                        <a:rPr lang="en-US" sz="1400" dirty="0"/>
                         <a:t>0.1</a:t>
                       </a:r>
                     </a:p>
                   </a:txBody>
-                  <a:tcPr marL="23628" marR="23628" marT="11814" marB="11814" anchor="b"/>
-                </a:tc>
-                <a:tc>
-                  <a:txBody>
-                    <a:bodyPr/>
-                    <a:lstStyle/>
-                    <a:p>
-                      <a:pPr algn="ctr"/>
-                      <a:r>
-                        <a:rPr lang="en-US" sz="1400"/>
-                        <a:t>0.2</a:t>
-                      </a:r>
-                    </a:p>
-                  </a:txBody>
-                  <a:tcPr marL="23628" marR="23628" marT="11814" marB="11814" anchor="b"/>
-                </a:tc>
-                <a:tc>
-                  <a:txBody>
-                    <a:bodyPr/>
-                    <a:lstStyle/>
-                    <a:p>
-                      <a:pPr algn="ctr"/>
-                      <a:r>
-                        <a:rPr lang="en-US" sz="1400"/>
-                        <a:t>0.5</a:t>
-                      </a:r>
-                    </a:p>
-                  </a:txBody>
-                  <a:tcPr marL="23628" marR="23628" marT="11814" marB="11814" anchor="b"/>
-                </a:tc>
-                <a:tc>
-                  <a:txBody>
-                    <a:bodyPr/>
-                    <a:lstStyle/>
-                    <a:p>
-                      <a:pPr algn="ctr"/>
-                      <a:r>
-                        <a:rPr lang="en-US" sz="1400"/>
-                        <a:t>0.1</a:t>
-                      </a:r>
-                    </a:p>
-                  </a:txBody>
-                  <a:tcPr marL="23628" marR="23628" marT="11814" marB="11814" anchor="b"/>
+                  <a:tcPr marL="23628" marR="23628" marT="11814" marB="11814" anchor="b">
+                    <a:noFill/>
+                  </a:tcPr>
                 </a:tc>
                 <a:tc>
                   <a:txBody>
@@ -15355,7 +16257,9 @@
                       </a:r>
                     </a:p>
                   </a:txBody>
-                  <a:tcPr marL="23628" marR="23628" marT="11814" marB="11814" anchor="b"/>
+                  <a:tcPr marL="23628" marR="23628" marT="11814" marB="11814" anchor="b">
+                    <a:noFill/>
+                  </a:tcPr>
                 </a:tc>
                 <a:tc>
                   <a:txBody>
@@ -15364,12 +16268,62 @@
                     <a:p>
                       <a:pPr algn="ctr"/>
                       <a:r>
-                        <a:rPr lang="en-US" sz="1400"/>
+                        <a:rPr lang="en-US" sz="1400" dirty="0"/>
+                        <a:t>0.5</a:t>
+                      </a:r>
+                    </a:p>
+                  </a:txBody>
+                  <a:tcPr marL="23628" marR="23628" marT="11814" marB="11814" anchor="b">
+                    <a:noFill/>
+                  </a:tcPr>
+                </a:tc>
+                <a:tc>
+                  <a:txBody>
+                    <a:bodyPr/>
+                    <a:lstStyle/>
+                    <a:p>
+                      <a:pPr algn="ctr"/>
+                      <a:r>
+                        <a:rPr lang="en-US" sz="1400" dirty="0"/>
+                        <a:t>0.1</a:t>
+                      </a:r>
+                    </a:p>
+                  </a:txBody>
+                  <a:tcPr marL="23628" marR="23628" marT="11814" marB="11814" anchor="b">
+                    <a:noFill/>
+                  </a:tcPr>
+                </a:tc>
+                <a:tc>
+                  <a:txBody>
+                    <a:bodyPr/>
+                    <a:lstStyle/>
+                    <a:p>
+                      <a:pPr algn="ctr"/>
+                      <a:r>
+                        <a:rPr lang="en-US" sz="1400" dirty="0"/>
+                        <a:t>0.2</a:t>
+                      </a:r>
+                    </a:p>
+                  </a:txBody>
+                  <a:tcPr marL="23628" marR="23628" marT="11814" marB="11814" anchor="b">
+                    <a:noFill/>
+                  </a:tcPr>
+                </a:tc>
+                <a:tc>
+                  <a:txBody>
+                    <a:bodyPr/>
+                    <a:lstStyle/>
+                    <a:p>
+                      <a:pPr algn="ctr"/>
+                      <a:r>
+                        <a:rPr lang="en-US" sz="1400" dirty="0"/>
                         <a:t>0.8</a:t>
                       </a:r>
                     </a:p>
                   </a:txBody>
-                  <a:tcPr marL="23628" marR="23628" marT="11814" marB="11814" anchor="b"/>
+                  <a:tcPr marL="23628" marR="23628" marT="11814" marB="11814" anchor="b">
+                    <a:noFill/>
+                  </a:tcPr>
                 </a:tc>
                 <a:tc>
                   <a:txBody>
@@ -15383,7 +16337,9 @@
                       </a:r>
                     </a:p>
                   </a:txBody>
-                  <a:tcPr marL="23628" marR="23628" marT="11814" marB="11814" anchor="b"/>
+                  <a:tcPr marL="23628" marR="23628" marT="11814" marB="11814" anchor="b">
+                    <a:noFill/>
+                  </a:tcPr>
                 </a:tc>
                 <a:tc>
                   <a:txBody>
@@ -15397,7 +16353,9 @@
                       </a:r>
                     </a:p>
                   </a:txBody>
-                  <a:tcPr marL="23628" marR="23628" marT="11814" marB="11814" anchor="b"/>
+                  <a:tcPr marL="23628" marR="23628" marT="11814" marB="11814" anchor="b">
+                    <a:noFill/>
+                  </a:tcPr>
                 </a:tc>
                 <a:tc>
                   <a:txBody>
@@ -15406,12 +16364,14 @@
                     <a:p>
                       <a:pPr algn="ctr"/>
                       <a:r>
-                        <a:rPr lang="en-US" sz="1400"/>
+                        <a:rPr lang="en-US" sz="1400" dirty="0"/>
                         <a:t>-0.1</a:t>
                       </a:r>
                     </a:p>
                   </a:txBody>
-                  <a:tcPr marL="23628" marR="23628" marT="11814" marB="11814" anchor="b"/>
+                  <a:tcPr marL="23628" marR="23628" marT="11814" marB="11814" anchor="b">
+                    <a:noFill/>
+                  </a:tcPr>
                 </a:tc>
                 <a:tc>
                   <a:txBody>
@@ -15420,12 +16380,14 @@
                     <a:p>
                       <a:pPr algn="ctr"/>
                       <a:r>
-                        <a:rPr lang="en-US" sz="1400"/>
+                        <a:rPr lang="en-US" sz="1400" dirty="0"/>
                         <a:t>0.4</a:t>
                       </a:r>
                     </a:p>
                   </a:txBody>
-                  <a:tcPr marL="23628" marR="23628" marT="11814" marB="11814" anchor="b"/>
+                  <a:tcPr marL="23628" marR="23628" marT="11814" marB="11814" anchor="b">
+                    <a:noFill/>
+                  </a:tcPr>
                 </a:tc>
                 <a:tc>
                   <a:txBody>
@@ -15439,7 +16401,9 @@
                       </a:r>
                     </a:p>
                   </a:txBody>
-                  <a:tcPr marL="23628" marR="23628" marT="11814" marB="11814" anchor="b"/>
+                  <a:tcPr marL="23628" marR="23628" marT="11814" marB="11814" anchor="b">
+                    <a:noFill/>
+                  </a:tcPr>
                 </a:tc>
                 <a:tc>
                   <a:txBody>
@@ -15448,12 +16412,14 @@
                     <a:p>
                       <a:pPr algn="ctr"/>
                       <a:r>
-                        <a:rPr lang="en-US" sz="1400"/>
+                        <a:rPr lang="en-US" sz="1400" dirty="0"/>
                         <a:t>0.1</a:t>
                       </a:r>
                     </a:p>
                   </a:txBody>
-                  <a:tcPr marL="23628" marR="23628" marT="11814" marB="11814" anchor="b"/>
+                  <a:tcPr marL="23628" marR="23628" marT="11814" marB="11814" anchor="b">
+                    <a:noFill/>
+                  </a:tcPr>
                 </a:tc>
                 <a:extLst>
                   <a:ext uri="{0D108BD9-81ED-4DB2-BD59-A6C34878D82A}">
@@ -16963,7 +17929,7 @@
           <a:graphicData uri="http://schemas.openxmlformats.org/presentationml/2006/ole">
             <mc:AlternateContent xmlns:mc="http://schemas.openxmlformats.org/markup-compatibility/2006">
               <mc:Choice xmlns:v="urn:schemas-microsoft-com:vml" Requires="v">
-                <p:oleObj spid="_x0000_s148700" name="Equation" r:id="rId3" imgW="1892300" imgH="241300" progId="">
+                <p:oleObj spid="_x0000_s148724" name="Equation" r:id="rId3" imgW="1892300" imgH="241300" progId="">
                   <p:embed/>
                 </p:oleObj>
               </mc:Choice>
@@ -17898,7 +18864,7 @@
           <a:graphicData uri="http://schemas.openxmlformats.org/presentationml/2006/ole">
             <mc:AlternateContent xmlns:mc="http://schemas.openxmlformats.org/markup-compatibility/2006">
               <mc:Choice xmlns:v="urn:schemas-microsoft-com:vml" Requires="v">
-                <p:oleObj spid="_x0000_s149724" name="Equation" r:id="rId3" imgW="1651000" imgH="203200" progId="">
+                <p:oleObj spid="_x0000_s149748" name="Equation" r:id="rId3" imgW="1651000" imgH="203200" progId="">
                   <p:embed/>
                 </p:oleObj>
               </mc:Choice>
@@ -25187,7 +26153,7 @@
           <a:graphicData uri="http://schemas.openxmlformats.org/presentationml/2006/ole">
             <mc:AlternateContent xmlns:mc="http://schemas.openxmlformats.org/markup-compatibility/2006">
               <mc:Choice xmlns:v="urn:schemas-microsoft-com:vml" Requires="v">
-                <p:oleObj spid="_x0000_s151184" name="公式" r:id="rId3" imgW="914400" imgH="431800" progId="Equation.3">
+                <p:oleObj spid="_x0000_s151256" name="公式" r:id="rId3" imgW="914400" imgH="431800" progId="Equation.3">
                   <p:embed/>
                 </p:oleObj>
               </mc:Choice>
@@ -25263,7 +26229,7 @@
           <a:graphicData uri="http://schemas.openxmlformats.org/presentationml/2006/ole">
             <mc:AlternateContent xmlns:mc="http://schemas.openxmlformats.org/markup-compatibility/2006">
               <mc:Choice xmlns:v="urn:schemas-microsoft-com:vml" Requires="v">
-                <p:oleObj spid="_x0000_s151185" name="公式" r:id="rId5" imgW="1307532" imgH="393529" progId="Equation.3">
+                <p:oleObj spid="_x0000_s151257" name="公式" r:id="rId5" imgW="1307532" imgH="393529" progId="Equation.3">
                   <p:embed/>
                 </p:oleObj>
               </mc:Choice>
@@ -25443,7 +26409,7 @@
           <a:graphicData uri="http://schemas.openxmlformats.org/presentationml/2006/ole">
             <mc:AlternateContent xmlns:mc="http://schemas.openxmlformats.org/markup-compatibility/2006">
               <mc:Choice xmlns:v="urn:schemas-microsoft-com:vml" Requires="v">
-                <p:oleObj spid="_x0000_s151186" name="Equation" r:id="rId7" imgW="3035300" imgH="635000" progId="">
+                <p:oleObj spid="_x0000_s151258" name="Equation" r:id="rId7" imgW="3035300" imgH="635000" progId="">
                   <p:embed/>
                 </p:oleObj>
               </mc:Choice>
@@ -25830,7 +26796,7 @@
           <a:graphicData uri="http://schemas.openxmlformats.org/presentationml/2006/ole">
             <mc:AlternateContent xmlns:mc="http://schemas.openxmlformats.org/markup-compatibility/2006">
               <mc:Choice xmlns:v="urn:schemas-microsoft-com:vml" Requires="v">
-                <p:oleObj spid="_x0000_s155280" name="Equation" r:id="rId3" imgW="952087" imgH="444307" progId="">
+                <p:oleObj spid="_x0000_s155352" name="Equation" r:id="rId3" imgW="952087" imgH="444307" progId="">
                   <p:embed/>
                 </p:oleObj>
               </mc:Choice>
@@ -25900,7 +26866,7 @@
           <a:graphicData uri="http://schemas.openxmlformats.org/presentationml/2006/ole">
             <mc:AlternateContent xmlns:mc="http://schemas.openxmlformats.org/markup-compatibility/2006">
               <mc:Choice xmlns:v="urn:schemas-microsoft-com:vml" Requires="v">
-                <p:oleObj spid="_x0000_s155281" name="Equation" r:id="rId5" imgW="1536700" imgH="431800" progId="">
+                <p:oleObj spid="_x0000_s155353" name="Equation" r:id="rId5" imgW="1536700" imgH="431800" progId="">
                   <p:embed/>
                 </p:oleObj>
               </mc:Choice>
@@ -26467,7 +27433,7 @@
           <a:graphicData uri="http://schemas.openxmlformats.org/presentationml/2006/ole">
             <mc:AlternateContent xmlns:mc="http://schemas.openxmlformats.org/markup-compatibility/2006">
               <mc:Choice xmlns:v="urn:schemas-microsoft-com:vml" Requires="v">
-                <p:oleObj spid="_x0000_s155282" name="Equation" r:id="rId7" imgW="1917700" imgH="469900" progId="">
+                <p:oleObj spid="_x0000_s155354" name="Equation" r:id="rId7" imgW="1917700" imgH="469900" progId="">
                   <p:embed/>
                 </p:oleObj>
               </mc:Choice>
@@ -27589,7 +28555,7 @@
           <a:graphicData uri="http://schemas.openxmlformats.org/presentationml/2006/ole">
             <mc:AlternateContent xmlns:mc="http://schemas.openxmlformats.org/markup-compatibility/2006">
               <mc:Choice xmlns:v="urn:schemas-microsoft-com:vml" Requires="v">
-                <p:oleObj spid="_x0000_s163102" name="Equation" r:id="rId3" imgW="1231366" imgH="469696" progId="">
+                <p:oleObj spid="_x0000_s163246" name="Equation" r:id="rId3" imgW="1231366" imgH="469696" progId="">
                   <p:embed/>
                 </p:oleObj>
               </mc:Choice>
@@ -27659,7 +28625,7 @@
           <a:graphicData uri="http://schemas.openxmlformats.org/presentationml/2006/ole">
             <mc:AlternateContent xmlns:mc="http://schemas.openxmlformats.org/markup-compatibility/2006">
               <mc:Choice xmlns:v="urn:schemas-microsoft-com:vml" Requires="v">
-                <p:oleObj spid="_x0000_s163103" name="Equation" r:id="rId5" imgW="1675673" imgH="444307" progId="">
+                <p:oleObj spid="_x0000_s163247" name="Equation" r:id="rId5" imgW="1675673" imgH="444307" progId="">
                   <p:embed/>
                 </p:oleObj>
               </mc:Choice>
@@ -27735,7 +28701,7 @@
           <a:graphicData uri="http://schemas.openxmlformats.org/presentationml/2006/ole">
             <mc:AlternateContent xmlns:mc="http://schemas.openxmlformats.org/markup-compatibility/2006">
               <mc:Choice xmlns:v="urn:schemas-microsoft-com:vml" Requires="v">
-                <p:oleObj spid="_x0000_s163104" name="Equation" r:id="rId7" imgW="1752600" imgH="1181100" progId="">
+                <p:oleObj spid="_x0000_s163248" name="Equation" r:id="rId7" imgW="1752600" imgH="1181100" progId="">
                   <p:embed/>
                 </p:oleObj>
               </mc:Choice>
@@ -27805,7 +28771,7 @@
           <a:graphicData uri="http://schemas.openxmlformats.org/presentationml/2006/ole">
             <mc:AlternateContent xmlns:mc="http://schemas.openxmlformats.org/markup-compatibility/2006">
               <mc:Choice xmlns:v="urn:schemas-microsoft-com:vml" Requires="v">
-                <p:oleObj spid="_x0000_s163105" name="Equation" r:id="rId9" imgW="1841500" imgH="469900" progId="">
+                <p:oleObj spid="_x0000_s163249" name="Equation" r:id="rId9" imgW="1841500" imgH="469900" progId="">
                   <p:embed/>
                 </p:oleObj>
               </mc:Choice>
@@ -27881,7 +28847,7 @@
           <a:graphicData uri="http://schemas.openxmlformats.org/presentationml/2006/ole">
             <mc:AlternateContent xmlns:mc="http://schemas.openxmlformats.org/markup-compatibility/2006">
               <mc:Choice xmlns:v="urn:schemas-microsoft-com:vml" Requires="v">
-                <p:oleObj spid="_x0000_s163106" name="Equation" r:id="rId11" imgW="1675673" imgH="444307" progId="">
+                <p:oleObj spid="_x0000_s163250" name="Equation" r:id="rId11" imgW="1675673" imgH="444307" progId="">
                   <p:embed/>
                 </p:oleObj>
               </mc:Choice>
@@ -28201,7 +29167,7 @@
           <a:graphicData uri="http://schemas.openxmlformats.org/presentationml/2006/ole">
             <mc:AlternateContent xmlns:mc="http://schemas.openxmlformats.org/markup-compatibility/2006">
               <mc:Choice xmlns:v="urn:schemas-microsoft-com:vml" Requires="v">
-                <p:oleObj spid="_x0000_s163107" name="Equation" r:id="rId13" imgW="2387600" imgH="444500" progId="">
+                <p:oleObj spid="_x0000_s163251" name="Equation" r:id="rId13" imgW="2387600" imgH="444500" progId="">
                   <p:embed/>
                 </p:oleObj>
               </mc:Choice>
@@ -28839,7 +29805,7 @@
           <a:graphicData uri="http://schemas.openxmlformats.org/presentationml/2006/ole">
             <mc:AlternateContent xmlns:mc="http://schemas.openxmlformats.org/markup-compatibility/2006">
               <mc:Choice xmlns:v="urn:schemas-microsoft-com:vml" Requires="v">
-                <p:oleObj spid="_x0000_s162082" name="Equation" r:id="rId3" imgW="3822700" imgH="965200" progId="">
+                <p:oleObj spid="_x0000_s162226" name="Equation" r:id="rId3" imgW="3822700" imgH="965200" progId="">
                   <p:embed/>
                 </p:oleObj>
               </mc:Choice>
@@ -28915,7 +29881,7 @@
           <a:graphicData uri="http://schemas.openxmlformats.org/presentationml/2006/ole">
             <mc:AlternateContent xmlns:mc="http://schemas.openxmlformats.org/markup-compatibility/2006">
               <mc:Choice xmlns:v="urn:schemas-microsoft-com:vml" Requires="v">
-                <p:oleObj spid="_x0000_s162083" name="Equation" r:id="rId5" imgW="1663700" imgH="355600" progId="">
+                <p:oleObj spid="_x0000_s162227" name="Equation" r:id="rId5" imgW="1663700" imgH="355600" progId="">
                   <p:embed/>
                 </p:oleObj>
               </mc:Choice>
@@ -28991,7 +29957,7 @@
           <a:graphicData uri="http://schemas.openxmlformats.org/presentationml/2006/ole">
             <mc:AlternateContent xmlns:mc="http://schemas.openxmlformats.org/markup-compatibility/2006">
               <mc:Choice xmlns:v="urn:schemas-microsoft-com:vml" Requires="v">
-                <p:oleObj spid="_x0000_s162084" name="Equation" r:id="rId7" imgW="838200" imgH="241300" progId="">
+                <p:oleObj spid="_x0000_s162228" name="Equation" r:id="rId7" imgW="838200" imgH="241300" progId="">
                   <p:embed/>
                 </p:oleObj>
               </mc:Choice>
@@ -29067,7 +30033,7 @@
           <a:graphicData uri="http://schemas.openxmlformats.org/presentationml/2006/ole">
             <mc:AlternateContent xmlns:mc="http://schemas.openxmlformats.org/markup-compatibility/2006">
               <mc:Choice xmlns:v="urn:schemas-microsoft-com:vml" Requires="v">
-                <p:oleObj spid="_x0000_s162085" name="Equation" r:id="rId9" imgW="799753" imgH="431613" progId="Equation.3">
+                <p:oleObj spid="_x0000_s162229" name="Equation" r:id="rId9" imgW="799753" imgH="431613" progId="Equation.3">
                   <p:embed/>
                 </p:oleObj>
               </mc:Choice>
@@ -29624,7 +30590,7 @@
             <a:graphicData uri="http://schemas.openxmlformats.org/presentationml/2006/ole">
               <mc:AlternateContent xmlns:mc="http://schemas.openxmlformats.org/markup-compatibility/2006">
                 <mc:Choice xmlns:v="urn:schemas-microsoft-com:vml" Requires="v">
-                  <p:oleObj spid="_x0000_s162086" name="Equation" r:id="rId11" imgW="291973" imgH="241195" progId="Equation.3">
+                  <p:oleObj spid="_x0000_s162230" name="Equation" r:id="rId11" imgW="291973" imgH="241195" progId="Equation.3">
                     <p:embed/>
                   </p:oleObj>
                 </mc:Choice>
@@ -29700,7 +30666,7 @@
             <a:graphicData uri="http://schemas.openxmlformats.org/presentationml/2006/ole">
               <mc:AlternateContent xmlns:mc="http://schemas.openxmlformats.org/markup-compatibility/2006">
                 <mc:Choice xmlns:v="urn:schemas-microsoft-com:vml" Requires="v">
-                  <p:oleObj spid="_x0000_s162087" name="Equation" r:id="rId13" imgW="177646" imgH="228402" progId="Equation.3">
+                  <p:oleObj spid="_x0000_s162231" name="Equation" r:id="rId13" imgW="177646" imgH="228402" progId="Equation.3">
                     <p:embed/>
                   </p:oleObj>
                 </mc:Choice>
@@ -30757,7 +31723,7 @@
           <a:graphicData uri="http://schemas.openxmlformats.org/presentationml/2006/ole">
             <mc:AlternateContent xmlns:mc="http://schemas.openxmlformats.org/markup-compatibility/2006">
               <mc:Choice xmlns:v="urn:schemas-microsoft-com:vml" Requires="v">
-                <p:oleObj spid="_x0000_s158353" name="Equation" r:id="rId3" imgW="1447800" imgH="228600" progId="">
+                <p:oleObj spid="_x0000_s158425" name="Equation" r:id="rId3" imgW="1447800" imgH="228600" progId="">
                   <p:embed/>
                 </p:oleObj>
               </mc:Choice>
@@ -30833,7 +31799,7 @@
           <a:graphicData uri="http://schemas.openxmlformats.org/presentationml/2006/ole">
             <mc:AlternateContent xmlns:mc="http://schemas.openxmlformats.org/markup-compatibility/2006">
               <mc:Choice xmlns:v="urn:schemas-microsoft-com:vml" Requires="v">
-                <p:oleObj spid="_x0000_s158354" name="Equation" r:id="rId5" imgW="1586811" imgH="355446" progId="">
+                <p:oleObj spid="_x0000_s158426" name="Equation" r:id="rId5" imgW="1586811" imgH="355446" progId="">
                   <p:embed/>
                 </p:oleObj>
               </mc:Choice>
@@ -30909,7 +31875,7 @@
           <a:graphicData uri="http://schemas.openxmlformats.org/presentationml/2006/ole">
             <mc:AlternateContent xmlns:mc="http://schemas.openxmlformats.org/markup-compatibility/2006">
               <mc:Choice xmlns:v="urn:schemas-microsoft-com:vml" Requires="v">
-                <p:oleObj spid="_x0000_s158355" name="Equation" r:id="rId7" imgW="1879600" imgH="241300" progId="">
+                <p:oleObj spid="_x0000_s158427" name="Equation" r:id="rId7" imgW="1879600" imgH="241300" progId="">
                   <p:embed/>
                 </p:oleObj>
               </mc:Choice>
@@ -31248,7 +32214,7 @@
           <p:nvPr/>
         </p:nvPicPr>
         <p:blipFill>
-          <a:blip r:embed="rId2" cstate="print"/>
+          <a:blip r:embed="rId3" cstate="print"/>
           <a:srcRect/>
           <a:stretch>
             <a:fillRect/>
@@ -31274,7 +32240,7 @@
           <p:nvPr/>
         </p:nvPicPr>
         <p:blipFill>
-          <a:blip r:embed="rId3" cstate="print"/>
+          <a:blip r:embed="rId4" cstate="print"/>
           <a:srcRect/>
           <a:stretch>
             <a:fillRect/>
@@ -31513,12 +32479,12 @@
           <a:graphicData uri="http://schemas.openxmlformats.org/presentationml/2006/ole">
             <mc:AlternateContent xmlns:mc="http://schemas.openxmlformats.org/markup-compatibility/2006">
               <mc:Choice xmlns:v="urn:schemas-microsoft-com:vml" Requires="v">
-                <p:oleObj spid="_x0000_s159965" name="Equation" r:id="rId3" imgW="1905000" imgH="241300" progId="">
+                <p:oleObj spid="_x0000_s159989" name="Equation" r:id="rId4" imgW="1905000" imgH="241300" progId="">
                   <p:embed/>
                 </p:oleObj>
               </mc:Choice>
               <mc:Fallback>
-                <p:oleObj name="Equation" r:id="rId3" imgW="1905000" imgH="241300" progId="">
+                <p:oleObj name="Equation" r:id="rId4" imgW="1905000" imgH="241300" progId="">
                   <p:embed/>
                   <p:pic>
                     <p:nvPicPr>
@@ -31529,7 +32495,7 @@
                       <p:nvPr/>
                     </p:nvPicPr>
                     <p:blipFill>
-                      <a:blip r:embed="rId4">
+                      <a:blip r:embed="rId5">
                         <a:extLst>
                           <a:ext uri="{28A0092B-C50C-407E-A947-70E740481C1C}">
                             <a14:useLocalDpi xmlns:a14="http://schemas.microsoft.com/office/drawing/2010/main" val="0"/>
@@ -35262,7 +36228,7 @@
           <p:nvPr/>
         </p:nvPicPr>
         <p:blipFill>
-          <a:blip r:embed="rId2" cstate="print">
+          <a:blip r:embed="rId3" cstate="print">
             <a:extLst>
               <a:ext uri="{28A0092B-C50C-407E-A947-70E740481C1C}">
                 <a14:useLocalDpi xmlns:a14="http://schemas.microsoft.com/office/drawing/2010/main" val="0"/>
@@ -35326,7 +36292,7 @@
           <p:nvPr/>
         </p:nvPicPr>
         <p:blipFill>
-          <a:blip r:embed="rId3" cstate="print"/>
+          <a:blip r:embed="rId4" cstate="print"/>
           <a:srcRect r="1250"/>
           <a:stretch>
             <a:fillRect/>
@@ -38457,12 +39423,12 @@
           <a:graphicData uri="http://schemas.openxmlformats.org/presentationml/2006/ole">
             <mc:AlternateContent xmlns:mc="http://schemas.openxmlformats.org/markup-compatibility/2006">
               <mc:Choice xmlns:v="urn:schemas-microsoft-com:vml" Requires="v">
-                <p:oleObj spid="_x0000_s116371" name="Equation" r:id="rId3" imgW="558558" imgH="431613" progId="Equation.3">
+                <p:oleObj spid="_x0000_s116443" name="Equation" r:id="rId4" imgW="558558" imgH="431613" progId="Equation.3">
                   <p:embed/>
                 </p:oleObj>
               </mc:Choice>
               <mc:Fallback>
-                <p:oleObj name="Equation" r:id="rId3" imgW="558558" imgH="431613" progId="Equation.3">
+                <p:oleObj name="Equation" r:id="rId4" imgW="558558" imgH="431613" progId="Equation.3">
                   <p:embed/>
                   <p:pic>
                     <p:nvPicPr>
@@ -38473,7 +39439,7 @@
                       <p:nvPr/>
                     </p:nvPicPr>
                     <p:blipFill>
-                      <a:blip r:embed="rId4">
+                      <a:blip r:embed="rId5">
                         <a:extLst>
                           <a:ext uri="{28A0092B-C50C-407E-A947-70E740481C1C}">
                             <a14:useLocalDpi xmlns:a14="http://schemas.microsoft.com/office/drawing/2010/main" val="0"/>
@@ -38527,12 +39493,12 @@
           <a:graphicData uri="http://schemas.openxmlformats.org/presentationml/2006/ole">
             <mc:AlternateContent xmlns:mc="http://schemas.openxmlformats.org/markup-compatibility/2006">
               <mc:Choice xmlns:v="urn:schemas-microsoft-com:vml" Requires="v">
-                <p:oleObj spid="_x0000_s116372" name="Equation" r:id="rId5" imgW="1497950" imgH="634725" progId="Equation.3">
+                <p:oleObj spid="_x0000_s116444" name="Equation" r:id="rId6" imgW="1497950" imgH="634725" progId="Equation.3">
                   <p:embed/>
                 </p:oleObj>
               </mc:Choice>
               <mc:Fallback>
-                <p:oleObj name="Equation" r:id="rId5" imgW="1497950" imgH="634725" progId="Equation.3">
+                <p:oleObj name="Equation" r:id="rId6" imgW="1497950" imgH="634725" progId="Equation.3">
                   <p:embed/>
                   <p:pic>
                     <p:nvPicPr>
@@ -38543,7 +39509,7 @@
                       <p:nvPr/>
                     </p:nvPicPr>
                     <p:blipFill>
-                      <a:blip r:embed="rId6">
+                      <a:blip r:embed="rId7">
                         <a:extLst>
                           <a:ext uri="{28A0092B-C50C-407E-A947-70E740481C1C}">
                             <a14:useLocalDpi xmlns:a14="http://schemas.microsoft.com/office/drawing/2010/main" val="0"/>
@@ -38603,12 +39569,12 @@
           <a:graphicData uri="http://schemas.openxmlformats.org/presentationml/2006/ole">
             <mc:AlternateContent xmlns:mc="http://schemas.openxmlformats.org/markup-compatibility/2006">
               <mc:Choice xmlns:v="urn:schemas-microsoft-com:vml" Requires="v">
-                <p:oleObj spid="_x0000_s116373" name="Equation" r:id="rId7" imgW="2946400" imgH="457200" progId="Equation.3">
+                <p:oleObj spid="_x0000_s116445" name="Equation" r:id="rId8" imgW="2946400" imgH="457200" progId="Equation.3">
                   <p:embed/>
                 </p:oleObj>
               </mc:Choice>
               <mc:Fallback>
-                <p:oleObj name="Equation" r:id="rId7" imgW="2946400" imgH="457200" progId="Equation.3">
+                <p:oleObj name="Equation" r:id="rId8" imgW="2946400" imgH="457200" progId="Equation.3">
                   <p:embed/>
                   <p:pic>
                     <p:nvPicPr>
@@ -38619,7 +39585,7 @@
                       <p:nvPr/>
                     </p:nvPicPr>
                     <p:blipFill>
-                      <a:blip r:embed="rId8">
+                      <a:blip r:embed="rId9">
                         <a:extLst>
                           <a:ext uri="{28A0092B-C50C-407E-A947-70E740481C1C}">
                             <a14:useLocalDpi xmlns:a14="http://schemas.microsoft.com/office/drawing/2010/main" val="0"/>
@@ -38666,7 +39632,7 @@
           <p:nvPr/>
         </p:nvPicPr>
         <p:blipFill>
-          <a:blip r:embed="rId9" cstate="print">
+          <a:blip r:embed="rId10" cstate="print">
             <a:extLst>
               <a:ext uri="{28A0092B-C50C-407E-A947-70E740481C1C}">
                 <a14:useLocalDpi xmlns:a14="http://schemas.microsoft.com/office/drawing/2010/main" val="0"/>

</xml_diff>

<commit_message>
adding some notes in lecture files week 4
</commit_message>
<xml_diff>
--- a/lecture/4-Neural_Networks-710.pptx
+++ b/lecture/4-Neural_Networks-710.pptx
@@ -347,7 +347,7 @@
               <a:pPr>
                 <a:defRPr/>
               </a:pPr>
-              <a:t>2016/11/15</a:t>
+              <a:t>2016/11/16</a:t>
             </a:fld>
             <a:endParaRPr lang="zh-CN" altLang="en-US"/>
           </a:p>
@@ -1427,6 +1427,117 @@
     <p:extLst>
       <p:ext uri="{BB962C8B-B14F-4D97-AF65-F5344CB8AC3E}">
         <p14:creationId xmlns:p14="http://schemas.microsoft.com/office/powerpoint/2010/main" val="1784216180"/>
+      </p:ext>
+    </p:extLst>
+  </p:cSld>
+  <p:clrMapOvr>
+    <a:masterClrMapping/>
+  </p:clrMapOvr>
+</p:notes>
+</file>
+
+<file path=ppt/notesSlides/notesSlide8.xml><?xml version="1.0" encoding="utf-8"?>
+<p:notes xmlns:a="http://schemas.openxmlformats.org/drawingml/2006/main" xmlns:r="http://schemas.openxmlformats.org/officeDocument/2006/relationships" xmlns:p="http://schemas.openxmlformats.org/presentationml/2006/main">
+  <p:cSld>
+    <p:spTree>
+      <p:nvGrpSpPr>
+        <p:cNvPr id="1" name=""/>
+        <p:cNvGrpSpPr/>
+        <p:nvPr/>
+      </p:nvGrpSpPr>
+      <p:grpSpPr>
+        <a:xfrm>
+          <a:off x="0" y="0"/>
+          <a:ext cx="0" cy="0"/>
+          <a:chOff x="0" y="0"/>
+          <a:chExt cx="0" cy="0"/>
+        </a:xfrm>
+      </p:grpSpPr>
+      <p:sp>
+        <p:nvSpPr>
+          <p:cNvPr id="2" name="幻灯片图像占位符 1"/>
+          <p:cNvSpPr>
+            <a:spLocks noGrp="1" noRot="1" noChangeAspect="1"/>
+          </p:cNvSpPr>
+          <p:nvPr>
+            <p:ph type="sldImg"/>
+          </p:nvPr>
+        </p:nvSpPr>
+        <p:spPr/>
+      </p:sp>
+      <p:sp>
+        <p:nvSpPr>
+          <p:cNvPr id="3" name="备注占位符 2"/>
+          <p:cNvSpPr>
+            <a:spLocks noGrp="1"/>
+          </p:cNvSpPr>
+          <p:nvPr>
+            <p:ph type="body" idx="1"/>
+          </p:nvPr>
+        </p:nvSpPr>
+        <p:spPr/>
+        <p:txBody>
+          <a:bodyPr/>
+          <a:lstStyle/>
+          <a:p>
+            <a:r>
+              <a:rPr lang="en-US" altLang="zh-CN" dirty="0" smtClean="0"/>
+              <a:t>ANN</a:t>
+            </a:r>
+          </a:p>
+          <a:p>
+            <a:r>
+              <a:rPr lang="zh-CN" altLang="en-US" dirty="0" smtClean="0"/>
+              <a:t>优点：训练好后，用起来比较快；准确度高</a:t>
+            </a:r>
+            <a:endParaRPr lang="en-US" altLang="zh-CN" dirty="0" smtClean="0"/>
+          </a:p>
+          <a:p>
+            <a:r>
+              <a:rPr lang="zh-CN" altLang="en-US" dirty="0" smtClean="0"/>
+              <a:t>缺点：训练时间</a:t>
+            </a:r>
+            <a:r>
+              <a:rPr lang="zh-CN" altLang="en-US" smtClean="0"/>
+              <a:t>比较长；可解释性比较差</a:t>
+            </a:r>
+            <a:endParaRPr lang="en-US" altLang="zh-CN" dirty="0" smtClean="0"/>
+          </a:p>
+        </p:txBody>
+      </p:sp>
+      <p:sp>
+        <p:nvSpPr>
+          <p:cNvPr id="4" name="灯片编号占位符 3"/>
+          <p:cNvSpPr>
+            <a:spLocks noGrp="1"/>
+          </p:cNvSpPr>
+          <p:nvPr>
+            <p:ph type="sldNum" sz="quarter" idx="10"/>
+          </p:nvPr>
+        </p:nvSpPr>
+        <p:spPr/>
+        <p:txBody>
+          <a:bodyPr/>
+          <a:lstStyle/>
+          <a:p>
+            <a:pPr>
+              <a:defRPr/>
+            </a:pPr>
+            <a:fld id="{0486AD57-67ED-4140-9F70-67C055736CF8}" type="slidenum">
+              <a:rPr lang="zh-CN" altLang="en-US" smtClean="0"/>
+              <a:pPr>
+                <a:defRPr/>
+              </a:pPr>
+              <a:t>32</a:t>
+            </a:fld>
+            <a:endParaRPr lang="zh-CN" altLang="en-US"/>
+          </a:p>
+        </p:txBody>
+      </p:sp>
+    </p:spTree>
+    <p:extLst>
+      <p:ext uri="{BB962C8B-B14F-4D97-AF65-F5344CB8AC3E}">
+        <p14:creationId xmlns:p14="http://schemas.microsoft.com/office/powerpoint/2010/main" val="1870443386"/>
       </p:ext>
     </p:extLst>
   </p:cSld>
@@ -10036,7 +10147,7 @@
           <a:graphicData uri="http://schemas.openxmlformats.org/presentationml/2006/ole">
             <mc:AlternateContent xmlns:mc="http://schemas.openxmlformats.org/markup-compatibility/2006">
               <mc:Choice xmlns:v="urn:schemas-microsoft-com:vml" Requires="v">
-                <p:oleObj spid="_x0000_s123609" name="Equation" r:id="rId4" imgW="1384300" imgH="419100" progId="Equation.3">
+                <p:oleObj spid="_x0000_s123615" name="Equation" r:id="rId4" imgW="1384300" imgH="419100" progId="Equation.3">
                   <p:embed/>
                 </p:oleObj>
               </mc:Choice>
@@ -10106,7 +10217,7 @@
           <a:graphicData uri="http://schemas.openxmlformats.org/presentationml/2006/ole">
             <mc:AlternateContent xmlns:mc="http://schemas.openxmlformats.org/markup-compatibility/2006">
               <mc:Choice xmlns:v="urn:schemas-microsoft-com:vml" Requires="v">
-                <p:oleObj spid="_x0000_s123610" name="Equation" r:id="rId6" imgW="1790700" imgH="482600" progId="Equation.3">
+                <p:oleObj spid="_x0000_s123616" name="Equation" r:id="rId6" imgW="1790700" imgH="482600" progId="Equation.3">
                   <p:embed/>
                 </p:oleObj>
               </mc:Choice>
@@ -10176,7 +10287,7 @@
           <a:graphicData uri="http://schemas.openxmlformats.org/presentationml/2006/ole">
             <mc:AlternateContent xmlns:mc="http://schemas.openxmlformats.org/markup-compatibility/2006">
               <mc:Choice xmlns:v="urn:schemas-microsoft-com:vml" Requires="v">
-                <p:oleObj spid="_x0000_s123611" name="Equation" r:id="rId8" imgW="2387600" imgH="431800" progId="Equation.3">
+                <p:oleObj spid="_x0000_s123617" name="Equation" r:id="rId8" imgW="2387600" imgH="431800" progId="Equation.3">
                   <p:embed/>
                 </p:oleObj>
               </mc:Choice>
@@ -10770,7 +10881,7 @@
           <a:graphicData uri="http://schemas.openxmlformats.org/presentationml/2006/ole">
             <mc:AlternateContent xmlns:mc="http://schemas.openxmlformats.org/markup-compatibility/2006">
               <mc:Choice xmlns:v="urn:schemas-microsoft-com:vml" Requires="v">
-                <p:oleObj spid="_x0000_s124632" name="Equation" r:id="rId4" imgW="2095500" imgH="2133600" progId="Equation.3">
+                <p:oleObj spid="_x0000_s124638" name="Equation" r:id="rId4" imgW="2095500" imgH="2133600" progId="Equation.3">
                   <p:embed/>
                 </p:oleObj>
               </mc:Choice>
@@ -10840,7 +10951,7 @@
           <a:graphicData uri="http://schemas.openxmlformats.org/presentationml/2006/ole">
             <mc:AlternateContent xmlns:mc="http://schemas.openxmlformats.org/markup-compatibility/2006">
               <mc:Choice xmlns:v="urn:schemas-microsoft-com:vml" Requires="v">
-                <p:oleObj spid="_x0000_s124633" name="Equation" r:id="rId6" imgW="1371600" imgH="342900" progId="Equation.3">
+                <p:oleObj spid="_x0000_s124639" name="Equation" r:id="rId6" imgW="1371600" imgH="342900" progId="Equation.3">
                   <p:embed/>
                 </p:oleObj>
               </mc:Choice>
@@ -10918,7 +11029,7 @@
           <a:graphicData uri="http://schemas.openxmlformats.org/presentationml/2006/ole">
             <mc:AlternateContent xmlns:mc="http://schemas.openxmlformats.org/markup-compatibility/2006">
               <mc:Choice xmlns:v="urn:schemas-microsoft-com:vml" Requires="v">
-                <p:oleObj spid="_x0000_s124634" name="Equation" r:id="rId8" imgW="710891" imgH="203112" progId="Equation.3">
+                <p:oleObj spid="_x0000_s124640" name="Equation" r:id="rId8" imgW="710891" imgH="203112" progId="Equation.3">
                   <p:embed/>
                 </p:oleObj>
               </mc:Choice>
@@ -11809,7 +11920,7 @@
           <a:graphicData uri="http://schemas.openxmlformats.org/presentationml/2006/ole">
             <mc:AlternateContent xmlns:mc="http://schemas.openxmlformats.org/markup-compatibility/2006">
               <mc:Choice xmlns:v="urn:schemas-microsoft-com:vml" Requires="v">
-                <p:oleObj spid="_x0000_s116980" name="Equation" r:id="rId3" imgW="2667000" imgH="228600" progId="Equation.3">
+                <p:oleObj spid="_x0000_s116982" name="Equation" r:id="rId3" imgW="2667000" imgH="228600" progId="Equation.3">
                   <p:embed/>
                 </p:oleObj>
               </mc:Choice>
@@ -17929,7 +18040,7 @@
           <a:graphicData uri="http://schemas.openxmlformats.org/presentationml/2006/ole">
             <mc:AlternateContent xmlns:mc="http://schemas.openxmlformats.org/markup-compatibility/2006">
               <mc:Choice xmlns:v="urn:schemas-microsoft-com:vml" Requires="v">
-                <p:oleObj spid="_x0000_s148724" name="Equation" r:id="rId3" imgW="1892300" imgH="241300" progId="">
+                <p:oleObj spid="_x0000_s148726" name="Equation" r:id="rId3" imgW="1892300" imgH="241300" progId="">
                   <p:embed/>
                 </p:oleObj>
               </mc:Choice>
@@ -18864,7 +18975,7 @@
           <a:graphicData uri="http://schemas.openxmlformats.org/presentationml/2006/ole">
             <mc:AlternateContent xmlns:mc="http://schemas.openxmlformats.org/markup-compatibility/2006">
               <mc:Choice xmlns:v="urn:schemas-microsoft-com:vml" Requires="v">
-                <p:oleObj spid="_x0000_s149748" name="Equation" r:id="rId3" imgW="1651000" imgH="203200" progId="">
+                <p:oleObj spid="_x0000_s149750" name="Equation" r:id="rId3" imgW="1651000" imgH="203200" progId="">
                   <p:embed/>
                 </p:oleObj>
               </mc:Choice>
@@ -26153,7 +26264,7 @@
           <a:graphicData uri="http://schemas.openxmlformats.org/presentationml/2006/ole">
             <mc:AlternateContent xmlns:mc="http://schemas.openxmlformats.org/markup-compatibility/2006">
               <mc:Choice xmlns:v="urn:schemas-microsoft-com:vml" Requires="v">
-                <p:oleObj spid="_x0000_s151256" name="公式" r:id="rId3" imgW="914400" imgH="431800" progId="Equation.3">
+                <p:oleObj spid="_x0000_s151262" name="公式" r:id="rId3" imgW="914400" imgH="431800" progId="Equation.3">
                   <p:embed/>
                 </p:oleObj>
               </mc:Choice>
@@ -26229,7 +26340,7 @@
           <a:graphicData uri="http://schemas.openxmlformats.org/presentationml/2006/ole">
             <mc:AlternateContent xmlns:mc="http://schemas.openxmlformats.org/markup-compatibility/2006">
               <mc:Choice xmlns:v="urn:schemas-microsoft-com:vml" Requires="v">
-                <p:oleObj spid="_x0000_s151257" name="公式" r:id="rId5" imgW="1307532" imgH="393529" progId="Equation.3">
+                <p:oleObj spid="_x0000_s151263" name="公式" r:id="rId5" imgW="1307532" imgH="393529" progId="Equation.3">
                   <p:embed/>
                 </p:oleObj>
               </mc:Choice>
@@ -26409,7 +26520,7 @@
           <a:graphicData uri="http://schemas.openxmlformats.org/presentationml/2006/ole">
             <mc:AlternateContent xmlns:mc="http://schemas.openxmlformats.org/markup-compatibility/2006">
               <mc:Choice xmlns:v="urn:schemas-microsoft-com:vml" Requires="v">
-                <p:oleObj spid="_x0000_s151258" name="Equation" r:id="rId7" imgW="3035300" imgH="635000" progId="">
+                <p:oleObj spid="_x0000_s151264" name="Equation" r:id="rId7" imgW="3035300" imgH="635000" progId="">
                   <p:embed/>
                 </p:oleObj>
               </mc:Choice>
@@ -26796,7 +26907,7 @@
           <a:graphicData uri="http://schemas.openxmlformats.org/presentationml/2006/ole">
             <mc:AlternateContent xmlns:mc="http://schemas.openxmlformats.org/markup-compatibility/2006">
               <mc:Choice xmlns:v="urn:schemas-microsoft-com:vml" Requires="v">
-                <p:oleObj spid="_x0000_s155352" name="Equation" r:id="rId3" imgW="952087" imgH="444307" progId="">
+                <p:oleObj spid="_x0000_s155358" name="Equation" r:id="rId3" imgW="952087" imgH="444307" progId="">
                   <p:embed/>
                 </p:oleObj>
               </mc:Choice>
@@ -26866,7 +26977,7 @@
           <a:graphicData uri="http://schemas.openxmlformats.org/presentationml/2006/ole">
             <mc:AlternateContent xmlns:mc="http://schemas.openxmlformats.org/markup-compatibility/2006">
               <mc:Choice xmlns:v="urn:schemas-microsoft-com:vml" Requires="v">
-                <p:oleObj spid="_x0000_s155353" name="Equation" r:id="rId5" imgW="1536700" imgH="431800" progId="">
+                <p:oleObj spid="_x0000_s155359" name="Equation" r:id="rId5" imgW="1536700" imgH="431800" progId="">
                   <p:embed/>
                 </p:oleObj>
               </mc:Choice>
@@ -27433,7 +27544,7 @@
           <a:graphicData uri="http://schemas.openxmlformats.org/presentationml/2006/ole">
             <mc:AlternateContent xmlns:mc="http://schemas.openxmlformats.org/markup-compatibility/2006">
               <mc:Choice xmlns:v="urn:schemas-microsoft-com:vml" Requires="v">
-                <p:oleObj spid="_x0000_s155354" name="Equation" r:id="rId7" imgW="1917700" imgH="469900" progId="">
+                <p:oleObj spid="_x0000_s155360" name="Equation" r:id="rId7" imgW="1917700" imgH="469900" progId="">
                   <p:embed/>
                 </p:oleObj>
               </mc:Choice>
@@ -28555,7 +28666,7 @@
           <a:graphicData uri="http://schemas.openxmlformats.org/presentationml/2006/ole">
             <mc:AlternateContent xmlns:mc="http://schemas.openxmlformats.org/markup-compatibility/2006">
               <mc:Choice xmlns:v="urn:schemas-microsoft-com:vml" Requires="v">
-                <p:oleObj spid="_x0000_s163246" name="Equation" r:id="rId3" imgW="1231366" imgH="469696" progId="">
+                <p:oleObj spid="_x0000_s163258" name="Equation" r:id="rId3" imgW="1231366" imgH="469696" progId="">
                   <p:embed/>
                 </p:oleObj>
               </mc:Choice>
@@ -28625,7 +28736,7 @@
           <a:graphicData uri="http://schemas.openxmlformats.org/presentationml/2006/ole">
             <mc:AlternateContent xmlns:mc="http://schemas.openxmlformats.org/markup-compatibility/2006">
               <mc:Choice xmlns:v="urn:schemas-microsoft-com:vml" Requires="v">
-                <p:oleObj spid="_x0000_s163247" name="Equation" r:id="rId5" imgW="1675673" imgH="444307" progId="">
+                <p:oleObj spid="_x0000_s163259" name="Equation" r:id="rId5" imgW="1675673" imgH="444307" progId="">
                   <p:embed/>
                 </p:oleObj>
               </mc:Choice>
@@ -28701,7 +28812,7 @@
           <a:graphicData uri="http://schemas.openxmlformats.org/presentationml/2006/ole">
             <mc:AlternateContent xmlns:mc="http://schemas.openxmlformats.org/markup-compatibility/2006">
               <mc:Choice xmlns:v="urn:schemas-microsoft-com:vml" Requires="v">
-                <p:oleObj spid="_x0000_s163248" name="Equation" r:id="rId7" imgW="1752600" imgH="1181100" progId="">
+                <p:oleObj spid="_x0000_s163260" name="Equation" r:id="rId7" imgW="1752600" imgH="1181100" progId="">
                   <p:embed/>
                 </p:oleObj>
               </mc:Choice>
@@ -28771,7 +28882,7 @@
           <a:graphicData uri="http://schemas.openxmlformats.org/presentationml/2006/ole">
             <mc:AlternateContent xmlns:mc="http://schemas.openxmlformats.org/markup-compatibility/2006">
               <mc:Choice xmlns:v="urn:schemas-microsoft-com:vml" Requires="v">
-                <p:oleObj spid="_x0000_s163249" name="Equation" r:id="rId9" imgW="1841500" imgH="469900" progId="">
+                <p:oleObj spid="_x0000_s163261" name="Equation" r:id="rId9" imgW="1841500" imgH="469900" progId="">
                   <p:embed/>
                 </p:oleObj>
               </mc:Choice>
@@ -28847,7 +28958,7 @@
           <a:graphicData uri="http://schemas.openxmlformats.org/presentationml/2006/ole">
             <mc:AlternateContent xmlns:mc="http://schemas.openxmlformats.org/markup-compatibility/2006">
               <mc:Choice xmlns:v="urn:schemas-microsoft-com:vml" Requires="v">
-                <p:oleObj spid="_x0000_s163250" name="Equation" r:id="rId11" imgW="1675673" imgH="444307" progId="">
+                <p:oleObj spid="_x0000_s163262" name="Equation" r:id="rId11" imgW="1675673" imgH="444307" progId="">
                   <p:embed/>
                 </p:oleObj>
               </mc:Choice>
@@ -29167,7 +29278,7 @@
           <a:graphicData uri="http://schemas.openxmlformats.org/presentationml/2006/ole">
             <mc:AlternateContent xmlns:mc="http://schemas.openxmlformats.org/markup-compatibility/2006">
               <mc:Choice xmlns:v="urn:schemas-microsoft-com:vml" Requires="v">
-                <p:oleObj spid="_x0000_s163251" name="Equation" r:id="rId13" imgW="2387600" imgH="444500" progId="">
+                <p:oleObj spid="_x0000_s163263" name="Equation" r:id="rId13" imgW="2387600" imgH="444500" progId="">
                   <p:embed/>
                 </p:oleObj>
               </mc:Choice>
@@ -29805,7 +29916,7 @@
           <a:graphicData uri="http://schemas.openxmlformats.org/presentationml/2006/ole">
             <mc:AlternateContent xmlns:mc="http://schemas.openxmlformats.org/markup-compatibility/2006">
               <mc:Choice xmlns:v="urn:schemas-microsoft-com:vml" Requires="v">
-                <p:oleObj spid="_x0000_s162226" name="Equation" r:id="rId3" imgW="3822700" imgH="965200" progId="">
+                <p:oleObj spid="_x0000_s162238" name="Equation" r:id="rId3" imgW="3822700" imgH="965200" progId="">
                   <p:embed/>
                 </p:oleObj>
               </mc:Choice>
@@ -29881,7 +29992,7 @@
           <a:graphicData uri="http://schemas.openxmlformats.org/presentationml/2006/ole">
             <mc:AlternateContent xmlns:mc="http://schemas.openxmlformats.org/markup-compatibility/2006">
               <mc:Choice xmlns:v="urn:schemas-microsoft-com:vml" Requires="v">
-                <p:oleObj spid="_x0000_s162227" name="Equation" r:id="rId5" imgW="1663700" imgH="355600" progId="">
+                <p:oleObj spid="_x0000_s162239" name="Equation" r:id="rId5" imgW="1663700" imgH="355600" progId="">
                   <p:embed/>
                 </p:oleObj>
               </mc:Choice>
@@ -29957,7 +30068,7 @@
           <a:graphicData uri="http://schemas.openxmlformats.org/presentationml/2006/ole">
             <mc:AlternateContent xmlns:mc="http://schemas.openxmlformats.org/markup-compatibility/2006">
               <mc:Choice xmlns:v="urn:schemas-microsoft-com:vml" Requires="v">
-                <p:oleObj spid="_x0000_s162228" name="Equation" r:id="rId7" imgW="838200" imgH="241300" progId="">
+                <p:oleObj spid="_x0000_s162240" name="Equation" r:id="rId7" imgW="838200" imgH="241300" progId="">
                   <p:embed/>
                 </p:oleObj>
               </mc:Choice>
@@ -30033,7 +30144,7 @@
           <a:graphicData uri="http://schemas.openxmlformats.org/presentationml/2006/ole">
             <mc:AlternateContent xmlns:mc="http://schemas.openxmlformats.org/markup-compatibility/2006">
               <mc:Choice xmlns:v="urn:schemas-microsoft-com:vml" Requires="v">
-                <p:oleObj spid="_x0000_s162229" name="Equation" r:id="rId9" imgW="799753" imgH="431613" progId="Equation.3">
+                <p:oleObj spid="_x0000_s162241" name="Equation" r:id="rId9" imgW="799753" imgH="431613" progId="Equation.3">
                   <p:embed/>
                 </p:oleObj>
               </mc:Choice>
@@ -30590,7 +30701,7 @@
             <a:graphicData uri="http://schemas.openxmlformats.org/presentationml/2006/ole">
               <mc:AlternateContent xmlns:mc="http://schemas.openxmlformats.org/markup-compatibility/2006">
                 <mc:Choice xmlns:v="urn:schemas-microsoft-com:vml" Requires="v">
-                  <p:oleObj spid="_x0000_s162230" name="Equation" r:id="rId11" imgW="291973" imgH="241195" progId="Equation.3">
+                  <p:oleObj spid="_x0000_s162242" name="Equation" r:id="rId11" imgW="291973" imgH="241195" progId="Equation.3">
                     <p:embed/>
                   </p:oleObj>
                 </mc:Choice>
@@ -30666,7 +30777,7 @@
             <a:graphicData uri="http://schemas.openxmlformats.org/presentationml/2006/ole">
               <mc:AlternateContent xmlns:mc="http://schemas.openxmlformats.org/markup-compatibility/2006">
                 <mc:Choice xmlns:v="urn:schemas-microsoft-com:vml" Requires="v">
-                  <p:oleObj spid="_x0000_s162231" name="Equation" r:id="rId13" imgW="177646" imgH="228402" progId="Equation.3">
+                  <p:oleObj spid="_x0000_s162243" name="Equation" r:id="rId13" imgW="177646" imgH="228402" progId="Equation.3">
                     <p:embed/>
                   </p:oleObj>
                 </mc:Choice>
@@ -31723,7 +31834,7 @@
           <a:graphicData uri="http://schemas.openxmlformats.org/presentationml/2006/ole">
             <mc:AlternateContent xmlns:mc="http://schemas.openxmlformats.org/markup-compatibility/2006">
               <mc:Choice xmlns:v="urn:schemas-microsoft-com:vml" Requires="v">
-                <p:oleObj spid="_x0000_s158425" name="Equation" r:id="rId3" imgW="1447800" imgH="228600" progId="">
+                <p:oleObj spid="_x0000_s158431" name="Equation" r:id="rId3" imgW="1447800" imgH="228600" progId="">
                   <p:embed/>
                 </p:oleObj>
               </mc:Choice>
@@ -31799,7 +31910,7 @@
           <a:graphicData uri="http://schemas.openxmlformats.org/presentationml/2006/ole">
             <mc:AlternateContent xmlns:mc="http://schemas.openxmlformats.org/markup-compatibility/2006">
               <mc:Choice xmlns:v="urn:schemas-microsoft-com:vml" Requires="v">
-                <p:oleObj spid="_x0000_s158426" name="Equation" r:id="rId5" imgW="1586811" imgH="355446" progId="">
+                <p:oleObj spid="_x0000_s158432" name="Equation" r:id="rId5" imgW="1586811" imgH="355446" progId="">
                   <p:embed/>
                 </p:oleObj>
               </mc:Choice>
@@ -31875,7 +31986,7 @@
           <a:graphicData uri="http://schemas.openxmlformats.org/presentationml/2006/ole">
             <mc:AlternateContent xmlns:mc="http://schemas.openxmlformats.org/markup-compatibility/2006">
               <mc:Choice xmlns:v="urn:schemas-microsoft-com:vml" Requires="v">
-                <p:oleObj spid="_x0000_s158427" name="Equation" r:id="rId7" imgW="1879600" imgH="241300" progId="">
+                <p:oleObj spid="_x0000_s158433" name="Equation" r:id="rId7" imgW="1879600" imgH="241300" progId="">
                   <p:embed/>
                 </p:oleObj>
               </mc:Choice>
@@ -32479,7 +32590,7 @@
           <a:graphicData uri="http://schemas.openxmlformats.org/presentationml/2006/ole">
             <mc:AlternateContent xmlns:mc="http://schemas.openxmlformats.org/markup-compatibility/2006">
               <mc:Choice xmlns:v="urn:schemas-microsoft-com:vml" Requires="v">
-                <p:oleObj spid="_x0000_s159989" name="Equation" r:id="rId4" imgW="1905000" imgH="241300" progId="">
+                <p:oleObj spid="_x0000_s159991" name="Equation" r:id="rId4" imgW="1905000" imgH="241300" progId="">
                   <p:embed/>
                 </p:oleObj>
               </mc:Choice>
@@ -39423,7 +39534,7 @@
           <a:graphicData uri="http://schemas.openxmlformats.org/presentationml/2006/ole">
             <mc:AlternateContent xmlns:mc="http://schemas.openxmlformats.org/markup-compatibility/2006">
               <mc:Choice xmlns:v="urn:schemas-microsoft-com:vml" Requires="v">
-                <p:oleObj spid="_x0000_s116443" name="Equation" r:id="rId4" imgW="558558" imgH="431613" progId="Equation.3">
+                <p:oleObj spid="_x0000_s116449" name="Equation" r:id="rId4" imgW="558558" imgH="431613" progId="Equation.3">
                   <p:embed/>
                 </p:oleObj>
               </mc:Choice>
@@ -39493,7 +39604,7 @@
           <a:graphicData uri="http://schemas.openxmlformats.org/presentationml/2006/ole">
             <mc:AlternateContent xmlns:mc="http://schemas.openxmlformats.org/markup-compatibility/2006">
               <mc:Choice xmlns:v="urn:schemas-microsoft-com:vml" Requires="v">
-                <p:oleObj spid="_x0000_s116444" name="Equation" r:id="rId6" imgW="1497950" imgH="634725" progId="Equation.3">
+                <p:oleObj spid="_x0000_s116450" name="Equation" r:id="rId6" imgW="1497950" imgH="634725" progId="Equation.3">
                   <p:embed/>
                 </p:oleObj>
               </mc:Choice>
@@ -39569,7 +39680,7 @@
           <a:graphicData uri="http://schemas.openxmlformats.org/presentationml/2006/ole">
             <mc:AlternateContent xmlns:mc="http://schemas.openxmlformats.org/markup-compatibility/2006">
               <mc:Choice xmlns:v="urn:schemas-microsoft-com:vml" Requires="v">
-                <p:oleObj spid="_x0000_s116445" name="Equation" r:id="rId8" imgW="2946400" imgH="457200" progId="Equation.3">
+                <p:oleObj spid="_x0000_s116451" name="Equation" r:id="rId8" imgW="2946400" imgH="457200" progId="Equation.3">
                   <p:embed/>
                 </p:oleObj>
               </mc:Choice>

</xml_diff>

<commit_message>
add ex files for ANN week 4
</commit_message>
<xml_diff>
--- a/lecture/4-Neural_Networks-710.pptx
+++ b/lecture/4-Neural_Networks-710.pptx
@@ -190,7 +190,7 @@
 
 <file path=ppt/commentAuthors.xml><?xml version="1.0" encoding="utf-8"?>
 <p:cmAuthorLst xmlns:a="http://schemas.openxmlformats.org/drawingml/2006/main" xmlns:r="http://schemas.openxmlformats.org/officeDocument/2006/relationships" xmlns:p="http://schemas.openxmlformats.org/presentationml/2006/main">
-  <p:cmAuthor id="1" name="user" initials="u" lastIdx="5" clrIdx="0">
+  <p:cmAuthor id="1" name="user" initials="u" lastIdx="9" clrIdx="0">
     <p:extLst>
       <p:ext uri="{19B8F6BF-5375-455C-9EA6-DF929625EA0E}">
         <p15:presenceInfo xmlns:p15="http://schemas.microsoft.com/office/powerpoint/2012/main" userId="user" providerId="None"/>
@@ -347,7 +347,7 @@
               <a:pPr>
                 <a:defRPr/>
               </a:pPr>
-              <a:t>2016/11/16</a:t>
+              <a:t>2016/12/5</a:t>
             </a:fld>
             <a:endParaRPr lang="zh-CN" altLang="en-US"/>
           </a:p>
@@ -750,6 +750,232 @@
 </p:notes>
 </file>
 
+<file path=ppt/notesSlides/notesSlide10.xml><?xml version="1.0" encoding="utf-8"?>
+<p:notes xmlns:a="http://schemas.openxmlformats.org/drawingml/2006/main" xmlns:r="http://schemas.openxmlformats.org/officeDocument/2006/relationships" xmlns:p="http://schemas.openxmlformats.org/presentationml/2006/main">
+  <p:cSld>
+    <p:spTree>
+      <p:nvGrpSpPr>
+        <p:cNvPr id="1" name=""/>
+        <p:cNvGrpSpPr/>
+        <p:nvPr/>
+      </p:nvGrpSpPr>
+      <p:grpSpPr>
+        <a:xfrm>
+          <a:off x="0" y="0"/>
+          <a:ext cx="0" cy="0"/>
+          <a:chOff x="0" y="0"/>
+          <a:chExt cx="0" cy="0"/>
+        </a:xfrm>
+      </p:grpSpPr>
+      <p:sp>
+        <p:nvSpPr>
+          <p:cNvPr id="2" name="幻灯片图像占位符 1"/>
+          <p:cNvSpPr>
+            <a:spLocks noGrp="1" noRot="1" noChangeAspect="1"/>
+          </p:cNvSpPr>
+          <p:nvPr>
+            <p:ph type="sldImg"/>
+          </p:nvPr>
+        </p:nvSpPr>
+        <p:spPr/>
+      </p:sp>
+      <p:sp>
+        <p:nvSpPr>
+          <p:cNvPr id="3" name="备注占位符 2"/>
+          <p:cNvSpPr>
+            <a:spLocks noGrp="1"/>
+          </p:cNvSpPr>
+          <p:nvPr>
+            <p:ph type="body" idx="1"/>
+          </p:nvPr>
+        </p:nvSpPr>
+        <p:spPr/>
+        <p:txBody>
+          <a:bodyPr/>
+          <a:lstStyle/>
+          <a:p>
+            <a:r>
+              <a:rPr lang="zh-CN" altLang="en-US" dirty="0" smtClean="0"/>
+              <a:t>为了克服局部最优解，增加一个冲量，用于越过局部最优解</a:t>
+            </a:r>
+            <a:endParaRPr lang="en-US" altLang="zh-CN" dirty="0" smtClean="0"/>
+          </a:p>
+          <a:p>
+            <a:endParaRPr lang="en-US" altLang="zh-CN" dirty="0" smtClean="0"/>
+          </a:p>
+          <a:p>
+            <a:r>
+              <a:rPr lang="zh-CN" altLang="en-US" dirty="0" smtClean="0"/>
+              <a:t>学习率一般开始时不能太大也不能太小，一般</a:t>
+            </a:r>
+            <a:r>
+              <a:rPr lang="en-US" altLang="zh-CN" dirty="0" smtClean="0"/>
+              <a:t>0.05</a:t>
+            </a:r>
+            <a:r>
+              <a:rPr lang="zh-CN" altLang="en-US" dirty="0" smtClean="0"/>
+              <a:t>左右，随着过程动态调整。</a:t>
+            </a:r>
+            <a:endParaRPr lang="en-US" altLang="zh-CN" smtClean="0"/>
+          </a:p>
+          <a:p>
+            <a:endParaRPr lang="zh-CN" altLang="en-US" dirty="0"/>
+          </a:p>
+        </p:txBody>
+      </p:sp>
+      <p:sp>
+        <p:nvSpPr>
+          <p:cNvPr id="4" name="灯片编号占位符 3"/>
+          <p:cNvSpPr>
+            <a:spLocks noGrp="1"/>
+          </p:cNvSpPr>
+          <p:nvPr>
+            <p:ph type="sldNum" sz="quarter" idx="10"/>
+          </p:nvPr>
+        </p:nvSpPr>
+        <p:spPr/>
+        <p:txBody>
+          <a:bodyPr/>
+          <a:lstStyle/>
+          <a:p>
+            <a:pPr>
+              <a:defRPr/>
+            </a:pPr>
+            <a:fld id="{0486AD57-67ED-4140-9F70-67C055736CF8}" type="slidenum">
+              <a:rPr lang="zh-CN" altLang="en-US" smtClean="0"/>
+              <a:pPr>
+                <a:defRPr/>
+              </a:pPr>
+              <a:t>27</a:t>
+            </a:fld>
+            <a:endParaRPr lang="zh-CN" altLang="en-US"/>
+          </a:p>
+        </p:txBody>
+      </p:sp>
+    </p:spTree>
+    <p:extLst>
+      <p:ext uri="{BB962C8B-B14F-4D97-AF65-F5344CB8AC3E}">
+        <p14:creationId xmlns:p14="http://schemas.microsoft.com/office/powerpoint/2010/main" val="1784216180"/>
+      </p:ext>
+    </p:extLst>
+  </p:cSld>
+  <p:clrMapOvr>
+    <a:masterClrMapping/>
+  </p:clrMapOvr>
+</p:notes>
+</file>
+
+<file path=ppt/notesSlides/notesSlide11.xml><?xml version="1.0" encoding="utf-8"?>
+<p:notes xmlns:a="http://schemas.openxmlformats.org/drawingml/2006/main" xmlns:r="http://schemas.openxmlformats.org/officeDocument/2006/relationships" xmlns:p="http://schemas.openxmlformats.org/presentationml/2006/main">
+  <p:cSld>
+    <p:spTree>
+      <p:nvGrpSpPr>
+        <p:cNvPr id="1" name=""/>
+        <p:cNvGrpSpPr/>
+        <p:nvPr/>
+      </p:nvGrpSpPr>
+      <p:grpSpPr>
+        <a:xfrm>
+          <a:off x="0" y="0"/>
+          <a:ext cx="0" cy="0"/>
+          <a:chOff x="0" y="0"/>
+          <a:chExt cx="0" cy="0"/>
+        </a:xfrm>
+      </p:grpSpPr>
+      <p:sp>
+        <p:nvSpPr>
+          <p:cNvPr id="2" name="幻灯片图像占位符 1"/>
+          <p:cNvSpPr>
+            <a:spLocks noGrp="1" noRot="1" noChangeAspect="1"/>
+          </p:cNvSpPr>
+          <p:nvPr>
+            <p:ph type="sldImg"/>
+          </p:nvPr>
+        </p:nvSpPr>
+        <p:spPr/>
+      </p:sp>
+      <p:sp>
+        <p:nvSpPr>
+          <p:cNvPr id="3" name="备注占位符 2"/>
+          <p:cNvSpPr>
+            <a:spLocks noGrp="1"/>
+          </p:cNvSpPr>
+          <p:nvPr>
+            <p:ph type="body" idx="1"/>
+          </p:nvPr>
+        </p:nvSpPr>
+        <p:spPr/>
+        <p:txBody>
+          <a:bodyPr/>
+          <a:lstStyle/>
+          <a:p>
+            <a:r>
+              <a:rPr lang="en-US" altLang="zh-CN" dirty="0" smtClean="0"/>
+              <a:t>ANN</a:t>
+            </a:r>
+          </a:p>
+          <a:p>
+            <a:r>
+              <a:rPr lang="zh-CN" altLang="en-US" dirty="0" smtClean="0"/>
+              <a:t>优点：训练好后，用起来比较快；准确度高</a:t>
+            </a:r>
+            <a:endParaRPr lang="en-US" altLang="zh-CN" dirty="0" smtClean="0"/>
+          </a:p>
+          <a:p>
+            <a:r>
+              <a:rPr lang="zh-CN" altLang="en-US" dirty="0" smtClean="0"/>
+              <a:t>缺点：训练时间</a:t>
+            </a:r>
+            <a:r>
+              <a:rPr lang="zh-CN" altLang="en-US" smtClean="0"/>
+              <a:t>比较长；可解释性比较差</a:t>
+            </a:r>
+            <a:endParaRPr lang="en-US" altLang="zh-CN" dirty="0" smtClean="0"/>
+          </a:p>
+        </p:txBody>
+      </p:sp>
+      <p:sp>
+        <p:nvSpPr>
+          <p:cNvPr id="4" name="灯片编号占位符 3"/>
+          <p:cNvSpPr>
+            <a:spLocks noGrp="1"/>
+          </p:cNvSpPr>
+          <p:nvPr>
+            <p:ph type="sldNum" sz="quarter" idx="10"/>
+          </p:nvPr>
+        </p:nvSpPr>
+        <p:spPr/>
+        <p:txBody>
+          <a:bodyPr/>
+          <a:lstStyle/>
+          <a:p>
+            <a:pPr>
+              <a:defRPr/>
+            </a:pPr>
+            <a:fld id="{0486AD57-67ED-4140-9F70-67C055736CF8}" type="slidenum">
+              <a:rPr lang="zh-CN" altLang="en-US" smtClean="0"/>
+              <a:pPr>
+                <a:defRPr/>
+              </a:pPr>
+              <a:t>32</a:t>
+            </a:fld>
+            <a:endParaRPr lang="zh-CN" altLang="en-US"/>
+          </a:p>
+        </p:txBody>
+      </p:sp>
+    </p:spTree>
+    <p:extLst>
+      <p:ext uri="{BB962C8B-B14F-4D97-AF65-F5344CB8AC3E}">
+        <p14:creationId xmlns:p14="http://schemas.microsoft.com/office/powerpoint/2010/main" val="1870443386"/>
+      </p:ext>
+    </p:extLst>
+  </p:cSld>
+  <p:clrMapOvr>
+    <a:masterClrMapping/>
+  </p:clrMapOvr>
+</p:notes>
+</file>
+
 <file path=ppt/notesSlides/notesSlide2.xml><?xml version="1.0" encoding="utf-8"?>
 <p:notes xmlns:a="http://schemas.openxmlformats.org/drawingml/2006/main" xmlns:r="http://schemas.openxmlformats.org/officeDocument/2006/relationships" xmlns:p="http://schemas.openxmlformats.org/presentationml/2006/main">
   <p:cSld>
@@ -1252,29 +1478,56 @@
           <a:p>
             <a:r>
               <a:rPr lang="zh-CN" altLang="en-US" dirty="0" smtClean="0"/>
-              <a:t>这种算法如果遇上局部最优解，就可能导致整体的性能无法继续下降，这时可以试着取另外一组随机初始值，重新开始计算。</a:t>
-            </a:r>
-            <a:endParaRPr lang="en-US" altLang="zh-CN" dirty="0" smtClean="0"/>
-          </a:p>
-          <a:p>
-            <a:endParaRPr lang="en-US" altLang="zh-CN" dirty="0" smtClean="0"/>
-          </a:p>
-          <a:p>
+              <a:t>本</a:t>
+            </a:r>
+            <a:r>
+              <a:rPr lang="en-US" altLang="zh-CN" dirty="0" smtClean="0"/>
+              <a:t>slice</a:t>
+            </a:r>
             <a:r>
               <a:rPr lang="zh-CN" altLang="en-US" dirty="0" smtClean="0"/>
-              <a:t>一般</a:t>
+              <a:t>是计算输出层的反向规则：</a:t>
             </a:r>
             <a:r>
               <a:rPr lang="en-US" altLang="zh-CN" dirty="0" smtClean="0"/>
-              <a:t>BP</a:t>
+              <a:t>j</a:t>
             </a:r>
             <a:r>
               <a:rPr lang="zh-CN" altLang="en-US" dirty="0" smtClean="0"/>
-              <a:t>算法都要试很多次</a:t>
-            </a:r>
-            <a:endParaRPr lang="en-US" altLang="zh-CN" dirty="0" smtClean="0"/>
-          </a:p>
-          <a:p>
+              <a:t>节点是输出层的节点之一，</a:t>
+            </a:r>
+            <a:r>
+              <a:rPr lang="en-US" altLang="zh-CN" dirty="0" smtClean="0"/>
+              <a:t>w</a:t>
+            </a:r>
+            <a:r>
+              <a:rPr lang="zh-CN" altLang="en-US" dirty="0" smtClean="0"/>
+              <a:t>是对应</a:t>
+            </a:r>
+            <a:r>
+              <a:rPr lang="en-US" altLang="zh-CN" dirty="0" smtClean="0"/>
+              <a:t>”</a:t>
+            </a:r>
+            <a:r>
+              <a:rPr lang="zh-CN" altLang="en-US" dirty="0" smtClean="0"/>
+              <a:t>中间层</a:t>
+            </a:r>
+            <a:r>
+              <a:rPr lang="en-US" altLang="zh-CN" dirty="0" smtClean="0"/>
+              <a:t>-&gt;</a:t>
+            </a:r>
+            <a:r>
+              <a:rPr lang="zh-CN" altLang="en-US" dirty="0" smtClean="0"/>
+              <a:t>输出层</a:t>
+            </a:r>
+            <a:r>
+              <a:rPr lang="en-US" altLang="zh-CN" dirty="0" smtClean="0"/>
+              <a:t>”</a:t>
+            </a:r>
+            <a:r>
+              <a:rPr lang="zh-CN" altLang="en-US" dirty="0" smtClean="0"/>
+              <a:t>的</a:t>
+            </a:r>
             <a:endParaRPr lang="zh-CN" altLang="en-US" dirty="0"/>
           </a:p>
         </p:txBody>
@@ -1302,7 +1555,7 @@
               <a:pPr>
                 <a:defRPr/>
               </a:pPr>
-              <a:t>26</a:t>
+              <a:t>23</a:t>
             </a:fld>
             <a:endParaRPr lang="zh-CN" altLang="en-US"/>
           </a:p>
@@ -1311,7 +1564,7 @@
     </p:spTree>
     <p:extLst>
       <p:ext uri="{BB962C8B-B14F-4D97-AF65-F5344CB8AC3E}">
-        <p14:creationId xmlns:p14="http://schemas.microsoft.com/office/powerpoint/2010/main" val="2029436730"/>
+        <p14:creationId xmlns:p14="http://schemas.microsoft.com/office/powerpoint/2010/main" val="3582741932"/>
       </p:ext>
     </p:extLst>
   </p:cSld>
@@ -1367,27 +1620,41 @@
           <a:p>
             <a:r>
               <a:rPr lang="zh-CN" altLang="en-US" dirty="0" smtClean="0"/>
-              <a:t>为了克服局部最优解，增加一个冲量，用于越过局部最优解</a:t>
+              <a:t>本</a:t>
+            </a:r>
+            <a:r>
+              <a:rPr lang="en-US" altLang="zh-CN" dirty="0" smtClean="0"/>
+              <a:t>slice</a:t>
+            </a:r>
+            <a:r>
+              <a:rPr lang="zh-CN" altLang="en-US" dirty="0" smtClean="0"/>
+              <a:t>是中间层的规则，其中：</a:t>
+            </a:r>
+            <a:r>
+              <a:rPr lang="en-US" altLang="zh-CN" dirty="0" smtClean="0"/>
+              <a:t>j</a:t>
+            </a:r>
+            <a:r>
+              <a:rPr lang="zh-CN" altLang="en-US" dirty="0" smtClean="0"/>
+              <a:t>是中间层的节点，</a:t>
+            </a:r>
+            <a:r>
+              <a:rPr lang="en-US" altLang="zh-CN" dirty="0" smtClean="0"/>
+              <a:t>w</a:t>
+            </a:r>
+            <a:r>
+              <a:rPr lang="zh-CN" altLang="en-US" dirty="0" smtClean="0"/>
+              <a:t>是“输入层</a:t>
+            </a:r>
+            <a:r>
+              <a:rPr lang="en-US" altLang="zh-CN" dirty="0" smtClean="0"/>
+              <a:t>-&gt;</a:t>
+            </a:r>
+            <a:r>
+              <a:rPr lang="zh-CN" altLang="en-US" dirty="0" smtClean="0"/>
+              <a:t>中间层”的</a:t>
             </a:r>
             <a:endParaRPr lang="en-US" altLang="zh-CN" dirty="0" smtClean="0"/>
-          </a:p>
-          <a:p>
-            <a:endParaRPr lang="en-US" altLang="zh-CN" dirty="0" smtClean="0"/>
-          </a:p>
-          <a:p>
-            <a:r>
-              <a:rPr lang="zh-CN" altLang="en-US" dirty="0" smtClean="0"/>
-              <a:t>学习率一般开始时不能太大也不能太小，一般</a:t>
-            </a:r>
-            <a:r>
-              <a:rPr lang="en-US" altLang="zh-CN" dirty="0" smtClean="0"/>
-              <a:t>0.05</a:t>
-            </a:r>
-            <a:r>
-              <a:rPr lang="zh-CN" altLang="en-US" dirty="0" smtClean="0"/>
-              <a:t>左右，随着过程动态调整。</a:t>
-            </a:r>
-            <a:endParaRPr lang="en-US" altLang="zh-CN" smtClean="0"/>
           </a:p>
           <a:p>
             <a:endParaRPr lang="zh-CN" altLang="en-US" dirty="0"/>
@@ -1417,7 +1684,7 @@
               <a:pPr>
                 <a:defRPr/>
               </a:pPr>
-              <a:t>27</a:t>
+              <a:t>24</a:t>
             </a:fld>
             <a:endParaRPr lang="zh-CN" altLang="en-US"/>
           </a:p>
@@ -1426,7 +1693,7 @@
     </p:spTree>
     <p:extLst>
       <p:ext uri="{BB962C8B-B14F-4D97-AF65-F5344CB8AC3E}">
-        <p14:creationId xmlns:p14="http://schemas.microsoft.com/office/powerpoint/2010/main" val="1784216180"/>
+        <p14:creationId xmlns:p14="http://schemas.microsoft.com/office/powerpoint/2010/main" val="3160571996"/>
       </p:ext>
     </p:extLst>
   </p:cSld>
@@ -1481,27 +1748,18 @@
           <a:lstStyle/>
           <a:p>
             <a:r>
+              <a:rPr lang="zh-CN" altLang="en-US" dirty="0" smtClean="0"/>
+              <a:t>最后一步，更新</a:t>
+            </a:r>
+            <a:r>
               <a:rPr lang="en-US" altLang="zh-CN" dirty="0" smtClean="0"/>
-              <a:t>ANN</a:t>
-            </a:r>
-          </a:p>
-          <a:p>
+              <a:t>w</a:t>
+            </a:r>
             <a:r>
               <a:rPr lang="zh-CN" altLang="en-US" dirty="0" smtClean="0"/>
-              <a:t>优点：训练好后，用起来比较快；准确度高</a:t>
-            </a:r>
-            <a:endParaRPr lang="en-US" altLang="zh-CN" dirty="0" smtClean="0"/>
-          </a:p>
-          <a:p>
-            <a:r>
-              <a:rPr lang="zh-CN" altLang="en-US" dirty="0" smtClean="0"/>
-              <a:t>缺点：训练时间</a:t>
-            </a:r>
-            <a:r>
-              <a:rPr lang="zh-CN" altLang="en-US" smtClean="0"/>
-              <a:t>比较长；可解释性比较差</a:t>
-            </a:r>
-            <a:endParaRPr lang="en-US" altLang="zh-CN" dirty="0" smtClean="0"/>
+              <a:t>，是所有的，而不仅仅是输入层的。</a:t>
+            </a:r>
+            <a:endParaRPr lang="zh-CN" altLang="en-US" dirty="0"/>
           </a:p>
         </p:txBody>
       </p:sp>
@@ -1528,7 +1786,7 @@
               <a:pPr>
                 <a:defRPr/>
               </a:pPr>
-              <a:t>32</a:t>
+              <a:t>25</a:t>
             </a:fld>
             <a:endParaRPr lang="zh-CN" altLang="en-US"/>
           </a:p>
@@ -1537,7 +1795,122 @@
     </p:spTree>
     <p:extLst>
       <p:ext uri="{BB962C8B-B14F-4D97-AF65-F5344CB8AC3E}">
-        <p14:creationId xmlns:p14="http://schemas.microsoft.com/office/powerpoint/2010/main" val="1870443386"/>
+        <p14:creationId xmlns:p14="http://schemas.microsoft.com/office/powerpoint/2010/main" val="3691945900"/>
+      </p:ext>
+    </p:extLst>
+  </p:cSld>
+  <p:clrMapOvr>
+    <a:masterClrMapping/>
+  </p:clrMapOvr>
+</p:notes>
+</file>
+
+<file path=ppt/notesSlides/notesSlide9.xml><?xml version="1.0" encoding="utf-8"?>
+<p:notes xmlns:a="http://schemas.openxmlformats.org/drawingml/2006/main" xmlns:r="http://schemas.openxmlformats.org/officeDocument/2006/relationships" xmlns:p="http://schemas.openxmlformats.org/presentationml/2006/main">
+  <p:cSld>
+    <p:spTree>
+      <p:nvGrpSpPr>
+        <p:cNvPr id="1" name=""/>
+        <p:cNvGrpSpPr/>
+        <p:nvPr/>
+      </p:nvGrpSpPr>
+      <p:grpSpPr>
+        <a:xfrm>
+          <a:off x="0" y="0"/>
+          <a:ext cx="0" cy="0"/>
+          <a:chOff x="0" y="0"/>
+          <a:chExt cx="0" cy="0"/>
+        </a:xfrm>
+      </p:grpSpPr>
+      <p:sp>
+        <p:nvSpPr>
+          <p:cNvPr id="2" name="幻灯片图像占位符 1"/>
+          <p:cNvSpPr>
+            <a:spLocks noGrp="1" noRot="1" noChangeAspect="1"/>
+          </p:cNvSpPr>
+          <p:nvPr>
+            <p:ph type="sldImg"/>
+          </p:nvPr>
+        </p:nvSpPr>
+        <p:spPr/>
+      </p:sp>
+      <p:sp>
+        <p:nvSpPr>
+          <p:cNvPr id="3" name="备注占位符 2"/>
+          <p:cNvSpPr>
+            <a:spLocks noGrp="1"/>
+          </p:cNvSpPr>
+          <p:nvPr>
+            <p:ph type="body" idx="1"/>
+          </p:nvPr>
+        </p:nvSpPr>
+        <p:spPr/>
+        <p:txBody>
+          <a:bodyPr/>
+          <a:lstStyle/>
+          <a:p>
+            <a:r>
+              <a:rPr lang="zh-CN" altLang="en-US" dirty="0" smtClean="0"/>
+              <a:t>这种算法如果遇上局部最优解，就可能导致整体的性能无法继续下降，这时可以试着取另外一组随机初始值，重新开始计算。</a:t>
+            </a:r>
+            <a:endParaRPr lang="en-US" altLang="zh-CN" dirty="0" smtClean="0"/>
+          </a:p>
+          <a:p>
+            <a:endParaRPr lang="en-US" altLang="zh-CN" dirty="0" smtClean="0"/>
+          </a:p>
+          <a:p>
+            <a:r>
+              <a:rPr lang="zh-CN" altLang="en-US" dirty="0" smtClean="0"/>
+              <a:t>一般</a:t>
+            </a:r>
+            <a:r>
+              <a:rPr lang="en-US" altLang="zh-CN" dirty="0" smtClean="0"/>
+              <a:t>BP</a:t>
+            </a:r>
+            <a:r>
+              <a:rPr lang="zh-CN" altLang="en-US" dirty="0" smtClean="0"/>
+              <a:t>算法都要试很多次</a:t>
+            </a:r>
+            <a:endParaRPr lang="en-US" altLang="zh-CN" dirty="0" smtClean="0"/>
+          </a:p>
+          <a:p>
+            <a:endParaRPr lang="zh-CN" altLang="en-US" dirty="0"/>
+          </a:p>
+        </p:txBody>
+      </p:sp>
+      <p:sp>
+        <p:nvSpPr>
+          <p:cNvPr id="4" name="灯片编号占位符 3"/>
+          <p:cNvSpPr>
+            <a:spLocks noGrp="1"/>
+          </p:cNvSpPr>
+          <p:nvPr>
+            <p:ph type="sldNum" sz="quarter" idx="10"/>
+          </p:nvPr>
+        </p:nvSpPr>
+        <p:spPr/>
+        <p:txBody>
+          <a:bodyPr/>
+          <a:lstStyle/>
+          <a:p>
+            <a:pPr>
+              <a:defRPr/>
+            </a:pPr>
+            <a:fld id="{0486AD57-67ED-4140-9F70-67C055736CF8}" type="slidenum">
+              <a:rPr lang="zh-CN" altLang="en-US" smtClean="0"/>
+              <a:pPr>
+                <a:defRPr/>
+              </a:pPr>
+              <a:t>26</a:t>
+            </a:fld>
+            <a:endParaRPr lang="zh-CN" altLang="en-US"/>
+          </a:p>
+        </p:txBody>
+      </p:sp>
+    </p:spTree>
+    <p:extLst>
+      <p:ext uri="{BB962C8B-B14F-4D97-AF65-F5344CB8AC3E}">
+        <p14:creationId xmlns:p14="http://schemas.microsoft.com/office/powerpoint/2010/main" val="2029436730"/>
       </p:ext>
     </p:extLst>
   </p:cSld>
@@ -10147,7 +10520,7 @@
           <a:graphicData uri="http://schemas.openxmlformats.org/presentationml/2006/ole">
             <mc:AlternateContent xmlns:mc="http://schemas.openxmlformats.org/markup-compatibility/2006">
               <mc:Choice xmlns:v="urn:schemas-microsoft-com:vml" Requires="v">
-                <p:oleObj spid="_x0000_s123615" name="Equation" r:id="rId4" imgW="1384300" imgH="419100" progId="Equation.3">
+                <p:oleObj spid="_x0000_s123645" name="Equation" r:id="rId4" imgW="1384300" imgH="419100" progId="Equation.3">
                   <p:embed/>
                 </p:oleObj>
               </mc:Choice>
@@ -10217,7 +10590,7 @@
           <a:graphicData uri="http://schemas.openxmlformats.org/presentationml/2006/ole">
             <mc:AlternateContent xmlns:mc="http://schemas.openxmlformats.org/markup-compatibility/2006">
               <mc:Choice xmlns:v="urn:schemas-microsoft-com:vml" Requires="v">
-                <p:oleObj spid="_x0000_s123616" name="Equation" r:id="rId6" imgW="1790700" imgH="482600" progId="Equation.3">
+                <p:oleObj spid="_x0000_s123646" name="Equation" r:id="rId6" imgW="1790700" imgH="482600" progId="Equation.3">
                   <p:embed/>
                 </p:oleObj>
               </mc:Choice>
@@ -10287,7 +10660,7 @@
           <a:graphicData uri="http://schemas.openxmlformats.org/presentationml/2006/ole">
             <mc:AlternateContent xmlns:mc="http://schemas.openxmlformats.org/markup-compatibility/2006">
               <mc:Choice xmlns:v="urn:schemas-microsoft-com:vml" Requires="v">
-                <p:oleObj spid="_x0000_s123617" name="Equation" r:id="rId8" imgW="2387600" imgH="431800" progId="Equation.3">
+                <p:oleObj spid="_x0000_s123647" name="Equation" r:id="rId8" imgW="2387600" imgH="431800" progId="Equation.3">
                   <p:embed/>
                 </p:oleObj>
               </mc:Choice>
@@ -10881,7 +11254,7 @@
           <a:graphicData uri="http://schemas.openxmlformats.org/presentationml/2006/ole">
             <mc:AlternateContent xmlns:mc="http://schemas.openxmlformats.org/markup-compatibility/2006">
               <mc:Choice xmlns:v="urn:schemas-microsoft-com:vml" Requires="v">
-                <p:oleObj spid="_x0000_s124638" name="Equation" r:id="rId4" imgW="2095500" imgH="2133600" progId="Equation.3">
+                <p:oleObj spid="_x0000_s124668" name="Equation" r:id="rId4" imgW="2095500" imgH="2133600" progId="Equation.3">
                   <p:embed/>
                 </p:oleObj>
               </mc:Choice>
@@ -10951,7 +11324,7 @@
           <a:graphicData uri="http://schemas.openxmlformats.org/presentationml/2006/ole">
             <mc:AlternateContent xmlns:mc="http://schemas.openxmlformats.org/markup-compatibility/2006">
               <mc:Choice xmlns:v="urn:schemas-microsoft-com:vml" Requires="v">
-                <p:oleObj spid="_x0000_s124639" name="Equation" r:id="rId6" imgW="1371600" imgH="342900" progId="Equation.3">
+                <p:oleObj spid="_x0000_s124669" name="Equation" r:id="rId6" imgW="1371600" imgH="342900" progId="Equation.3">
                   <p:embed/>
                 </p:oleObj>
               </mc:Choice>
@@ -11029,7 +11402,7 @@
           <a:graphicData uri="http://schemas.openxmlformats.org/presentationml/2006/ole">
             <mc:AlternateContent xmlns:mc="http://schemas.openxmlformats.org/markup-compatibility/2006">
               <mc:Choice xmlns:v="urn:schemas-microsoft-com:vml" Requires="v">
-                <p:oleObj spid="_x0000_s124640" name="Equation" r:id="rId8" imgW="710891" imgH="203112" progId="Equation.3">
+                <p:oleObj spid="_x0000_s124670" name="Equation" r:id="rId8" imgW="710891" imgH="203112" progId="Equation.3">
                   <p:embed/>
                 </p:oleObj>
               </mc:Choice>
@@ -11920,7 +12293,7 @@
           <a:graphicData uri="http://schemas.openxmlformats.org/presentationml/2006/ole">
             <mc:AlternateContent xmlns:mc="http://schemas.openxmlformats.org/markup-compatibility/2006">
               <mc:Choice xmlns:v="urn:schemas-microsoft-com:vml" Requires="v">
-                <p:oleObj spid="_x0000_s116982" name="Equation" r:id="rId3" imgW="2667000" imgH="228600" progId="Equation.3">
+                <p:oleObj spid="_x0000_s116992" name="Equation" r:id="rId3" imgW="2667000" imgH="228600" progId="Equation.3">
                   <p:embed/>
                 </p:oleObj>
               </mc:Choice>
@@ -18040,7 +18413,7 @@
           <a:graphicData uri="http://schemas.openxmlformats.org/presentationml/2006/ole">
             <mc:AlternateContent xmlns:mc="http://schemas.openxmlformats.org/markup-compatibility/2006">
               <mc:Choice xmlns:v="urn:schemas-microsoft-com:vml" Requires="v">
-                <p:oleObj spid="_x0000_s148726" name="Equation" r:id="rId3" imgW="1892300" imgH="241300" progId="">
+                <p:oleObj spid="_x0000_s148736" name="Equation" r:id="rId3" imgW="1892300" imgH="241300" progId="">
                   <p:embed/>
                 </p:oleObj>
               </mc:Choice>
@@ -18975,7 +19348,7 @@
           <a:graphicData uri="http://schemas.openxmlformats.org/presentationml/2006/ole">
             <mc:AlternateContent xmlns:mc="http://schemas.openxmlformats.org/markup-compatibility/2006">
               <mc:Choice xmlns:v="urn:schemas-microsoft-com:vml" Requires="v">
-                <p:oleObj spid="_x0000_s149750" name="Equation" r:id="rId3" imgW="1651000" imgH="203200" progId="">
+                <p:oleObj spid="_x0000_s149760" name="Equation" r:id="rId3" imgW="1651000" imgH="203200" progId="">
                   <p:embed/>
                 </p:oleObj>
               </mc:Choice>
@@ -26264,7 +26637,7 @@
           <a:graphicData uri="http://schemas.openxmlformats.org/presentationml/2006/ole">
             <mc:AlternateContent xmlns:mc="http://schemas.openxmlformats.org/markup-compatibility/2006">
               <mc:Choice xmlns:v="urn:schemas-microsoft-com:vml" Requires="v">
-                <p:oleObj spid="_x0000_s151262" name="公式" r:id="rId3" imgW="914400" imgH="431800" progId="Equation.3">
+                <p:oleObj spid="_x0000_s151292" name="公式" r:id="rId3" imgW="914400" imgH="431800" progId="Equation.3">
                   <p:embed/>
                 </p:oleObj>
               </mc:Choice>
@@ -26340,7 +26713,7 @@
           <a:graphicData uri="http://schemas.openxmlformats.org/presentationml/2006/ole">
             <mc:AlternateContent xmlns:mc="http://schemas.openxmlformats.org/markup-compatibility/2006">
               <mc:Choice xmlns:v="urn:schemas-microsoft-com:vml" Requires="v">
-                <p:oleObj spid="_x0000_s151263" name="公式" r:id="rId5" imgW="1307532" imgH="393529" progId="Equation.3">
+                <p:oleObj spid="_x0000_s151293" name="公式" r:id="rId5" imgW="1307532" imgH="393529" progId="Equation.3">
                   <p:embed/>
                 </p:oleObj>
               </mc:Choice>
@@ -26520,7 +26893,7 @@
           <a:graphicData uri="http://schemas.openxmlformats.org/presentationml/2006/ole">
             <mc:AlternateContent xmlns:mc="http://schemas.openxmlformats.org/markup-compatibility/2006">
               <mc:Choice xmlns:v="urn:schemas-microsoft-com:vml" Requires="v">
-                <p:oleObj spid="_x0000_s151264" name="Equation" r:id="rId7" imgW="3035300" imgH="635000" progId="">
+                <p:oleObj spid="_x0000_s151294" name="Equation" r:id="rId7" imgW="3035300" imgH="635000" progId="">
                   <p:embed/>
                 </p:oleObj>
               </mc:Choice>
@@ -26907,7 +27280,7 @@
           <a:graphicData uri="http://schemas.openxmlformats.org/presentationml/2006/ole">
             <mc:AlternateContent xmlns:mc="http://schemas.openxmlformats.org/markup-compatibility/2006">
               <mc:Choice xmlns:v="urn:schemas-microsoft-com:vml" Requires="v">
-                <p:oleObj spid="_x0000_s155358" name="Equation" r:id="rId3" imgW="952087" imgH="444307" progId="">
+                <p:oleObj spid="_x0000_s155388" name="Equation" r:id="rId3" imgW="952087" imgH="444307" progId="">
                   <p:embed/>
                 </p:oleObj>
               </mc:Choice>
@@ -26977,7 +27350,7 @@
           <a:graphicData uri="http://schemas.openxmlformats.org/presentationml/2006/ole">
             <mc:AlternateContent xmlns:mc="http://schemas.openxmlformats.org/markup-compatibility/2006">
               <mc:Choice xmlns:v="urn:schemas-microsoft-com:vml" Requires="v">
-                <p:oleObj spid="_x0000_s155359" name="Equation" r:id="rId5" imgW="1536700" imgH="431800" progId="">
+                <p:oleObj spid="_x0000_s155389" name="Equation" r:id="rId5" imgW="1536700" imgH="431800" progId="">
                   <p:embed/>
                 </p:oleObj>
               </mc:Choice>
@@ -27544,7 +27917,7 @@
           <a:graphicData uri="http://schemas.openxmlformats.org/presentationml/2006/ole">
             <mc:AlternateContent xmlns:mc="http://schemas.openxmlformats.org/markup-compatibility/2006">
               <mc:Choice xmlns:v="urn:schemas-microsoft-com:vml" Requires="v">
-                <p:oleObj spid="_x0000_s155360" name="Equation" r:id="rId7" imgW="1917700" imgH="469900" progId="">
+                <p:oleObj spid="_x0000_s155390" name="Equation" r:id="rId7" imgW="1917700" imgH="469900" progId="">
                   <p:embed/>
                 </p:oleObj>
               </mc:Choice>
@@ -28666,12 +29039,12 @@
           <a:graphicData uri="http://schemas.openxmlformats.org/presentationml/2006/ole">
             <mc:AlternateContent xmlns:mc="http://schemas.openxmlformats.org/markup-compatibility/2006">
               <mc:Choice xmlns:v="urn:schemas-microsoft-com:vml" Requires="v">
-                <p:oleObj spid="_x0000_s163258" name="Equation" r:id="rId3" imgW="1231366" imgH="469696" progId="">
+                <p:oleObj spid="_x0000_s163324" name="Equation" r:id="rId4" imgW="1231366" imgH="469696" progId="">
                   <p:embed/>
                 </p:oleObj>
               </mc:Choice>
               <mc:Fallback>
-                <p:oleObj name="Equation" r:id="rId3" imgW="1231366" imgH="469696" progId="">
+                <p:oleObj name="Equation" r:id="rId4" imgW="1231366" imgH="469696" progId="">
                   <p:embed/>
                   <p:pic>
                     <p:nvPicPr>
@@ -28682,7 +29055,7 @@
                       <p:nvPr/>
                     </p:nvPicPr>
                     <p:blipFill>
-                      <a:blip r:embed="rId4">
+                      <a:blip r:embed="rId5">
                         <a:extLst>
                           <a:ext uri="{28A0092B-C50C-407E-A947-70E740481C1C}">
                             <a14:useLocalDpi xmlns:a14="http://schemas.microsoft.com/office/drawing/2010/main" val="0"/>
@@ -28736,12 +29109,12 @@
           <a:graphicData uri="http://schemas.openxmlformats.org/presentationml/2006/ole">
             <mc:AlternateContent xmlns:mc="http://schemas.openxmlformats.org/markup-compatibility/2006">
               <mc:Choice xmlns:v="urn:schemas-microsoft-com:vml" Requires="v">
-                <p:oleObj spid="_x0000_s163259" name="Equation" r:id="rId5" imgW="1675673" imgH="444307" progId="">
+                <p:oleObj spid="_x0000_s163325" name="Equation" r:id="rId6" imgW="1675673" imgH="444307" progId="">
                   <p:embed/>
                 </p:oleObj>
               </mc:Choice>
               <mc:Fallback>
-                <p:oleObj name="Equation" r:id="rId5" imgW="1675673" imgH="444307" progId="">
+                <p:oleObj name="Equation" r:id="rId6" imgW="1675673" imgH="444307" progId="">
                   <p:embed/>
                   <p:pic>
                     <p:nvPicPr>
@@ -28752,7 +29125,7 @@
                       <p:nvPr/>
                     </p:nvPicPr>
                     <p:blipFill>
-                      <a:blip r:embed="rId6">
+                      <a:blip r:embed="rId7">
                         <a:extLst>
                           <a:ext uri="{28A0092B-C50C-407E-A947-70E740481C1C}">
                             <a14:useLocalDpi xmlns:a14="http://schemas.microsoft.com/office/drawing/2010/main" val="0"/>
@@ -28812,12 +29185,12 @@
           <a:graphicData uri="http://schemas.openxmlformats.org/presentationml/2006/ole">
             <mc:AlternateContent xmlns:mc="http://schemas.openxmlformats.org/markup-compatibility/2006">
               <mc:Choice xmlns:v="urn:schemas-microsoft-com:vml" Requires="v">
-                <p:oleObj spid="_x0000_s163260" name="Equation" r:id="rId7" imgW="1752600" imgH="1181100" progId="">
+                <p:oleObj spid="_x0000_s163326" name="Equation" r:id="rId8" imgW="1752600" imgH="1181100" progId="">
                   <p:embed/>
                 </p:oleObj>
               </mc:Choice>
               <mc:Fallback>
-                <p:oleObj name="Equation" r:id="rId7" imgW="1752600" imgH="1181100" progId="">
+                <p:oleObj name="Equation" r:id="rId8" imgW="1752600" imgH="1181100" progId="">
                   <p:embed/>
                   <p:pic>
                     <p:nvPicPr>
@@ -28828,7 +29201,7 @@
                       <p:nvPr/>
                     </p:nvPicPr>
                     <p:blipFill>
-                      <a:blip r:embed="rId8">
+                      <a:blip r:embed="rId9">
                         <a:extLst>
                           <a:ext uri="{28A0092B-C50C-407E-A947-70E740481C1C}">
                             <a14:useLocalDpi xmlns:a14="http://schemas.microsoft.com/office/drawing/2010/main" val="0"/>
@@ -28882,12 +29255,12 @@
           <a:graphicData uri="http://schemas.openxmlformats.org/presentationml/2006/ole">
             <mc:AlternateContent xmlns:mc="http://schemas.openxmlformats.org/markup-compatibility/2006">
               <mc:Choice xmlns:v="urn:schemas-microsoft-com:vml" Requires="v">
-                <p:oleObj spid="_x0000_s163261" name="Equation" r:id="rId9" imgW="1841500" imgH="469900" progId="">
+                <p:oleObj spid="_x0000_s163327" name="Equation" r:id="rId10" imgW="1841500" imgH="469900" progId="">
                   <p:embed/>
                 </p:oleObj>
               </mc:Choice>
               <mc:Fallback>
-                <p:oleObj name="Equation" r:id="rId9" imgW="1841500" imgH="469900" progId="">
+                <p:oleObj name="Equation" r:id="rId10" imgW="1841500" imgH="469900" progId="">
                   <p:embed/>
                   <p:pic>
                     <p:nvPicPr>
@@ -28898,7 +29271,7 @@
                       <p:nvPr/>
                     </p:nvPicPr>
                     <p:blipFill>
-                      <a:blip r:embed="rId10">
+                      <a:blip r:embed="rId11">
                         <a:extLst>
                           <a:ext uri="{28A0092B-C50C-407E-A947-70E740481C1C}">
                             <a14:useLocalDpi xmlns:a14="http://schemas.microsoft.com/office/drawing/2010/main" val="0"/>
@@ -28958,12 +29331,12 @@
           <a:graphicData uri="http://schemas.openxmlformats.org/presentationml/2006/ole">
             <mc:AlternateContent xmlns:mc="http://schemas.openxmlformats.org/markup-compatibility/2006">
               <mc:Choice xmlns:v="urn:schemas-microsoft-com:vml" Requires="v">
-                <p:oleObj spid="_x0000_s163262" name="Equation" r:id="rId11" imgW="1675673" imgH="444307" progId="">
+                <p:oleObj spid="_x0000_s163328" name="Equation" r:id="rId12" imgW="1675673" imgH="444307" progId="">
                   <p:embed/>
                 </p:oleObj>
               </mc:Choice>
               <mc:Fallback>
-                <p:oleObj name="Equation" r:id="rId11" imgW="1675673" imgH="444307" progId="">
+                <p:oleObj name="Equation" r:id="rId12" imgW="1675673" imgH="444307" progId="">
                   <p:embed/>
                   <p:pic>
                     <p:nvPicPr>
@@ -28974,7 +29347,7 @@
                       <p:nvPr/>
                     </p:nvPicPr>
                     <p:blipFill>
-                      <a:blip r:embed="rId12">
+                      <a:blip r:embed="rId13">
                         <a:extLst>
                           <a:ext uri="{28A0092B-C50C-407E-A947-70E740481C1C}">
                             <a14:useLocalDpi xmlns:a14="http://schemas.microsoft.com/office/drawing/2010/main" val="0"/>
@@ -29278,12 +29651,12 @@
           <a:graphicData uri="http://schemas.openxmlformats.org/presentationml/2006/ole">
             <mc:AlternateContent xmlns:mc="http://schemas.openxmlformats.org/markup-compatibility/2006">
               <mc:Choice xmlns:v="urn:schemas-microsoft-com:vml" Requires="v">
-                <p:oleObj spid="_x0000_s163263" name="Equation" r:id="rId13" imgW="2387600" imgH="444500" progId="">
+                <p:oleObj spid="_x0000_s163329" name="Equation" r:id="rId14" imgW="2387600" imgH="444500" progId="">
                   <p:embed/>
                 </p:oleObj>
               </mc:Choice>
               <mc:Fallback>
-                <p:oleObj name="Equation" r:id="rId13" imgW="2387600" imgH="444500" progId="">
+                <p:oleObj name="Equation" r:id="rId14" imgW="2387600" imgH="444500" progId="">
                   <p:embed/>
                   <p:pic>
                     <p:nvPicPr>
@@ -29294,7 +29667,7 @@
                       <p:nvPr/>
                     </p:nvPicPr>
                     <p:blipFill>
-                      <a:blip r:embed="rId14">
+                      <a:blip r:embed="rId15">
                         <a:extLst>
                           <a:ext uri="{28A0092B-C50C-407E-A947-70E740481C1C}">
                             <a14:useLocalDpi xmlns:a14="http://schemas.microsoft.com/office/drawing/2010/main" val="0"/>
@@ -29916,12 +30289,12 @@
           <a:graphicData uri="http://schemas.openxmlformats.org/presentationml/2006/ole">
             <mc:AlternateContent xmlns:mc="http://schemas.openxmlformats.org/markup-compatibility/2006">
               <mc:Choice xmlns:v="urn:schemas-microsoft-com:vml" Requires="v">
-                <p:oleObj spid="_x0000_s162238" name="Equation" r:id="rId3" imgW="3822700" imgH="965200" progId="">
+                <p:oleObj spid="_x0000_s162304" name="Equation" r:id="rId4" imgW="3822700" imgH="965200" progId="">
                   <p:embed/>
                 </p:oleObj>
               </mc:Choice>
               <mc:Fallback>
-                <p:oleObj name="Equation" r:id="rId3" imgW="3822700" imgH="965200" progId="">
+                <p:oleObj name="Equation" r:id="rId4" imgW="3822700" imgH="965200" progId="">
                   <p:embed/>
                   <p:pic>
                     <p:nvPicPr>
@@ -29932,7 +30305,7 @@
                       <p:nvPr/>
                     </p:nvPicPr>
                     <p:blipFill>
-                      <a:blip r:embed="rId4">
+                      <a:blip r:embed="rId5">
                         <a:extLst>
                           <a:ext uri="{28A0092B-C50C-407E-A947-70E740481C1C}">
                             <a14:useLocalDpi xmlns:a14="http://schemas.microsoft.com/office/drawing/2010/main" val="0"/>
@@ -29992,12 +30365,12 @@
           <a:graphicData uri="http://schemas.openxmlformats.org/presentationml/2006/ole">
             <mc:AlternateContent xmlns:mc="http://schemas.openxmlformats.org/markup-compatibility/2006">
               <mc:Choice xmlns:v="urn:schemas-microsoft-com:vml" Requires="v">
-                <p:oleObj spid="_x0000_s162239" name="Equation" r:id="rId5" imgW="1663700" imgH="355600" progId="">
+                <p:oleObj spid="_x0000_s162305" name="Equation" r:id="rId6" imgW="1663700" imgH="355600" progId="">
                   <p:embed/>
                 </p:oleObj>
               </mc:Choice>
               <mc:Fallback>
-                <p:oleObj name="Equation" r:id="rId5" imgW="1663700" imgH="355600" progId="">
+                <p:oleObj name="Equation" r:id="rId6" imgW="1663700" imgH="355600" progId="">
                   <p:embed/>
                   <p:pic>
                     <p:nvPicPr>
@@ -30008,7 +30381,7 @@
                       <p:nvPr/>
                     </p:nvPicPr>
                     <p:blipFill>
-                      <a:blip r:embed="rId6">
+                      <a:blip r:embed="rId7">
                         <a:extLst>
                           <a:ext uri="{28A0092B-C50C-407E-A947-70E740481C1C}">
                             <a14:useLocalDpi xmlns:a14="http://schemas.microsoft.com/office/drawing/2010/main" val="0"/>
@@ -30068,12 +30441,12 @@
           <a:graphicData uri="http://schemas.openxmlformats.org/presentationml/2006/ole">
             <mc:AlternateContent xmlns:mc="http://schemas.openxmlformats.org/markup-compatibility/2006">
               <mc:Choice xmlns:v="urn:schemas-microsoft-com:vml" Requires="v">
-                <p:oleObj spid="_x0000_s162240" name="Equation" r:id="rId7" imgW="838200" imgH="241300" progId="">
+                <p:oleObj spid="_x0000_s162306" name="Equation" r:id="rId8" imgW="838200" imgH="241300" progId="">
                   <p:embed/>
                 </p:oleObj>
               </mc:Choice>
               <mc:Fallback>
-                <p:oleObj name="Equation" r:id="rId7" imgW="838200" imgH="241300" progId="">
+                <p:oleObj name="Equation" r:id="rId8" imgW="838200" imgH="241300" progId="">
                   <p:embed/>
                   <p:pic>
                     <p:nvPicPr>
@@ -30084,7 +30457,7 @@
                       <p:nvPr/>
                     </p:nvPicPr>
                     <p:blipFill>
-                      <a:blip r:embed="rId8">
+                      <a:blip r:embed="rId9">
                         <a:extLst>
                           <a:ext uri="{28A0092B-C50C-407E-A947-70E740481C1C}">
                             <a14:useLocalDpi xmlns:a14="http://schemas.microsoft.com/office/drawing/2010/main" val="0"/>
@@ -30144,12 +30517,12 @@
           <a:graphicData uri="http://schemas.openxmlformats.org/presentationml/2006/ole">
             <mc:AlternateContent xmlns:mc="http://schemas.openxmlformats.org/markup-compatibility/2006">
               <mc:Choice xmlns:v="urn:schemas-microsoft-com:vml" Requires="v">
-                <p:oleObj spid="_x0000_s162241" name="Equation" r:id="rId9" imgW="799753" imgH="431613" progId="Equation.3">
+                <p:oleObj spid="_x0000_s162307" name="Equation" r:id="rId10" imgW="799753" imgH="431613" progId="Equation.3">
                   <p:embed/>
                 </p:oleObj>
               </mc:Choice>
               <mc:Fallback>
-                <p:oleObj name="Equation" r:id="rId9" imgW="799753" imgH="431613" progId="Equation.3">
+                <p:oleObj name="Equation" r:id="rId10" imgW="799753" imgH="431613" progId="Equation.3">
                   <p:embed/>
                   <p:pic>
                     <p:nvPicPr>
@@ -30160,7 +30533,7 @@
                       <p:nvPr/>
                     </p:nvPicPr>
                     <p:blipFill>
-                      <a:blip r:embed="rId10">
+                      <a:blip r:embed="rId11">
                         <a:extLst>
                           <a:ext uri="{28A0092B-C50C-407E-A947-70E740481C1C}">
                             <a14:useLocalDpi xmlns:a14="http://schemas.microsoft.com/office/drawing/2010/main" val="0"/>
@@ -30701,12 +31074,12 @@
             <a:graphicData uri="http://schemas.openxmlformats.org/presentationml/2006/ole">
               <mc:AlternateContent xmlns:mc="http://schemas.openxmlformats.org/markup-compatibility/2006">
                 <mc:Choice xmlns:v="urn:schemas-microsoft-com:vml" Requires="v">
-                  <p:oleObj spid="_x0000_s162242" name="Equation" r:id="rId11" imgW="291973" imgH="241195" progId="Equation.3">
+                  <p:oleObj spid="_x0000_s162308" name="Equation" r:id="rId12" imgW="291973" imgH="241195" progId="Equation.3">
                     <p:embed/>
                   </p:oleObj>
                 </mc:Choice>
                 <mc:Fallback>
-                  <p:oleObj name="Equation" r:id="rId11" imgW="291973" imgH="241195" progId="Equation.3">
+                  <p:oleObj name="Equation" r:id="rId12" imgW="291973" imgH="241195" progId="Equation.3">
                     <p:embed/>
                     <p:pic>
                       <p:nvPicPr>
@@ -30717,7 +31090,7 @@
                         <p:nvPr/>
                       </p:nvPicPr>
                       <p:blipFill>
-                        <a:blip r:embed="rId12">
+                        <a:blip r:embed="rId13">
                           <a:extLst>
                             <a:ext uri="{28A0092B-C50C-407E-A947-70E740481C1C}">
                               <a14:useLocalDpi xmlns:a14="http://schemas.microsoft.com/office/drawing/2010/main" val="0"/>
@@ -30777,12 +31150,12 @@
             <a:graphicData uri="http://schemas.openxmlformats.org/presentationml/2006/ole">
               <mc:AlternateContent xmlns:mc="http://schemas.openxmlformats.org/markup-compatibility/2006">
                 <mc:Choice xmlns:v="urn:schemas-microsoft-com:vml" Requires="v">
-                  <p:oleObj spid="_x0000_s162243" name="Equation" r:id="rId13" imgW="177646" imgH="228402" progId="Equation.3">
+                  <p:oleObj spid="_x0000_s162309" name="Equation" r:id="rId14" imgW="177646" imgH="228402" progId="Equation.3">
                     <p:embed/>
                   </p:oleObj>
                 </mc:Choice>
                 <mc:Fallback>
-                  <p:oleObj name="Equation" r:id="rId13" imgW="177646" imgH="228402" progId="Equation.3">
+                  <p:oleObj name="Equation" r:id="rId14" imgW="177646" imgH="228402" progId="Equation.3">
                     <p:embed/>
                     <p:pic>
                       <p:nvPicPr>
@@ -30793,7 +31166,7 @@
                         <p:nvPr/>
                       </p:nvPicPr>
                       <p:blipFill>
-                        <a:blip r:embed="rId14">
+                        <a:blip r:embed="rId15">
                           <a:extLst>
                             <a:ext uri="{28A0092B-C50C-407E-A947-70E740481C1C}">
                               <a14:useLocalDpi xmlns:a14="http://schemas.microsoft.com/office/drawing/2010/main" val="0"/>
@@ -31834,12 +32207,12 @@
           <a:graphicData uri="http://schemas.openxmlformats.org/presentationml/2006/ole">
             <mc:AlternateContent xmlns:mc="http://schemas.openxmlformats.org/markup-compatibility/2006">
               <mc:Choice xmlns:v="urn:schemas-microsoft-com:vml" Requires="v">
-                <p:oleObj spid="_x0000_s158431" name="Equation" r:id="rId3" imgW="1447800" imgH="228600" progId="">
+                <p:oleObj spid="_x0000_s158461" name="Equation" r:id="rId4" imgW="1447800" imgH="228600" progId="">
                   <p:embed/>
                 </p:oleObj>
               </mc:Choice>
               <mc:Fallback>
-                <p:oleObj name="Equation" r:id="rId3" imgW="1447800" imgH="228600" progId="">
+                <p:oleObj name="Equation" r:id="rId4" imgW="1447800" imgH="228600" progId="">
                   <p:embed/>
                   <p:pic>
                     <p:nvPicPr>
@@ -31850,7 +32223,7 @@
                       <p:nvPr/>
                     </p:nvPicPr>
                     <p:blipFill>
-                      <a:blip r:embed="rId4">
+                      <a:blip r:embed="rId5">
                         <a:extLst>
                           <a:ext uri="{28A0092B-C50C-407E-A947-70E740481C1C}">
                             <a14:useLocalDpi xmlns:a14="http://schemas.microsoft.com/office/drawing/2010/main" val="0"/>
@@ -31910,12 +32283,12 @@
           <a:graphicData uri="http://schemas.openxmlformats.org/presentationml/2006/ole">
             <mc:AlternateContent xmlns:mc="http://schemas.openxmlformats.org/markup-compatibility/2006">
               <mc:Choice xmlns:v="urn:schemas-microsoft-com:vml" Requires="v">
-                <p:oleObj spid="_x0000_s158432" name="Equation" r:id="rId5" imgW="1586811" imgH="355446" progId="">
+                <p:oleObj spid="_x0000_s158462" name="Equation" r:id="rId6" imgW="1586811" imgH="355446" progId="">
                   <p:embed/>
                 </p:oleObj>
               </mc:Choice>
               <mc:Fallback>
-                <p:oleObj name="Equation" r:id="rId5" imgW="1586811" imgH="355446" progId="">
+                <p:oleObj name="Equation" r:id="rId6" imgW="1586811" imgH="355446" progId="">
                   <p:embed/>
                   <p:pic>
                     <p:nvPicPr>
@@ -31926,7 +32299,7 @@
                       <p:nvPr/>
                     </p:nvPicPr>
                     <p:blipFill>
-                      <a:blip r:embed="rId6">
+                      <a:blip r:embed="rId7">
                         <a:extLst>
                           <a:ext uri="{28A0092B-C50C-407E-A947-70E740481C1C}">
                             <a14:useLocalDpi xmlns:a14="http://schemas.microsoft.com/office/drawing/2010/main" val="0"/>
@@ -31986,12 +32359,12 @@
           <a:graphicData uri="http://schemas.openxmlformats.org/presentationml/2006/ole">
             <mc:AlternateContent xmlns:mc="http://schemas.openxmlformats.org/markup-compatibility/2006">
               <mc:Choice xmlns:v="urn:schemas-microsoft-com:vml" Requires="v">
-                <p:oleObj spid="_x0000_s158433" name="Equation" r:id="rId7" imgW="1879600" imgH="241300" progId="">
+                <p:oleObj spid="_x0000_s158463" name="Equation" r:id="rId8" imgW="1879600" imgH="241300" progId="">
                   <p:embed/>
                 </p:oleObj>
               </mc:Choice>
               <mc:Fallback>
-                <p:oleObj name="Equation" r:id="rId7" imgW="1879600" imgH="241300" progId="">
+                <p:oleObj name="Equation" r:id="rId8" imgW="1879600" imgH="241300" progId="">
                   <p:embed/>
                   <p:pic>
                     <p:nvPicPr>
@@ -32002,7 +32375,7 @@
                       <p:nvPr/>
                     </p:nvPicPr>
                     <p:blipFill>
-                      <a:blip r:embed="rId8">
+                      <a:blip r:embed="rId9">
                         <a:extLst>
                           <a:ext uri="{28A0092B-C50C-407E-A947-70E740481C1C}">
                             <a14:useLocalDpi xmlns:a14="http://schemas.microsoft.com/office/drawing/2010/main" val="0"/>
@@ -32590,7 +32963,7 @@
           <a:graphicData uri="http://schemas.openxmlformats.org/presentationml/2006/ole">
             <mc:AlternateContent xmlns:mc="http://schemas.openxmlformats.org/markup-compatibility/2006">
               <mc:Choice xmlns:v="urn:schemas-microsoft-com:vml" Requires="v">
-                <p:oleObj spid="_x0000_s159991" name="Equation" r:id="rId4" imgW="1905000" imgH="241300" progId="">
+                <p:oleObj spid="_x0000_s160001" name="Equation" r:id="rId4" imgW="1905000" imgH="241300" progId="">
                   <p:embed/>
                 </p:oleObj>
               </mc:Choice>
@@ -39534,7 +39907,7 @@
           <a:graphicData uri="http://schemas.openxmlformats.org/presentationml/2006/ole">
             <mc:AlternateContent xmlns:mc="http://schemas.openxmlformats.org/markup-compatibility/2006">
               <mc:Choice xmlns:v="urn:schemas-microsoft-com:vml" Requires="v">
-                <p:oleObj spid="_x0000_s116449" name="Equation" r:id="rId4" imgW="558558" imgH="431613" progId="Equation.3">
+                <p:oleObj spid="_x0000_s116479" name="Equation" r:id="rId4" imgW="558558" imgH="431613" progId="Equation.3">
                   <p:embed/>
                 </p:oleObj>
               </mc:Choice>
@@ -39604,7 +39977,7 @@
           <a:graphicData uri="http://schemas.openxmlformats.org/presentationml/2006/ole">
             <mc:AlternateContent xmlns:mc="http://schemas.openxmlformats.org/markup-compatibility/2006">
               <mc:Choice xmlns:v="urn:schemas-microsoft-com:vml" Requires="v">
-                <p:oleObj spid="_x0000_s116450" name="Equation" r:id="rId6" imgW="1497950" imgH="634725" progId="Equation.3">
+                <p:oleObj spid="_x0000_s116480" name="Equation" r:id="rId6" imgW="1497950" imgH="634725" progId="Equation.3">
                   <p:embed/>
                 </p:oleObj>
               </mc:Choice>
@@ -39680,7 +40053,7 @@
           <a:graphicData uri="http://schemas.openxmlformats.org/presentationml/2006/ole">
             <mc:AlternateContent xmlns:mc="http://schemas.openxmlformats.org/markup-compatibility/2006">
               <mc:Choice xmlns:v="urn:schemas-microsoft-com:vml" Requires="v">
-                <p:oleObj spid="_x0000_s116451" name="Equation" r:id="rId8" imgW="2946400" imgH="457200" progId="Equation.3">
+                <p:oleObj spid="_x0000_s116481" name="Equation" r:id="rId8" imgW="2946400" imgH="457200" progId="Equation.3">
                   <p:embed/>
                 </p:oleObj>
               </mc:Choice>

</xml_diff>